<commit_message>
reference to Data updated
</commit_message>
<xml_diff>
--- a/Presentation/Microservices.pptx
+++ b/Presentation/Microservices.pptx
@@ -5,10 +5,10 @@
     <p:sldMasterId id="2147483762" r:id="rId1"/>
   </p:sldMasterIdLst>
   <p:notesMasterIdLst>
-    <p:notesMasterId r:id="rId14"/>
+    <p:notesMasterId r:id="rId18"/>
   </p:notesMasterIdLst>
   <p:handoutMasterIdLst>
-    <p:handoutMasterId r:id="rId15"/>
+    <p:handoutMasterId r:id="rId19"/>
   </p:handoutMasterIdLst>
   <p:sldIdLst>
     <p:sldId id="256" r:id="rId2"/>
@@ -23,6 +23,10 @@
     <p:sldId id="265" r:id="rId11"/>
     <p:sldId id="266" r:id="rId12"/>
     <p:sldId id="267" r:id="rId13"/>
+    <p:sldId id="268" r:id="rId14"/>
+    <p:sldId id="269" r:id="rId15"/>
+    <p:sldId id="270" r:id="rId16"/>
+    <p:sldId id="271" r:id="rId17"/>
   </p:sldIdLst>
   <p:sldSz cx="12192000" cy="6858000"/>
   <p:notesSz cx="6858000" cy="9144000"/>
@@ -133,6 +137,753 @@
 </file>
 
 <file path=ppt/diagrams/colors1.xml><?xml version="1.0" encoding="utf-8"?>
+<dgm:colorsDef xmlns:dgm="http://schemas.openxmlformats.org/drawingml/2006/diagram" xmlns:a="http://schemas.openxmlformats.org/drawingml/2006/main" uniqueId="urn:microsoft.com/office/officeart/2005/8/colors/accent1_2">
+  <dgm:title val=""/>
+  <dgm:desc val=""/>
+  <dgm:catLst>
+    <dgm:cat type="accent1" pri="11200"/>
+  </dgm:catLst>
+  <dgm:styleLbl name="node0">
+    <dgm:fillClrLst meth="repeat">
+      <a:schemeClr val="accent1"/>
+    </dgm:fillClrLst>
+    <dgm:linClrLst meth="repeat">
+      <a:schemeClr val="lt1"/>
+    </dgm:linClrLst>
+    <dgm:effectClrLst/>
+    <dgm:txLinClrLst/>
+    <dgm:txFillClrLst/>
+    <dgm:txEffectClrLst/>
+  </dgm:styleLbl>
+  <dgm:styleLbl name="alignNode1">
+    <dgm:fillClrLst meth="repeat">
+      <a:schemeClr val="accent1"/>
+    </dgm:fillClrLst>
+    <dgm:linClrLst meth="repeat">
+      <a:schemeClr val="accent1"/>
+    </dgm:linClrLst>
+    <dgm:effectClrLst/>
+    <dgm:txLinClrLst/>
+    <dgm:txFillClrLst/>
+    <dgm:txEffectClrLst/>
+  </dgm:styleLbl>
+  <dgm:styleLbl name="node1">
+    <dgm:fillClrLst meth="repeat">
+      <a:schemeClr val="accent1"/>
+    </dgm:fillClrLst>
+    <dgm:linClrLst meth="repeat">
+      <a:schemeClr val="lt1"/>
+    </dgm:linClrLst>
+    <dgm:effectClrLst/>
+    <dgm:txLinClrLst/>
+    <dgm:txFillClrLst/>
+    <dgm:txEffectClrLst/>
+  </dgm:styleLbl>
+  <dgm:styleLbl name="lnNode1">
+    <dgm:fillClrLst meth="repeat">
+      <a:schemeClr val="accent1"/>
+    </dgm:fillClrLst>
+    <dgm:linClrLst meth="repeat">
+      <a:schemeClr val="lt1"/>
+    </dgm:linClrLst>
+    <dgm:effectClrLst/>
+    <dgm:txLinClrLst/>
+    <dgm:txFillClrLst/>
+    <dgm:txEffectClrLst/>
+  </dgm:styleLbl>
+  <dgm:styleLbl name="vennNode1">
+    <dgm:fillClrLst meth="repeat">
+      <a:schemeClr val="accent1">
+        <a:alpha val="50000"/>
+      </a:schemeClr>
+    </dgm:fillClrLst>
+    <dgm:linClrLst meth="repeat">
+      <a:schemeClr val="lt1"/>
+    </dgm:linClrLst>
+    <dgm:effectClrLst/>
+    <dgm:txLinClrLst/>
+    <dgm:txFillClrLst/>
+    <dgm:txEffectClrLst/>
+  </dgm:styleLbl>
+  <dgm:styleLbl name="node2">
+    <dgm:fillClrLst meth="repeat">
+      <a:schemeClr val="accent1"/>
+    </dgm:fillClrLst>
+    <dgm:linClrLst meth="repeat">
+      <a:schemeClr val="lt1"/>
+    </dgm:linClrLst>
+    <dgm:effectClrLst/>
+    <dgm:txLinClrLst/>
+    <dgm:txFillClrLst/>
+    <dgm:txEffectClrLst/>
+  </dgm:styleLbl>
+  <dgm:styleLbl name="node3">
+    <dgm:fillClrLst meth="repeat">
+      <a:schemeClr val="accent1"/>
+    </dgm:fillClrLst>
+    <dgm:linClrLst meth="repeat">
+      <a:schemeClr val="lt1"/>
+    </dgm:linClrLst>
+    <dgm:effectClrLst/>
+    <dgm:txLinClrLst/>
+    <dgm:txFillClrLst/>
+    <dgm:txEffectClrLst/>
+  </dgm:styleLbl>
+  <dgm:styleLbl name="node4">
+    <dgm:fillClrLst meth="repeat">
+      <a:schemeClr val="accent1"/>
+    </dgm:fillClrLst>
+    <dgm:linClrLst meth="repeat">
+      <a:schemeClr val="lt1"/>
+    </dgm:linClrLst>
+    <dgm:effectClrLst/>
+    <dgm:txLinClrLst/>
+    <dgm:txFillClrLst/>
+    <dgm:txEffectClrLst/>
+  </dgm:styleLbl>
+  <dgm:styleLbl name="fgImgPlace1">
+    <dgm:fillClrLst meth="repeat">
+      <a:schemeClr val="accent1">
+        <a:tint val="50000"/>
+      </a:schemeClr>
+    </dgm:fillClrLst>
+    <dgm:linClrLst meth="repeat">
+      <a:schemeClr val="lt1"/>
+    </dgm:linClrLst>
+    <dgm:effectClrLst/>
+    <dgm:txLinClrLst/>
+    <dgm:txFillClrLst meth="repeat">
+      <a:schemeClr val="lt1"/>
+    </dgm:txFillClrLst>
+    <dgm:txEffectClrLst/>
+  </dgm:styleLbl>
+  <dgm:styleLbl name="alignImgPlace1">
+    <dgm:fillClrLst meth="repeat">
+      <a:schemeClr val="accent1">
+        <a:tint val="50000"/>
+      </a:schemeClr>
+    </dgm:fillClrLst>
+    <dgm:linClrLst meth="repeat">
+      <a:schemeClr val="lt1"/>
+    </dgm:linClrLst>
+    <dgm:effectClrLst/>
+    <dgm:txLinClrLst/>
+    <dgm:txFillClrLst meth="repeat">
+      <a:schemeClr val="lt1"/>
+    </dgm:txFillClrLst>
+    <dgm:txEffectClrLst/>
+  </dgm:styleLbl>
+  <dgm:styleLbl name="bgImgPlace1">
+    <dgm:fillClrLst meth="repeat">
+      <a:schemeClr val="accent1">
+        <a:tint val="50000"/>
+      </a:schemeClr>
+    </dgm:fillClrLst>
+    <dgm:linClrLst meth="repeat">
+      <a:schemeClr val="lt1"/>
+    </dgm:linClrLst>
+    <dgm:effectClrLst/>
+    <dgm:txLinClrLst/>
+    <dgm:txFillClrLst meth="repeat">
+      <a:schemeClr val="lt1"/>
+    </dgm:txFillClrLst>
+    <dgm:txEffectClrLst/>
+  </dgm:styleLbl>
+  <dgm:styleLbl name="sibTrans2D1">
+    <dgm:fillClrLst meth="repeat">
+      <a:schemeClr val="accent1">
+        <a:tint val="60000"/>
+      </a:schemeClr>
+    </dgm:fillClrLst>
+    <dgm:linClrLst meth="repeat">
+      <a:schemeClr val="accent1">
+        <a:tint val="60000"/>
+      </a:schemeClr>
+    </dgm:linClrLst>
+    <dgm:effectClrLst/>
+    <dgm:txLinClrLst/>
+    <dgm:txFillClrLst/>
+    <dgm:txEffectClrLst/>
+  </dgm:styleLbl>
+  <dgm:styleLbl name="fgSibTrans2D1">
+    <dgm:fillClrLst meth="repeat">
+      <a:schemeClr val="accent1">
+        <a:tint val="60000"/>
+      </a:schemeClr>
+    </dgm:fillClrLst>
+    <dgm:linClrLst meth="repeat">
+      <a:schemeClr val="accent1">
+        <a:tint val="60000"/>
+      </a:schemeClr>
+    </dgm:linClrLst>
+    <dgm:effectClrLst/>
+    <dgm:txLinClrLst/>
+    <dgm:txFillClrLst/>
+    <dgm:txEffectClrLst/>
+  </dgm:styleLbl>
+  <dgm:styleLbl name="bgSibTrans2D1">
+    <dgm:fillClrLst meth="repeat">
+      <a:schemeClr val="accent1">
+        <a:tint val="60000"/>
+      </a:schemeClr>
+    </dgm:fillClrLst>
+    <dgm:linClrLst meth="repeat">
+      <a:schemeClr val="accent1">
+        <a:tint val="60000"/>
+      </a:schemeClr>
+    </dgm:linClrLst>
+    <dgm:effectClrLst/>
+    <dgm:txLinClrLst/>
+    <dgm:txFillClrLst/>
+    <dgm:txEffectClrLst/>
+  </dgm:styleLbl>
+  <dgm:styleLbl name="sibTrans1D1">
+    <dgm:fillClrLst meth="repeat">
+      <a:schemeClr val="accent1"/>
+    </dgm:fillClrLst>
+    <dgm:linClrLst meth="repeat">
+      <a:schemeClr val="accent1"/>
+    </dgm:linClrLst>
+    <dgm:effectClrLst/>
+    <dgm:txLinClrLst/>
+    <dgm:txFillClrLst meth="repeat">
+      <a:schemeClr val="tx1"/>
+    </dgm:txFillClrLst>
+    <dgm:txEffectClrLst/>
+  </dgm:styleLbl>
+  <dgm:styleLbl name="callout">
+    <dgm:fillClrLst meth="repeat">
+      <a:schemeClr val="accent1"/>
+    </dgm:fillClrLst>
+    <dgm:linClrLst meth="repeat">
+      <a:schemeClr val="accent1">
+        <a:tint val="50000"/>
+      </a:schemeClr>
+    </dgm:linClrLst>
+    <dgm:effectClrLst/>
+    <dgm:txLinClrLst/>
+    <dgm:txFillClrLst meth="repeat">
+      <a:schemeClr val="tx1"/>
+    </dgm:txFillClrLst>
+    <dgm:txEffectClrLst/>
+  </dgm:styleLbl>
+  <dgm:styleLbl name="asst0">
+    <dgm:fillClrLst meth="repeat">
+      <a:schemeClr val="accent1"/>
+    </dgm:fillClrLst>
+    <dgm:linClrLst meth="repeat">
+      <a:schemeClr val="lt1"/>
+    </dgm:linClrLst>
+    <dgm:effectClrLst/>
+    <dgm:txLinClrLst/>
+    <dgm:txFillClrLst/>
+    <dgm:txEffectClrLst/>
+  </dgm:styleLbl>
+  <dgm:styleLbl name="asst1">
+    <dgm:fillClrLst meth="repeat">
+      <a:schemeClr val="accent1"/>
+    </dgm:fillClrLst>
+    <dgm:linClrLst meth="repeat">
+      <a:schemeClr val="lt1"/>
+    </dgm:linClrLst>
+    <dgm:effectClrLst/>
+    <dgm:txLinClrLst/>
+    <dgm:txFillClrLst/>
+    <dgm:txEffectClrLst/>
+  </dgm:styleLbl>
+  <dgm:styleLbl name="asst2">
+    <dgm:fillClrLst meth="repeat">
+      <a:schemeClr val="accent1"/>
+    </dgm:fillClrLst>
+    <dgm:linClrLst meth="repeat">
+      <a:schemeClr val="lt1"/>
+    </dgm:linClrLst>
+    <dgm:effectClrLst/>
+    <dgm:txLinClrLst/>
+    <dgm:txFillClrLst/>
+    <dgm:txEffectClrLst/>
+  </dgm:styleLbl>
+  <dgm:styleLbl name="asst3">
+    <dgm:fillClrLst meth="repeat">
+      <a:schemeClr val="accent1"/>
+    </dgm:fillClrLst>
+    <dgm:linClrLst meth="repeat">
+      <a:schemeClr val="lt1"/>
+    </dgm:linClrLst>
+    <dgm:effectClrLst/>
+    <dgm:txLinClrLst/>
+    <dgm:txFillClrLst/>
+    <dgm:txEffectClrLst/>
+  </dgm:styleLbl>
+  <dgm:styleLbl name="asst4">
+    <dgm:fillClrLst meth="repeat">
+      <a:schemeClr val="accent1"/>
+    </dgm:fillClrLst>
+    <dgm:linClrLst meth="repeat">
+      <a:schemeClr val="lt1"/>
+    </dgm:linClrLst>
+    <dgm:effectClrLst/>
+    <dgm:txLinClrLst/>
+    <dgm:txFillClrLst/>
+    <dgm:txEffectClrLst/>
+  </dgm:styleLbl>
+  <dgm:styleLbl name="parChTrans2D1">
+    <dgm:fillClrLst meth="repeat">
+      <a:schemeClr val="accent1">
+        <a:tint val="60000"/>
+      </a:schemeClr>
+    </dgm:fillClrLst>
+    <dgm:linClrLst meth="repeat">
+      <a:schemeClr val="accent1">
+        <a:tint val="60000"/>
+      </a:schemeClr>
+    </dgm:linClrLst>
+    <dgm:effectClrLst/>
+    <dgm:txLinClrLst/>
+    <dgm:txFillClrLst meth="repeat">
+      <a:schemeClr val="lt1"/>
+    </dgm:txFillClrLst>
+    <dgm:txEffectClrLst/>
+  </dgm:styleLbl>
+  <dgm:styleLbl name="parChTrans2D2">
+    <dgm:fillClrLst meth="repeat">
+      <a:schemeClr val="accent1"/>
+    </dgm:fillClrLst>
+    <dgm:linClrLst meth="repeat">
+      <a:schemeClr val="accent1"/>
+    </dgm:linClrLst>
+    <dgm:effectClrLst/>
+    <dgm:txLinClrLst/>
+    <dgm:txFillClrLst meth="repeat">
+      <a:schemeClr val="lt1"/>
+    </dgm:txFillClrLst>
+    <dgm:txEffectClrLst/>
+  </dgm:styleLbl>
+  <dgm:styleLbl name="parChTrans2D3">
+    <dgm:fillClrLst meth="repeat">
+      <a:schemeClr val="accent1"/>
+    </dgm:fillClrLst>
+    <dgm:linClrLst meth="repeat">
+      <a:schemeClr val="accent1"/>
+    </dgm:linClrLst>
+    <dgm:effectClrLst/>
+    <dgm:txLinClrLst/>
+    <dgm:txFillClrLst meth="repeat">
+      <a:schemeClr val="lt1"/>
+    </dgm:txFillClrLst>
+    <dgm:txEffectClrLst/>
+  </dgm:styleLbl>
+  <dgm:styleLbl name="parChTrans2D4">
+    <dgm:fillClrLst meth="repeat">
+      <a:schemeClr val="accent1"/>
+    </dgm:fillClrLst>
+    <dgm:linClrLst meth="repeat">
+      <a:schemeClr val="accent1"/>
+    </dgm:linClrLst>
+    <dgm:effectClrLst/>
+    <dgm:txLinClrLst/>
+    <dgm:txFillClrLst meth="repeat">
+      <a:schemeClr val="lt1"/>
+    </dgm:txFillClrLst>
+    <dgm:txEffectClrLst/>
+  </dgm:styleLbl>
+  <dgm:styleLbl name="parChTrans1D1">
+    <dgm:fillClrLst meth="repeat">
+      <a:schemeClr val="accent1"/>
+    </dgm:fillClrLst>
+    <dgm:linClrLst meth="repeat">
+      <a:schemeClr val="accent1">
+        <a:shade val="60000"/>
+      </a:schemeClr>
+    </dgm:linClrLst>
+    <dgm:effectClrLst/>
+    <dgm:txLinClrLst/>
+    <dgm:txFillClrLst meth="repeat">
+      <a:schemeClr val="tx1"/>
+    </dgm:txFillClrLst>
+    <dgm:txEffectClrLst/>
+  </dgm:styleLbl>
+  <dgm:styleLbl name="parChTrans1D2">
+    <dgm:fillClrLst meth="repeat">
+      <a:schemeClr val="accent1"/>
+    </dgm:fillClrLst>
+    <dgm:linClrLst meth="repeat">
+      <a:schemeClr val="accent1">
+        <a:shade val="60000"/>
+      </a:schemeClr>
+    </dgm:linClrLst>
+    <dgm:effectClrLst/>
+    <dgm:txLinClrLst/>
+    <dgm:txFillClrLst meth="repeat">
+      <a:schemeClr val="tx1"/>
+    </dgm:txFillClrLst>
+    <dgm:txEffectClrLst/>
+  </dgm:styleLbl>
+  <dgm:styleLbl name="parChTrans1D3">
+    <dgm:fillClrLst meth="repeat">
+      <a:schemeClr val="accent1"/>
+    </dgm:fillClrLst>
+    <dgm:linClrLst meth="repeat">
+      <a:schemeClr val="accent1">
+        <a:shade val="80000"/>
+      </a:schemeClr>
+    </dgm:linClrLst>
+    <dgm:effectClrLst/>
+    <dgm:txLinClrLst/>
+    <dgm:txFillClrLst meth="repeat">
+      <a:schemeClr val="tx1"/>
+    </dgm:txFillClrLst>
+    <dgm:txEffectClrLst/>
+  </dgm:styleLbl>
+  <dgm:styleLbl name="parChTrans1D4">
+    <dgm:fillClrLst meth="repeat">
+      <a:schemeClr val="accent1"/>
+    </dgm:fillClrLst>
+    <dgm:linClrLst meth="repeat">
+      <a:schemeClr val="accent1">
+        <a:shade val="80000"/>
+      </a:schemeClr>
+    </dgm:linClrLst>
+    <dgm:effectClrLst/>
+    <dgm:txLinClrLst/>
+    <dgm:txFillClrLst meth="repeat">
+      <a:schemeClr val="tx1"/>
+    </dgm:txFillClrLst>
+    <dgm:txEffectClrLst/>
+  </dgm:styleLbl>
+  <dgm:styleLbl name="fgAcc1">
+    <dgm:fillClrLst meth="repeat">
+      <a:schemeClr val="lt1">
+        <a:alpha val="90000"/>
+      </a:schemeClr>
+    </dgm:fillClrLst>
+    <dgm:linClrLst meth="repeat">
+      <a:schemeClr val="accent1"/>
+    </dgm:linClrLst>
+    <dgm:effectClrLst/>
+    <dgm:txLinClrLst/>
+    <dgm:txFillClrLst meth="repeat">
+      <a:schemeClr val="dk1"/>
+    </dgm:txFillClrLst>
+    <dgm:txEffectClrLst/>
+  </dgm:styleLbl>
+  <dgm:styleLbl name="conFgAcc1">
+    <dgm:fillClrLst meth="repeat">
+      <a:schemeClr val="lt1">
+        <a:alpha val="90000"/>
+      </a:schemeClr>
+    </dgm:fillClrLst>
+    <dgm:linClrLst meth="repeat">
+      <a:schemeClr val="accent1"/>
+    </dgm:linClrLst>
+    <dgm:effectClrLst/>
+    <dgm:txLinClrLst/>
+    <dgm:txFillClrLst meth="repeat">
+      <a:schemeClr val="dk1"/>
+    </dgm:txFillClrLst>
+    <dgm:txEffectClrLst/>
+  </dgm:styleLbl>
+  <dgm:styleLbl name="alignAcc1">
+    <dgm:fillClrLst meth="repeat">
+      <a:schemeClr val="lt1">
+        <a:alpha val="90000"/>
+      </a:schemeClr>
+    </dgm:fillClrLst>
+    <dgm:linClrLst meth="repeat">
+      <a:schemeClr val="accent1"/>
+    </dgm:linClrLst>
+    <dgm:effectClrLst/>
+    <dgm:txLinClrLst/>
+    <dgm:txFillClrLst meth="repeat">
+      <a:schemeClr val="dk1"/>
+    </dgm:txFillClrLst>
+    <dgm:txEffectClrLst/>
+  </dgm:styleLbl>
+  <dgm:styleLbl name="trAlignAcc1">
+    <dgm:fillClrLst meth="repeat">
+      <a:schemeClr val="lt1">
+        <a:alpha val="40000"/>
+      </a:schemeClr>
+    </dgm:fillClrLst>
+    <dgm:linClrLst meth="repeat">
+      <a:schemeClr val="accent1"/>
+    </dgm:linClrLst>
+    <dgm:effectClrLst/>
+    <dgm:txLinClrLst/>
+    <dgm:txFillClrLst meth="repeat">
+      <a:schemeClr val="dk1"/>
+    </dgm:txFillClrLst>
+    <dgm:txEffectClrLst/>
+  </dgm:styleLbl>
+  <dgm:styleLbl name="bgAcc1">
+    <dgm:fillClrLst meth="repeat">
+      <a:schemeClr val="lt1">
+        <a:alpha val="90000"/>
+      </a:schemeClr>
+    </dgm:fillClrLst>
+    <dgm:linClrLst meth="repeat">
+      <a:schemeClr val="accent1"/>
+    </dgm:linClrLst>
+    <dgm:effectClrLst/>
+    <dgm:txLinClrLst/>
+    <dgm:txFillClrLst meth="repeat">
+      <a:schemeClr val="dk1"/>
+    </dgm:txFillClrLst>
+    <dgm:txEffectClrLst/>
+  </dgm:styleLbl>
+  <dgm:styleLbl name="solidFgAcc1">
+    <dgm:fillClrLst meth="repeat">
+      <a:schemeClr val="lt1"/>
+    </dgm:fillClrLst>
+    <dgm:linClrLst meth="repeat">
+      <a:schemeClr val="accent1"/>
+    </dgm:linClrLst>
+    <dgm:effectClrLst/>
+    <dgm:txLinClrLst/>
+    <dgm:txFillClrLst meth="repeat">
+      <a:schemeClr val="dk1"/>
+    </dgm:txFillClrLst>
+    <dgm:txEffectClrLst/>
+  </dgm:styleLbl>
+  <dgm:styleLbl name="solidAlignAcc1">
+    <dgm:fillClrLst meth="repeat">
+      <a:schemeClr val="lt1"/>
+    </dgm:fillClrLst>
+    <dgm:linClrLst meth="repeat">
+      <a:schemeClr val="accent1"/>
+    </dgm:linClrLst>
+    <dgm:effectClrLst/>
+    <dgm:txLinClrLst/>
+    <dgm:txFillClrLst meth="repeat">
+      <a:schemeClr val="dk1"/>
+    </dgm:txFillClrLst>
+    <dgm:txEffectClrLst/>
+  </dgm:styleLbl>
+  <dgm:styleLbl name="solidBgAcc1">
+    <dgm:fillClrLst meth="repeat">
+      <a:schemeClr val="lt1"/>
+    </dgm:fillClrLst>
+    <dgm:linClrLst meth="repeat">
+      <a:schemeClr val="accent1"/>
+    </dgm:linClrLst>
+    <dgm:effectClrLst/>
+    <dgm:txLinClrLst/>
+    <dgm:txFillClrLst meth="repeat">
+      <a:schemeClr val="dk1"/>
+    </dgm:txFillClrLst>
+    <dgm:txEffectClrLst/>
+  </dgm:styleLbl>
+  <dgm:styleLbl name="fgAccFollowNode1">
+    <dgm:fillClrLst meth="repeat">
+      <a:schemeClr val="accent1">
+        <a:alpha val="90000"/>
+        <a:tint val="40000"/>
+      </a:schemeClr>
+    </dgm:fillClrLst>
+    <dgm:linClrLst meth="repeat">
+      <a:schemeClr val="accent1">
+        <a:alpha val="90000"/>
+        <a:tint val="40000"/>
+      </a:schemeClr>
+    </dgm:linClrLst>
+    <dgm:effectClrLst/>
+    <dgm:txLinClrLst/>
+    <dgm:txFillClrLst meth="repeat">
+      <a:schemeClr val="dk1"/>
+    </dgm:txFillClrLst>
+    <dgm:txEffectClrLst/>
+  </dgm:styleLbl>
+  <dgm:styleLbl name="alignAccFollowNode1">
+    <dgm:fillClrLst meth="repeat">
+      <a:schemeClr val="accent1">
+        <a:alpha val="90000"/>
+        <a:tint val="40000"/>
+      </a:schemeClr>
+    </dgm:fillClrLst>
+    <dgm:linClrLst meth="repeat">
+      <a:schemeClr val="accent1">
+        <a:alpha val="90000"/>
+        <a:tint val="40000"/>
+      </a:schemeClr>
+    </dgm:linClrLst>
+    <dgm:effectClrLst/>
+    <dgm:txLinClrLst/>
+    <dgm:txFillClrLst meth="repeat">
+      <a:schemeClr val="dk1"/>
+    </dgm:txFillClrLst>
+    <dgm:txEffectClrLst/>
+  </dgm:styleLbl>
+  <dgm:styleLbl name="bgAccFollowNode1">
+    <dgm:fillClrLst meth="repeat">
+      <a:schemeClr val="accent1">
+        <a:alpha val="90000"/>
+        <a:tint val="40000"/>
+      </a:schemeClr>
+    </dgm:fillClrLst>
+    <dgm:linClrLst meth="repeat">
+      <a:schemeClr val="accent1">
+        <a:alpha val="90000"/>
+        <a:tint val="40000"/>
+      </a:schemeClr>
+    </dgm:linClrLst>
+    <dgm:effectClrLst/>
+    <dgm:txLinClrLst/>
+    <dgm:txFillClrLst meth="repeat">
+      <a:schemeClr val="dk1"/>
+    </dgm:txFillClrLst>
+    <dgm:txEffectClrLst/>
+  </dgm:styleLbl>
+  <dgm:styleLbl name="fgAcc0">
+    <dgm:fillClrLst meth="repeat">
+      <a:schemeClr val="lt1">
+        <a:alpha val="90000"/>
+      </a:schemeClr>
+    </dgm:fillClrLst>
+    <dgm:linClrLst meth="repeat">
+      <a:schemeClr val="accent1"/>
+    </dgm:linClrLst>
+    <dgm:effectClrLst/>
+    <dgm:txLinClrLst/>
+    <dgm:txFillClrLst meth="repeat">
+      <a:schemeClr val="dk1"/>
+    </dgm:txFillClrLst>
+    <dgm:txEffectClrLst/>
+  </dgm:styleLbl>
+  <dgm:styleLbl name="fgAcc2">
+    <dgm:fillClrLst meth="repeat">
+      <a:schemeClr val="lt1">
+        <a:alpha val="90000"/>
+      </a:schemeClr>
+    </dgm:fillClrLst>
+    <dgm:linClrLst meth="repeat">
+      <a:schemeClr val="accent1"/>
+    </dgm:linClrLst>
+    <dgm:effectClrLst/>
+    <dgm:txLinClrLst/>
+    <dgm:txFillClrLst meth="repeat">
+      <a:schemeClr val="dk1"/>
+    </dgm:txFillClrLst>
+    <dgm:txEffectClrLst/>
+  </dgm:styleLbl>
+  <dgm:styleLbl name="fgAcc3">
+    <dgm:fillClrLst meth="repeat">
+      <a:schemeClr val="lt1">
+        <a:alpha val="90000"/>
+      </a:schemeClr>
+    </dgm:fillClrLst>
+    <dgm:linClrLst meth="repeat">
+      <a:schemeClr val="accent1"/>
+    </dgm:linClrLst>
+    <dgm:effectClrLst/>
+    <dgm:txLinClrLst/>
+    <dgm:txFillClrLst meth="repeat">
+      <a:schemeClr val="dk1"/>
+    </dgm:txFillClrLst>
+    <dgm:txEffectClrLst/>
+  </dgm:styleLbl>
+  <dgm:styleLbl name="fgAcc4">
+    <dgm:fillClrLst meth="repeat">
+      <a:schemeClr val="lt1">
+        <a:alpha val="90000"/>
+      </a:schemeClr>
+    </dgm:fillClrLst>
+    <dgm:linClrLst meth="repeat">
+      <a:schemeClr val="accent1"/>
+    </dgm:linClrLst>
+    <dgm:effectClrLst/>
+    <dgm:txLinClrLst/>
+    <dgm:txFillClrLst meth="repeat">
+      <a:schemeClr val="dk1"/>
+    </dgm:txFillClrLst>
+    <dgm:txEffectClrLst/>
+  </dgm:styleLbl>
+  <dgm:styleLbl name="bgShp">
+    <dgm:fillClrLst meth="repeat">
+      <a:schemeClr val="accent1">
+        <a:tint val="40000"/>
+      </a:schemeClr>
+    </dgm:fillClrLst>
+    <dgm:linClrLst meth="repeat">
+      <a:schemeClr val="accent1"/>
+    </dgm:linClrLst>
+    <dgm:effectClrLst/>
+    <dgm:txLinClrLst/>
+    <dgm:txFillClrLst meth="repeat">
+      <a:schemeClr val="dk1"/>
+    </dgm:txFillClrLst>
+    <dgm:txEffectClrLst/>
+  </dgm:styleLbl>
+  <dgm:styleLbl name="dkBgShp">
+    <dgm:fillClrLst meth="repeat">
+      <a:schemeClr val="accent1">
+        <a:shade val="80000"/>
+      </a:schemeClr>
+    </dgm:fillClrLst>
+    <dgm:linClrLst meth="repeat">
+      <a:schemeClr val="accent1"/>
+    </dgm:linClrLst>
+    <dgm:effectClrLst/>
+    <dgm:txLinClrLst/>
+    <dgm:txFillClrLst meth="repeat">
+      <a:schemeClr val="lt1"/>
+    </dgm:txFillClrLst>
+    <dgm:txEffectClrLst/>
+  </dgm:styleLbl>
+  <dgm:styleLbl name="trBgShp">
+    <dgm:fillClrLst meth="repeat">
+      <a:schemeClr val="accent1">
+        <a:tint val="50000"/>
+        <a:alpha val="40000"/>
+      </a:schemeClr>
+    </dgm:fillClrLst>
+    <dgm:linClrLst meth="repeat">
+      <a:schemeClr val="accent1"/>
+    </dgm:linClrLst>
+    <dgm:effectClrLst/>
+    <dgm:txLinClrLst/>
+    <dgm:txFillClrLst meth="repeat">
+      <a:schemeClr val="lt1"/>
+    </dgm:txFillClrLst>
+    <dgm:txEffectClrLst/>
+  </dgm:styleLbl>
+  <dgm:styleLbl name="fgShp">
+    <dgm:fillClrLst meth="repeat">
+      <a:schemeClr val="accent1">
+        <a:tint val="60000"/>
+      </a:schemeClr>
+    </dgm:fillClrLst>
+    <dgm:linClrLst meth="repeat">
+      <a:schemeClr val="lt1"/>
+    </dgm:linClrLst>
+    <dgm:effectClrLst/>
+    <dgm:txLinClrLst/>
+    <dgm:txFillClrLst meth="repeat">
+      <a:schemeClr val="dk1"/>
+    </dgm:txFillClrLst>
+    <dgm:txEffectClrLst/>
+  </dgm:styleLbl>
+  <dgm:styleLbl name="revTx">
+    <dgm:fillClrLst meth="repeat">
+      <a:schemeClr val="lt1">
+        <a:alpha val="0"/>
+      </a:schemeClr>
+    </dgm:fillClrLst>
+    <dgm:linClrLst meth="repeat">
+      <a:schemeClr val="dk1">
+        <a:alpha val="0"/>
+      </a:schemeClr>
+    </dgm:linClrLst>
+    <dgm:effectClrLst/>
+    <dgm:txLinClrLst/>
+    <dgm:txFillClrLst meth="repeat">
+      <a:schemeClr val="tx1"/>
+    </dgm:txFillClrLst>
+    <dgm:txEffectClrLst/>
+  </dgm:styleLbl>
+</dgm:colorsDef>
+</file>
+
+<file path=ppt/diagrams/colors2.xml><?xml version="1.0" encoding="utf-8"?>
 <dgm:colorsDef xmlns:dgm="http://schemas.openxmlformats.org/drawingml/2006/diagram" xmlns:a="http://schemas.openxmlformats.org/drawingml/2006/main" uniqueId="urn:microsoft.com/office/officeart/2005/8/colors/accent1_2">
   <dgm:title val=""/>
   <dgm:desc val=""/>
@@ -1092,6 +1843,826 @@
     <dgm:cxn modelId="{E8AADE18-88C7-4B45-AB6F-0E8090BAD17E}" type="presParOf" srcId="{A6A70661-75BE-4A29-808D-2449FE9964DF}" destId="{A7EA31E3-8CB2-4511-8634-C3E124405FE9}" srcOrd="4" destOrd="0" presId="urn:microsoft.com/office/officeart/2005/8/layout/hierarchy4"/>
     <dgm:cxn modelId="{8A874093-DE79-4132-A0B8-AA6FBC8A28FC}" type="presParOf" srcId="{A7EA31E3-8CB2-4511-8634-C3E124405FE9}" destId="{6A7E53BA-A5D5-4F3E-8DD1-980100761517}" srcOrd="0" destOrd="0" presId="urn:microsoft.com/office/officeart/2005/8/layout/hierarchy4"/>
     <dgm:cxn modelId="{40150577-447A-4B77-9A89-17233325679E}" type="presParOf" srcId="{A7EA31E3-8CB2-4511-8634-C3E124405FE9}" destId="{1E634C14-7275-4662-872E-F8DED712C89D}" srcOrd="1" destOrd="0" presId="urn:microsoft.com/office/officeart/2005/8/layout/hierarchy4"/>
+  </dgm:cxnLst>
+  <dgm:bg/>
+  <dgm:whole/>
+  <dgm:extLst>
+    <a:ext uri="http://schemas.microsoft.com/office/drawing/2008/diagram">
+      <dsp:dataModelExt xmlns:dsp="http://schemas.microsoft.com/office/drawing/2008/diagram" relId="rId6" minVer="http://schemas.openxmlformats.org/drawingml/2006/diagram"/>
+    </a:ext>
+  </dgm:extLst>
+</dgm:dataModel>
+</file>
+
+<file path=ppt/diagrams/data2.xml><?xml version="1.0" encoding="utf-8"?>
+<dgm:dataModel xmlns:dgm="http://schemas.openxmlformats.org/drawingml/2006/diagram" xmlns:a="http://schemas.openxmlformats.org/drawingml/2006/main">
+  <dgm:ptLst>
+    <dgm:pt modelId="{84B9C4E8-648A-4888-A20D-5B749F585C69}" type="doc">
+      <dgm:prSet loTypeId="urn:microsoft.com/office/officeart/2005/8/layout/lProcess2" loCatId="list" qsTypeId="urn:microsoft.com/office/officeart/2005/8/quickstyle/simple1" qsCatId="simple" csTypeId="urn:microsoft.com/office/officeart/2005/8/colors/accent1_2" csCatId="accent1" phldr="1"/>
+      <dgm:spPr/>
+      <dgm:t>
+        <a:bodyPr/>
+        <a:lstStyle/>
+        <a:p>
+          <a:endParaRPr lang="en-US"/>
+        </a:p>
+      </dgm:t>
+    </dgm:pt>
+    <dgm:pt modelId="{A65E4D98-42B5-4FD0-9B82-30FB0C7F36A4}">
+      <dgm:prSet phldrT="[Текст]"/>
+      <dgm:spPr/>
+      <dgm:t>
+        <a:bodyPr/>
+        <a:lstStyle/>
+        <a:p>
+          <a:r>
+            <a:rPr lang="en-US" dirty="0"/>
+            <a:t>Database</a:t>
+          </a:r>
+        </a:p>
+      </dgm:t>
+    </dgm:pt>
+    <dgm:pt modelId="{A845DA81-BA93-4DFC-A96A-C45DE010F06B}" type="parTrans" cxnId="{83C43987-6D65-4741-8EDB-AD672E4AE3B3}">
+      <dgm:prSet/>
+      <dgm:spPr/>
+      <dgm:t>
+        <a:bodyPr/>
+        <a:lstStyle/>
+        <a:p>
+          <a:endParaRPr lang="en-US"/>
+        </a:p>
+      </dgm:t>
+    </dgm:pt>
+    <dgm:pt modelId="{60D8BDDB-7940-4E63-B2A3-47B26317F090}" type="sibTrans" cxnId="{83C43987-6D65-4741-8EDB-AD672E4AE3B3}">
+      <dgm:prSet/>
+      <dgm:spPr/>
+      <dgm:t>
+        <a:bodyPr/>
+        <a:lstStyle/>
+        <a:p>
+          <a:endParaRPr lang="en-US"/>
+        </a:p>
+      </dgm:t>
+    </dgm:pt>
+    <dgm:pt modelId="{5E71B0E8-7E9C-4C38-A7D8-26978987A81F}">
+      <dgm:prSet phldrT="[Текст]"/>
+      <dgm:spPr/>
+      <dgm:t>
+        <a:bodyPr/>
+        <a:lstStyle/>
+        <a:p>
+          <a:r>
+            <a:rPr lang="ru-RU" dirty="0"/>
+            <a:t>Аутентификация</a:t>
+          </a:r>
+          <a:endParaRPr lang="en-US" dirty="0"/>
+        </a:p>
+      </dgm:t>
+    </dgm:pt>
+    <dgm:pt modelId="{FE44F377-34CD-4CE2-9AAA-ED7810E5770C}" type="parTrans" cxnId="{8B415F8D-DB6E-402D-BB3C-7CE4292D9033}">
+      <dgm:prSet/>
+      <dgm:spPr/>
+      <dgm:t>
+        <a:bodyPr/>
+        <a:lstStyle/>
+        <a:p>
+          <a:endParaRPr lang="en-US"/>
+        </a:p>
+      </dgm:t>
+    </dgm:pt>
+    <dgm:pt modelId="{0E4F7B04-8035-4D03-A335-06B3C9377965}" type="sibTrans" cxnId="{8B415F8D-DB6E-402D-BB3C-7CE4292D9033}">
+      <dgm:prSet/>
+      <dgm:spPr/>
+      <dgm:t>
+        <a:bodyPr/>
+        <a:lstStyle/>
+        <a:p>
+          <a:endParaRPr lang="en-US"/>
+        </a:p>
+      </dgm:t>
+    </dgm:pt>
+    <dgm:pt modelId="{FB31080D-97C7-408E-A8B9-CD15C84E049B}">
+      <dgm:prSet phldrT="[Текст]"/>
+      <dgm:spPr/>
+      <dgm:t>
+        <a:bodyPr/>
+        <a:lstStyle/>
+        <a:p>
+          <a:r>
+            <a:rPr lang="en-US" dirty="0"/>
+            <a:t>Unit of Work</a:t>
+          </a:r>
+        </a:p>
+      </dgm:t>
+    </dgm:pt>
+    <dgm:pt modelId="{83540F75-5E9B-4C64-85FA-FB7059C83B32}" type="parTrans" cxnId="{6EFB9073-FAC4-4CD5-A3A5-040234A5ADC9}">
+      <dgm:prSet/>
+      <dgm:spPr/>
+      <dgm:t>
+        <a:bodyPr/>
+        <a:lstStyle/>
+        <a:p>
+          <a:endParaRPr lang="en-US"/>
+        </a:p>
+      </dgm:t>
+    </dgm:pt>
+    <dgm:pt modelId="{DE993050-8EB7-4570-A88A-7F249186C7C3}" type="sibTrans" cxnId="{6EFB9073-FAC4-4CD5-A3A5-040234A5ADC9}">
+      <dgm:prSet/>
+      <dgm:spPr/>
+      <dgm:t>
+        <a:bodyPr/>
+        <a:lstStyle/>
+        <a:p>
+          <a:endParaRPr lang="en-US"/>
+        </a:p>
+      </dgm:t>
+    </dgm:pt>
+    <dgm:pt modelId="{05C39CDB-925A-4471-9F15-4B875B08BD08}">
+      <dgm:prSet phldrT="[Текст]"/>
+      <dgm:spPr/>
+      <dgm:t>
+        <a:bodyPr/>
+        <a:lstStyle/>
+        <a:p>
+          <a:r>
+            <a:rPr lang="en-US" dirty="0" err="1"/>
+            <a:t>ViewModels</a:t>
+          </a:r>
+          <a:r>
+            <a:rPr lang="en-US" dirty="0"/>
+            <a:t> </a:t>
+          </a:r>
+          <a:r>
+            <a:rPr lang="ru-RU" dirty="0"/>
+            <a:t>маппинг</a:t>
+          </a:r>
+          <a:endParaRPr lang="en-US" dirty="0"/>
+        </a:p>
+      </dgm:t>
+    </dgm:pt>
+    <dgm:pt modelId="{F3C6BC15-30EA-4E04-B738-9498AE9CA338}" type="parTrans" cxnId="{E0DAE9E3-8990-41DA-A5A9-94E457138323}">
+      <dgm:prSet/>
+      <dgm:spPr/>
+      <dgm:t>
+        <a:bodyPr/>
+        <a:lstStyle/>
+        <a:p>
+          <a:endParaRPr lang="en-US"/>
+        </a:p>
+      </dgm:t>
+    </dgm:pt>
+    <dgm:pt modelId="{3CF5DF33-25EB-4A72-AC24-B97FE9DFFB58}" type="sibTrans" cxnId="{E0DAE9E3-8990-41DA-A5A9-94E457138323}">
+      <dgm:prSet/>
+      <dgm:spPr/>
+      <dgm:t>
+        <a:bodyPr/>
+        <a:lstStyle/>
+        <a:p>
+          <a:endParaRPr lang="en-US"/>
+        </a:p>
+      </dgm:t>
+    </dgm:pt>
+    <dgm:pt modelId="{4811143C-B21F-432A-91C7-94249AA22AF1}">
+      <dgm:prSet phldrT="[Текст]"/>
+      <dgm:spPr/>
+      <dgm:t>
+        <a:bodyPr/>
+        <a:lstStyle/>
+        <a:p>
+          <a:r>
+            <a:rPr lang="en-US" dirty="0"/>
+            <a:t>Validation</a:t>
+          </a:r>
+        </a:p>
+      </dgm:t>
+    </dgm:pt>
+    <dgm:pt modelId="{DA5519E8-DE07-4AB5-9C00-9956624B7812}" type="parTrans" cxnId="{89B7FBBB-076C-448D-8CEB-111D889FA8F8}">
+      <dgm:prSet/>
+      <dgm:spPr/>
+      <dgm:t>
+        <a:bodyPr/>
+        <a:lstStyle/>
+        <a:p>
+          <a:endParaRPr lang="en-US"/>
+        </a:p>
+      </dgm:t>
+    </dgm:pt>
+    <dgm:pt modelId="{49B0BD23-4859-4B36-86F2-AA78F333CD08}" type="sibTrans" cxnId="{89B7FBBB-076C-448D-8CEB-111D889FA8F8}">
+      <dgm:prSet/>
+      <dgm:spPr/>
+      <dgm:t>
+        <a:bodyPr/>
+        <a:lstStyle/>
+        <a:p>
+          <a:endParaRPr lang="en-US"/>
+        </a:p>
+      </dgm:t>
+    </dgm:pt>
+    <dgm:pt modelId="{F4F37017-240F-4506-AA78-FEB796E246A6}">
+      <dgm:prSet phldrT="[Текст]"/>
+      <dgm:spPr/>
+      <dgm:t>
+        <a:bodyPr/>
+        <a:lstStyle/>
+        <a:p>
+          <a:r>
+            <a:rPr lang="en-US" dirty="0" err="1"/>
+            <a:t>ViewModels</a:t>
+          </a:r>
+          <a:r>
+            <a:rPr lang="en-US" dirty="0"/>
+            <a:t> Factory</a:t>
+          </a:r>
+        </a:p>
+      </dgm:t>
+    </dgm:pt>
+    <dgm:pt modelId="{10763682-7D4E-4FEA-AA7C-F1E33EDF536B}" type="parTrans" cxnId="{6D6B7B4D-7D11-4D3F-9A41-57A5216EBD3F}">
+      <dgm:prSet/>
+      <dgm:spPr/>
+      <dgm:t>
+        <a:bodyPr/>
+        <a:lstStyle/>
+        <a:p>
+          <a:endParaRPr lang="en-US"/>
+        </a:p>
+      </dgm:t>
+    </dgm:pt>
+    <dgm:pt modelId="{BBF74C7F-5CE8-42A2-8F1E-F6CAE14D7C5A}" type="sibTrans" cxnId="{6D6B7B4D-7D11-4D3F-9A41-57A5216EBD3F}">
+      <dgm:prSet/>
+      <dgm:spPr/>
+      <dgm:t>
+        <a:bodyPr/>
+        <a:lstStyle/>
+        <a:p>
+          <a:endParaRPr lang="en-US"/>
+        </a:p>
+      </dgm:t>
+    </dgm:pt>
+    <dgm:pt modelId="{0140805E-F52C-4BC4-9BFF-C5B838155DC1}">
+      <dgm:prSet phldrT="[Текст]"/>
+      <dgm:spPr/>
+      <dgm:t>
+        <a:bodyPr/>
+        <a:lstStyle/>
+        <a:p>
+          <a:r>
+            <a:rPr lang="en-US" dirty="0"/>
+            <a:t>Security</a:t>
+          </a:r>
+        </a:p>
+      </dgm:t>
+    </dgm:pt>
+    <dgm:pt modelId="{BE85E8DE-D063-45D2-BF7D-240C7D1CE60B}" type="sibTrans" cxnId="{A0CB5E1D-A28A-4F7E-9A34-0BD0235BC917}">
+      <dgm:prSet/>
+      <dgm:spPr/>
+      <dgm:t>
+        <a:bodyPr/>
+        <a:lstStyle/>
+        <a:p>
+          <a:endParaRPr lang="en-US"/>
+        </a:p>
+      </dgm:t>
+    </dgm:pt>
+    <dgm:pt modelId="{9E2B5F1C-808D-47EF-92D2-941E9E8E5B5B}" type="parTrans" cxnId="{A0CB5E1D-A28A-4F7E-9A34-0BD0235BC917}">
+      <dgm:prSet/>
+      <dgm:spPr/>
+      <dgm:t>
+        <a:bodyPr/>
+        <a:lstStyle/>
+        <a:p>
+          <a:endParaRPr lang="en-US"/>
+        </a:p>
+      </dgm:t>
+    </dgm:pt>
+    <dgm:pt modelId="{B1668A86-3C4B-493B-A636-BB913CBAEB2D}">
+      <dgm:prSet phldrT="[Текст]"/>
+      <dgm:spPr/>
+      <dgm:t>
+        <a:bodyPr/>
+        <a:lstStyle/>
+        <a:p>
+          <a:r>
+            <a:rPr lang="ru-RU" dirty="0"/>
+            <a:t>Авторизация</a:t>
+          </a:r>
+          <a:endParaRPr lang="en-US" dirty="0"/>
+        </a:p>
+      </dgm:t>
+    </dgm:pt>
+    <dgm:pt modelId="{B4718CF2-4221-4C98-A10C-0B24447ED80A}" type="parTrans" cxnId="{ABC7B2F5-9495-493C-B3B1-D4372EDC2F0E}">
+      <dgm:prSet/>
+      <dgm:spPr/>
+      <dgm:t>
+        <a:bodyPr/>
+        <a:lstStyle/>
+        <a:p>
+          <a:endParaRPr lang="en-US"/>
+        </a:p>
+      </dgm:t>
+    </dgm:pt>
+    <dgm:pt modelId="{E2584C7B-00C2-4B60-BCA2-3B0EEBECB7C7}" type="sibTrans" cxnId="{ABC7B2F5-9495-493C-B3B1-D4372EDC2F0E}">
+      <dgm:prSet/>
+      <dgm:spPr/>
+      <dgm:t>
+        <a:bodyPr/>
+        <a:lstStyle/>
+        <a:p>
+          <a:endParaRPr lang="en-US"/>
+        </a:p>
+      </dgm:t>
+    </dgm:pt>
+    <dgm:pt modelId="{21511798-85A8-4850-A1C5-3016D9F0847C}">
+      <dgm:prSet phldrT="[Текст]"/>
+      <dgm:spPr/>
+      <dgm:t>
+        <a:bodyPr/>
+        <a:lstStyle/>
+        <a:p>
+          <a:r>
+            <a:rPr lang="en-US" dirty="0"/>
+            <a:t>Seeding</a:t>
+          </a:r>
+        </a:p>
+      </dgm:t>
+    </dgm:pt>
+    <dgm:pt modelId="{49D12F66-BB9E-4542-B5D7-1B7ED44E6150}" type="parTrans" cxnId="{1FFD7357-D4A0-4104-AE6E-65C2C8330C8C}">
+      <dgm:prSet/>
+      <dgm:spPr/>
+    </dgm:pt>
+    <dgm:pt modelId="{0D0E5A85-C5AF-45BE-BE42-D53871475FAF}" type="sibTrans" cxnId="{1FFD7357-D4A0-4104-AE6E-65C2C8330C8C}">
+      <dgm:prSet/>
+      <dgm:spPr/>
+    </dgm:pt>
+    <dgm:pt modelId="{D65C2845-8496-4DE6-850E-ECEAC15AAF77}">
+      <dgm:prSet phldrT="[Текст]"/>
+      <dgm:spPr/>
+      <dgm:t>
+        <a:bodyPr/>
+        <a:lstStyle/>
+        <a:p>
+          <a:r>
+            <a:rPr lang="en-US" dirty="0"/>
+            <a:t>EF Core</a:t>
+          </a:r>
+        </a:p>
+      </dgm:t>
+    </dgm:pt>
+    <dgm:pt modelId="{3ADD7006-2133-4132-BB35-69BB97A622DD}" type="parTrans" cxnId="{49DB7828-7B57-4CAC-8713-CF3E0FCA379D}">
+      <dgm:prSet/>
+      <dgm:spPr/>
+    </dgm:pt>
+    <dgm:pt modelId="{62BBE532-0A5B-4811-AC67-25A4CFF45F2D}" type="sibTrans" cxnId="{49DB7828-7B57-4CAC-8713-CF3E0FCA379D}">
+      <dgm:prSet/>
+      <dgm:spPr/>
+    </dgm:pt>
+    <dgm:pt modelId="{27CA6EBD-9844-44CA-BA8B-5AF3C956764B}">
+      <dgm:prSet phldrT="[Текст]"/>
+      <dgm:spPr/>
+      <dgm:t>
+        <a:bodyPr/>
+        <a:lstStyle/>
+        <a:p>
+          <a:r>
+            <a:rPr lang="en-US" dirty="0" err="1"/>
+            <a:t>Guid</a:t>
+          </a:r>
+          <a:r>
+            <a:rPr lang="en-US" dirty="0"/>
+            <a:t> Identity</a:t>
+          </a:r>
+        </a:p>
+      </dgm:t>
+    </dgm:pt>
+    <dgm:pt modelId="{AA4D348C-E185-40F2-8B8A-E266AF72E5B9}" type="parTrans" cxnId="{63F3B5AE-982B-41FE-9013-A0A07BBA1540}">
+      <dgm:prSet/>
+      <dgm:spPr/>
+    </dgm:pt>
+    <dgm:pt modelId="{51FC84AC-1BA6-40DF-B3AA-5DEDBD6C56CF}" type="sibTrans" cxnId="{63F3B5AE-982B-41FE-9013-A0A07BBA1540}">
+      <dgm:prSet/>
+      <dgm:spPr/>
+    </dgm:pt>
+    <dgm:pt modelId="{E0F48746-8283-4BA2-9084-E8F597E4D35E}">
+      <dgm:prSet phldrT="[Текст]"/>
+      <dgm:spPr/>
+      <dgm:t>
+        <a:bodyPr/>
+        <a:lstStyle/>
+        <a:p>
+          <a:r>
+            <a:rPr lang="en-US" dirty="0"/>
+            <a:t>Server standalone</a:t>
+          </a:r>
+        </a:p>
+      </dgm:t>
+    </dgm:pt>
+    <dgm:pt modelId="{48A6DE6F-799E-46DE-9C5F-06FE1CFFC059}" type="parTrans" cxnId="{2B529FD5-BAA5-4758-A23B-F636F2B445F9}">
+      <dgm:prSet/>
+      <dgm:spPr/>
+    </dgm:pt>
+    <dgm:pt modelId="{00478234-13D5-4E09-9C48-599CB5FA58DB}" type="sibTrans" cxnId="{2B529FD5-BAA5-4758-A23B-F636F2B445F9}">
+      <dgm:prSet/>
+      <dgm:spPr/>
+    </dgm:pt>
+    <dgm:pt modelId="{D513D802-04DE-442B-9E38-33BA0BAEB759}">
+      <dgm:prSet phldrT="[Текст]"/>
+      <dgm:spPr/>
+      <dgm:t>
+        <a:bodyPr/>
+        <a:lstStyle/>
+        <a:p>
+          <a:r>
+            <a:rPr lang="en-US" dirty="0"/>
+            <a:t>Repository</a:t>
+          </a:r>
+        </a:p>
+      </dgm:t>
+    </dgm:pt>
+    <dgm:pt modelId="{E8B152F6-B548-49A6-AFEF-29C41A1DE877}" type="parTrans" cxnId="{1A34519C-1C89-41EB-B030-6ADD0793E06F}">
+      <dgm:prSet/>
+      <dgm:spPr/>
+    </dgm:pt>
+    <dgm:pt modelId="{8890E2ED-8BC1-40DC-9836-485164229B50}" type="sibTrans" cxnId="{1A34519C-1C89-41EB-B030-6ADD0793E06F}">
+      <dgm:prSet/>
+      <dgm:spPr/>
+    </dgm:pt>
+    <dgm:pt modelId="{719CB649-C9CF-41C4-A762-648A16F35F31}">
+      <dgm:prSet phldrT="[Текст]"/>
+      <dgm:spPr/>
+      <dgm:t>
+        <a:bodyPr/>
+        <a:lstStyle/>
+        <a:p>
+          <a:r>
+            <a:rPr lang="en-US" dirty="0"/>
+            <a:t>Transactions</a:t>
+          </a:r>
+        </a:p>
+      </dgm:t>
+    </dgm:pt>
+    <dgm:pt modelId="{746232F1-83C0-46AE-987B-0E034DAEA452}" type="parTrans" cxnId="{0DEB6C0C-8332-4823-9075-AFEA3B762C4B}">
+      <dgm:prSet/>
+      <dgm:spPr/>
+    </dgm:pt>
+    <dgm:pt modelId="{07D6F5CB-7BAE-4740-95CC-B82B91E83AF6}" type="sibTrans" cxnId="{0DEB6C0C-8332-4823-9075-AFEA3B762C4B}">
+      <dgm:prSet/>
+      <dgm:spPr/>
+    </dgm:pt>
+    <dgm:pt modelId="{66009A50-9DF5-4703-87FD-3F7EDF06FA92}">
+      <dgm:prSet phldrT="[Текст]"/>
+      <dgm:spPr/>
+      <dgm:t>
+        <a:bodyPr/>
+        <a:lstStyle/>
+        <a:p>
+          <a:r>
+            <a:rPr lang="en-US" dirty="0"/>
+            <a:t>Last Error Tracking</a:t>
+          </a:r>
+        </a:p>
+      </dgm:t>
+    </dgm:pt>
+    <dgm:pt modelId="{8157CFA3-0DD6-4599-B749-56A2A26EC17C}" type="parTrans" cxnId="{3F785C9A-428B-4062-88FD-0D163F6608BA}">
+      <dgm:prSet/>
+      <dgm:spPr/>
+    </dgm:pt>
+    <dgm:pt modelId="{2F5F550B-3E7F-4324-B33F-A43E88B97D82}" type="sibTrans" cxnId="{3F785C9A-428B-4062-88FD-0D163F6608BA}">
+      <dgm:prSet/>
+      <dgm:spPr/>
+    </dgm:pt>
+    <dgm:pt modelId="{46469CEC-CD07-4BF4-8E2D-BF40A8E0E302}">
+      <dgm:prSet phldrT="[Текст]"/>
+      <dgm:spPr/>
+      <dgm:t>
+        <a:bodyPr/>
+        <a:lstStyle/>
+        <a:p>
+          <a:r>
+            <a:rPr lang="en-US" dirty="0"/>
+            <a:t>Entity Projections</a:t>
+          </a:r>
+        </a:p>
+      </dgm:t>
+    </dgm:pt>
+    <dgm:pt modelId="{04F84F77-A383-44DF-9B01-AA2D10F1943D}" type="parTrans" cxnId="{584989D8-9946-4A48-BFC8-A97C2821454D}">
+      <dgm:prSet/>
+      <dgm:spPr/>
+    </dgm:pt>
+    <dgm:pt modelId="{97CADCBF-1CCA-4790-A557-40C7DFD85E37}" type="sibTrans" cxnId="{584989D8-9946-4A48-BFC8-A97C2821454D}">
+      <dgm:prSet/>
+      <dgm:spPr/>
+    </dgm:pt>
+    <dgm:pt modelId="{FFFC3DC0-68EC-4ACB-BC03-695BF1F217E1}" type="pres">
+      <dgm:prSet presAssocID="{84B9C4E8-648A-4888-A20D-5B749F585C69}" presName="theList" presStyleCnt="0">
+        <dgm:presLayoutVars>
+          <dgm:dir/>
+          <dgm:animLvl val="lvl"/>
+          <dgm:resizeHandles val="exact"/>
+        </dgm:presLayoutVars>
+      </dgm:prSet>
+      <dgm:spPr/>
+    </dgm:pt>
+    <dgm:pt modelId="{4397A9C0-B251-4D85-BF2B-10ABD3AA2802}" type="pres">
+      <dgm:prSet presAssocID="{A65E4D98-42B5-4FD0-9B82-30FB0C7F36A4}" presName="compNode" presStyleCnt="0"/>
+      <dgm:spPr/>
+    </dgm:pt>
+    <dgm:pt modelId="{73523260-114B-42E5-BD4D-243108EE47C0}" type="pres">
+      <dgm:prSet presAssocID="{A65E4D98-42B5-4FD0-9B82-30FB0C7F36A4}" presName="aNode" presStyleLbl="bgShp" presStyleIdx="0" presStyleCnt="4"/>
+      <dgm:spPr/>
+    </dgm:pt>
+    <dgm:pt modelId="{F59BD54C-87D2-481E-BD52-E6D9A0AFDAD1}" type="pres">
+      <dgm:prSet presAssocID="{A65E4D98-42B5-4FD0-9B82-30FB0C7F36A4}" presName="textNode" presStyleLbl="bgShp" presStyleIdx="0" presStyleCnt="4"/>
+      <dgm:spPr/>
+    </dgm:pt>
+    <dgm:pt modelId="{30B49131-BF26-49D1-B08B-BE7DC274C6C0}" type="pres">
+      <dgm:prSet presAssocID="{A65E4D98-42B5-4FD0-9B82-30FB0C7F36A4}" presName="compChildNode" presStyleCnt="0"/>
+      <dgm:spPr/>
+    </dgm:pt>
+    <dgm:pt modelId="{2B410BE5-1FBD-4481-9AD7-E1A1561A58FF}" type="pres">
+      <dgm:prSet presAssocID="{A65E4D98-42B5-4FD0-9B82-30FB0C7F36A4}" presName="theInnerList" presStyleCnt="0"/>
+      <dgm:spPr/>
+    </dgm:pt>
+    <dgm:pt modelId="{5E533CA6-AF2E-42AB-9D67-EFD200DA4EC7}" type="pres">
+      <dgm:prSet presAssocID="{D65C2845-8496-4DE6-850E-ECEAC15AAF77}" presName="childNode" presStyleLbl="node1" presStyleIdx="0" presStyleCnt="12">
+        <dgm:presLayoutVars>
+          <dgm:bulletEnabled val="1"/>
+        </dgm:presLayoutVars>
+      </dgm:prSet>
+      <dgm:spPr/>
+    </dgm:pt>
+    <dgm:pt modelId="{BBCDD343-DE6E-4399-A011-80A033787D71}" type="pres">
+      <dgm:prSet presAssocID="{D65C2845-8496-4DE6-850E-ECEAC15AAF77}" presName="aSpace2" presStyleCnt="0"/>
+      <dgm:spPr/>
+    </dgm:pt>
+    <dgm:pt modelId="{19E31F85-2DC3-4E20-9FD1-E6B2D7483510}" type="pres">
+      <dgm:prSet presAssocID="{21511798-85A8-4850-A1C5-3016D9F0847C}" presName="childNode" presStyleLbl="node1" presStyleIdx="1" presStyleCnt="12">
+        <dgm:presLayoutVars>
+          <dgm:bulletEnabled val="1"/>
+        </dgm:presLayoutVars>
+      </dgm:prSet>
+      <dgm:spPr/>
+    </dgm:pt>
+    <dgm:pt modelId="{19754018-37A4-4CC3-8D13-1BFE371C122F}" type="pres">
+      <dgm:prSet presAssocID="{21511798-85A8-4850-A1C5-3016D9F0847C}" presName="aSpace2" presStyleCnt="0"/>
+      <dgm:spPr/>
+    </dgm:pt>
+    <dgm:pt modelId="{12D57310-13DC-44B8-BE34-B0833B14C081}" type="pres">
+      <dgm:prSet presAssocID="{27CA6EBD-9844-44CA-BA8B-5AF3C956764B}" presName="childNode" presStyleLbl="node1" presStyleIdx="2" presStyleCnt="12">
+        <dgm:presLayoutVars>
+          <dgm:bulletEnabled val="1"/>
+        </dgm:presLayoutVars>
+      </dgm:prSet>
+      <dgm:spPr/>
+    </dgm:pt>
+    <dgm:pt modelId="{1C3E5E8A-F1A4-405B-BA6B-47B2B888090B}" type="pres">
+      <dgm:prSet presAssocID="{A65E4D98-42B5-4FD0-9B82-30FB0C7F36A4}" presName="aSpace" presStyleCnt="0"/>
+      <dgm:spPr/>
+    </dgm:pt>
+    <dgm:pt modelId="{B46476F7-5845-4DFD-ADD1-95CBD733B743}" type="pres">
+      <dgm:prSet presAssocID="{0140805E-F52C-4BC4-9BFF-C5B838155DC1}" presName="compNode" presStyleCnt="0"/>
+      <dgm:spPr/>
+    </dgm:pt>
+    <dgm:pt modelId="{52F23154-3697-4391-A364-07BCD0CE3EE9}" type="pres">
+      <dgm:prSet presAssocID="{0140805E-F52C-4BC4-9BFF-C5B838155DC1}" presName="aNode" presStyleLbl="bgShp" presStyleIdx="1" presStyleCnt="4"/>
+      <dgm:spPr/>
+    </dgm:pt>
+    <dgm:pt modelId="{F7B2BEB2-1927-44C7-829F-31F78381ED3F}" type="pres">
+      <dgm:prSet presAssocID="{0140805E-F52C-4BC4-9BFF-C5B838155DC1}" presName="textNode" presStyleLbl="bgShp" presStyleIdx="1" presStyleCnt="4"/>
+      <dgm:spPr/>
+    </dgm:pt>
+    <dgm:pt modelId="{29228385-84A4-4649-9922-7FAA390DFD6B}" type="pres">
+      <dgm:prSet presAssocID="{0140805E-F52C-4BC4-9BFF-C5B838155DC1}" presName="compChildNode" presStyleCnt="0"/>
+      <dgm:spPr/>
+    </dgm:pt>
+    <dgm:pt modelId="{CDE1887F-CD30-462B-80F8-5028C3418FF8}" type="pres">
+      <dgm:prSet presAssocID="{0140805E-F52C-4BC4-9BFF-C5B838155DC1}" presName="theInnerList" presStyleCnt="0"/>
+      <dgm:spPr/>
+    </dgm:pt>
+    <dgm:pt modelId="{57F33471-CFFC-44B9-93DE-C12939B4E507}" type="pres">
+      <dgm:prSet presAssocID="{5E71B0E8-7E9C-4C38-A7D8-26978987A81F}" presName="childNode" presStyleLbl="node1" presStyleIdx="3" presStyleCnt="12">
+        <dgm:presLayoutVars>
+          <dgm:bulletEnabled val="1"/>
+        </dgm:presLayoutVars>
+      </dgm:prSet>
+      <dgm:spPr/>
+    </dgm:pt>
+    <dgm:pt modelId="{9B45BD45-4FC9-4246-BB2C-0C278228ADED}" type="pres">
+      <dgm:prSet presAssocID="{5E71B0E8-7E9C-4C38-A7D8-26978987A81F}" presName="aSpace2" presStyleCnt="0"/>
+      <dgm:spPr/>
+    </dgm:pt>
+    <dgm:pt modelId="{52FD6CE4-6F48-4388-9DB8-03CEEDC22262}" type="pres">
+      <dgm:prSet presAssocID="{B1668A86-3C4B-493B-A636-BB913CBAEB2D}" presName="childNode" presStyleLbl="node1" presStyleIdx="4" presStyleCnt="12">
+        <dgm:presLayoutVars>
+          <dgm:bulletEnabled val="1"/>
+        </dgm:presLayoutVars>
+      </dgm:prSet>
+      <dgm:spPr/>
+    </dgm:pt>
+    <dgm:pt modelId="{87F42FFF-5D85-4A5A-8488-D0892621D02D}" type="pres">
+      <dgm:prSet presAssocID="{B1668A86-3C4B-493B-A636-BB913CBAEB2D}" presName="aSpace2" presStyleCnt="0"/>
+      <dgm:spPr/>
+    </dgm:pt>
+    <dgm:pt modelId="{6F8DF17A-9F62-448B-A4F5-6BC0F60955FE}" type="pres">
+      <dgm:prSet presAssocID="{E0F48746-8283-4BA2-9084-E8F597E4D35E}" presName="childNode" presStyleLbl="node1" presStyleIdx="5" presStyleCnt="12">
+        <dgm:presLayoutVars>
+          <dgm:bulletEnabled val="1"/>
+        </dgm:presLayoutVars>
+      </dgm:prSet>
+      <dgm:spPr/>
+    </dgm:pt>
+    <dgm:pt modelId="{7A5F1DAE-48E1-4B43-BC40-0E71007A00F0}" type="pres">
+      <dgm:prSet presAssocID="{0140805E-F52C-4BC4-9BFF-C5B838155DC1}" presName="aSpace" presStyleCnt="0"/>
+      <dgm:spPr/>
+    </dgm:pt>
+    <dgm:pt modelId="{9F6C9BC1-27DB-48CA-9FA0-F817C75708FC}" type="pres">
+      <dgm:prSet presAssocID="{FB31080D-97C7-408E-A8B9-CD15C84E049B}" presName="compNode" presStyleCnt="0"/>
+      <dgm:spPr/>
+    </dgm:pt>
+    <dgm:pt modelId="{A5796A7F-DB83-44F8-AAA7-8945FFA93698}" type="pres">
+      <dgm:prSet presAssocID="{FB31080D-97C7-408E-A8B9-CD15C84E049B}" presName="aNode" presStyleLbl="bgShp" presStyleIdx="2" presStyleCnt="4"/>
+      <dgm:spPr/>
+    </dgm:pt>
+    <dgm:pt modelId="{B56A3856-18D7-4772-8F24-143C228C4318}" type="pres">
+      <dgm:prSet presAssocID="{FB31080D-97C7-408E-A8B9-CD15C84E049B}" presName="textNode" presStyleLbl="bgShp" presStyleIdx="2" presStyleCnt="4"/>
+      <dgm:spPr/>
+    </dgm:pt>
+    <dgm:pt modelId="{5A280A97-D114-4F22-A4E4-7132C2DDD856}" type="pres">
+      <dgm:prSet presAssocID="{FB31080D-97C7-408E-A8B9-CD15C84E049B}" presName="compChildNode" presStyleCnt="0"/>
+      <dgm:spPr/>
+    </dgm:pt>
+    <dgm:pt modelId="{D731F7A7-AAF3-4BAD-B066-E6D27F1D4DF7}" type="pres">
+      <dgm:prSet presAssocID="{FB31080D-97C7-408E-A8B9-CD15C84E049B}" presName="theInnerList" presStyleCnt="0"/>
+      <dgm:spPr/>
+    </dgm:pt>
+    <dgm:pt modelId="{F369A42B-D21E-40EC-A8FE-C26885465649}" type="pres">
+      <dgm:prSet presAssocID="{D513D802-04DE-442B-9E38-33BA0BAEB759}" presName="childNode" presStyleLbl="node1" presStyleIdx="6" presStyleCnt="12">
+        <dgm:presLayoutVars>
+          <dgm:bulletEnabled val="1"/>
+        </dgm:presLayoutVars>
+      </dgm:prSet>
+      <dgm:spPr/>
+    </dgm:pt>
+    <dgm:pt modelId="{97B27BEF-CF73-44D3-A0AA-5167382A9894}" type="pres">
+      <dgm:prSet presAssocID="{D513D802-04DE-442B-9E38-33BA0BAEB759}" presName="aSpace2" presStyleCnt="0"/>
+      <dgm:spPr/>
+    </dgm:pt>
+    <dgm:pt modelId="{1C3D7EE4-E6F2-4A3E-9F1F-0A814086FC51}" type="pres">
+      <dgm:prSet presAssocID="{719CB649-C9CF-41C4-A762-648A16F35F31}" presName="childNode" presStyleLbl="node1" presStyleIdx="7" presStyleCnt="12">
+        <dgm:presLayoutVars>
+          <dgm:bulletEnabled val="1"/>
+        </dgm:presLayoutVars>
+      </dgm:prSet>
+      <dgm:spPr/>
+    </dgm:pt>
+    <dgm:pt modelId="{0F4E694C-8E21-4686-BE01-E18C9BE38CAB}" type="pres">
+      <dgm:prSet presAssocID="{719CB649-C9CF-41C4-A762-648A16F35F31}" presName="aSpace2" presStyleCnt="0"/>
+      <dgm:spPr/>
+    </dgm:pt>
+    <dgm:pt modelId="{BAC3E807-8A05-496E-BD46-C39F1042334D}" type="pres">
+      <dgm:prSet presAssocID="{66009A50-9DF5-4703-87FD-3F7EDF06FA92}" presName="childNode" presStyleLbl="node1" presStyleIdx="8" presStyleCnt="12">
+        <dgm:presLayoutVars>
+          <dgm:bulletEnabled val="1"/>
+        </dgm:presLayoutVars>
+      </dgm:prSet>
+      <dgm:spPr/>
+    </dgm:pt>
+    <dgm:pt modelId="{7DBC2A56-F43E-4661-974E-B06A893EAC3D}" type="pres">
+      <dgm:prSet presAssocID="{FB31080D-97C7-408E-A8B9-CD15C84E049B}" presName="aSpace" presStyleCnt="0"/>
+      <dgm:spPr/>
+    </dgm:pt>
+    <dgm:pt modelId="{54E837A4-DE17-4395-A671-1FB12D4F5E5F}" type="pres">
+      <dgm:prSet presAssocID="{46469CEC-CD07-4BF4-8E2D-BF40A8E0E302}" presName="compNode" presStyleCnt="0"/>
+      <dgm:spPr/>
+    </dgm:pt>
+    <dgm:pt modelId="{2EB024A8-945B-41BB-9D54-996E7307A6F1}" type="pres">
+      <dgm:prSet presAssocID="{46469CEC-CD07-4BF4-8E2D-BF40A8E0E302}" presName="aNode" presStyleLbl="bgShp" presStyleIdx="3" presStyleCnt="4"/>
+      <dgm:spPr/>
+    </dgm:pt>
+    <dgm:pt modelId="{928E6A33-CB30-45E0-9145-34B63B324E29}" type="pres">
+      <dgm:prSet presAssocID="{46469CEC-CD07-4BF4-8E2D-BF40A8E0E302}" presName="textNode" presStyleLbl="bgShp" presStyleIdx="3" presStyleCnt="4"/>
+      <dgm:spPr/>
+    </dgm:pt>
+    <dgm:pt modelId="{AB8C1C46-AC99-4278-B746-55BE47A48EB2}" type="pres">
+      <dgm:prSet presAssocID="{46469CEC-CD07-4BF4-8E2D-BF40A8E0E302}" presName="compChildNode" presStyleCnt="0"/>
+      <dgm:spPr/>
+    </dgm:pt>
+    <dgm:pt modelId="{70775E33-CAF5-49AC-A4B6-7351AF4CAE3B}" type="pres">
+      <dgm:prSet presAssocID="{46469CEC-CD07-4BF4-8E2D-BF40A8E0E302}" presName="theInnerList" presStyleCnt="0"/>
+      <dgm:spPr/>
+    </dgm:pt>
+    <dgm:pt modelId="{70BFDDE2-E9BE-4400-85DF-5F0B3A6F9B38}" type="pres">
+      <dgm:prSet presAssocID="{05C39CDB-925A-4471-9F15-4B875B08BD08}" presName="childNode" presStyleLbl="node1" presStyleIdx="9" presStyleCnt="12">
+        <dgm:presLayoutVars>
+          <dgm:bulletEnabled val="1"/>
+        </dgm:presLayoutVars>
+      </dgm:prSet>
+      <dgm:spPr/>
+    </dgm:pt>
+    <dgm:pt modelId="{4368468E-5754-40AD-ACC4-46FD8BA26B1F}" type="pres">
+      <dgm:prSet presAssocID="{05C39CDB-925A-4471-9F15-4B875B08BD08}" presName="aSpace2" presStyleCnt="0"/>
+      <dgm:spPr/>
+    </dgm:pt>
+    <dgm:pt modelId="{6872B8CE-F3A0-437B-A311-F44124D1D31D}" type="pres">
+      <dgm:prSet presAssocID="{4811143C-B21F-432A-91C7-94249AA22AF1}" presName="childNode" presStyleLbl="node1" presStyleIdx="10" presStyleCnt="12">
+        <dgm:presLayoutVars>
+          <dgm:bulletEnabled val="1"/>
+        </dgm:presLayoutVars>
+      </dgm:prSet>
+      <dgm:spPr/>
+    </dgm:pt>
+    <dgm:pt modelId="{B6C2E39C-E819-4F72-8ED2-DCFE0B6AF1E0}" type="pres">
+      <dgm:prSet presAssocID="{4811143C-B21F-432A-91C7-94249AA22AF1}" presName="aSpace2" presStyleCnt="0"/>
+      <dgm:spPr/>
+    </dgm:pt>
+    <dgm:pt modelId="{273743E1-518E-49E8-91AE-4A168C508C13}" type="pres">
+      <dgm:prSet presAssocID="{F4F37017-240F-4506-AA78-FEB796E246A6}" presName="childNode" presStyleLbl="node1" presStyleIdx="11" presStyleCnt="12">
+        <dgm:presLayoutVars>
+          <dgm:bulletEnabled val="1"/>
+        </dgm:presLayoutVars>
+      </dgm:prSet>
+      <dgm:spPr/>
+    </dgm:pt>
+  </dgm:ptLst>
+  <dgm:cxnLst>
+    <dgm:cxn modelId="{9A24C301-EA6B-4FF0-9E0A-5566DD27D288}" type="presOf" srcId="{E0F48746-8283-4BA2-9084-E8F597E4D35E}" destId="{6F8DF17A-9F62-448B-A4F5-6BC0F60955FE}" srcOrd="0" destOrd="0" presId="urn:microsoft.com/office/officeart/2005/8/layout/lProcess2"/>
+    <dgm:cxn modelId="{D1023B02-4C1D-4101-8009-D581B682B828}" type="presOf" srcId="{A65E4D98-42B5-4FD0-9B82-30FB0C7F36A4}" destId="{F59BD54C-87D2-481E-BD52-E6D9A0AFDAD1}" srcOrd="1" destOrd="0" presId="urn:microsoft.com/office/officeart/2005/8/layout/lProcess2"/>
+    <dgm:cxn modelId="{BF2CC208-5351-4FF4-87E1-F0FEEDB932BD}" type="presOf" srcId="{B1668A86-3C4B-493B-A636-BB913CBAEB2D}" destId="{52FD6CE4-6F48-4388-9DB8-03CEEDC22262}" srcOrd="0" destOrd="0" presId="urn:microsoft.com/office/officeart/2005/8/layout/lProcess2"/>
+    <dgm:cxn modelId="{A8083C09-9493-4BC1-AC92-B80EB5B8F618}" type="presOf" srcId="{A65E4D98-42B5-4FD0-9B82-30FB0C7F36A4}" destId="{73523260-114B-42E5-BD4D-243108EE47C0}" srcOrd="0" destOrd="0" presId="urn:microsoft.com/office/officeart/2005/8/layout/lProcess2"/>
+    <dgm:cxn modelId="{0DEB6C0C-8332-4823-9075-AFEA3B762C4B}" srcId="{FB31080D-97C7-408E-A8B9-CD15C84E049B}" destId="{719CB649-C9CF-41C4-A762-648A16F35F31}" srcOrd="1" destOrd="0" parTransId="{746232F1-83C0-46AE-987B-0E034DAEA452}" sibTransId="{07D6F5CB-7BAE-4740-95CC-B82B91E83AF6}"/>
+    <dgm:cxn modelId="{D283FB17-1895-40CA-B707-2ED95722F02B}" type="presOf" srcId="{66009A50-9DF5-4703-87FD-3F7EDF06FA92}" destId="{BAC3E807-8A05-496E-BD46-C39F1042334D}" srcOrd="0" destOrd="0" presId="urn:microsoft.com/office/officeart/2005/8/layout/lProcess2"/>
+    <dgm:cxn modelId="{65338A1A-989E-492F-91A0-8274250DDEDE}" type="presOf" srcId="{FB31080D-97C7-408E-A8B9-CD15C84E049B}" destId="{A5796A7F-DB83-44F8-AAA7-8945FFA93698}" srcOrd="0" destOrd="0" presId="urn:microsoft.com/office/officeart/2005/8/layout/lProcess2"/>
+    <dgm:cxn modelId="{A0CB5E1D-A28A-4F7E-9A34-0BD0235BC917}" srcId="{84B9C4E8-648A-4888-A20D-5B749F585C69}" destId="{0140805E-F52C-4BC4-9BFF-C5B838155DC1}" srcOrd="1" destOrd="0" parTransId="{9E2B5F1C-808D-47EF-92D2-941E9E8E5B5B}" sibTransId="{BE85E8DE-D063-45D2-BF7D-240C7D1CE60B}"/>
+    <dgm:cxn modelId="{5EB5FD23-23D3-4F9C-9230-876ACED4FCD3}" type="presOf" srcId="{84B9C4E8-648A-4888-A20D-5B749F585C69}" destId="{FFFC3DC0-68EC-4ACB-BC03-695BF1F217E1}" srcOrd="0" destOrd="0" presId="urn:microsoft.com/office/officeart/2005/8/layout/lProcess2"/>
+    <dgm:cxn modelId="{49DB7828-7B57-4CAC-8713-CF3E0FCA379D}" srcId="{A65E4D98-42B5-4FD0-9B82-30FB0C7F36A4}" destId="{D65C2845-8496-4DE6-850E-ECEAC15AAF77}" srcOrd="0" destOrd="0" parTransId="{3ADD7006-2133-4132-BB35-69BB97A622DD}" sibTransId="{62BBE532-0A5B-4811-AC67-25A4CFF45F2D}"/>
+    <dgm:cxn modelId="{599D952F-F361-4637-9FF1-46869A459C7E}" type="presOf" srcId="{4811143C-B21F-432A-91C7-94249AA22AF1}" destId="{6872B8CE-F3A0-437B-A311-F44124D1D31D}" srcOrd="0" destOrd="0" presId="urn:microsoft.com/office/officeart/2005/8/layout/lProcess2"/>
+    <dgm:cxn modelId="{880A8838-496E-4D10-A293-96CFF3C4B37C}" type="presOf" srcId="{46469CEC-CD07-4BF4-8E2D-BF40A8E0E302}" destId="{928E6A33-CB30-45E0-9145-34B63B324E29}" srcOrd="1" destOrd="0" presId="urn:microsoft.com/office/officeart/2005/8/layout/lProcess2"/>
+    <dgm:cxn modelId="{2B386867-1F69-4BA9-8937-131C3D15792C}" type="presOf" srcId="{21511798-85A8-4850-A1C5-3016D9F0847C}" destId="{19E31F85-2DC3-4E20-9FD1-E6B2D7483510}" srcOrd="0" destOrd="0" presId="urn:microsoft.com/office/officeart/2005/8/layout/lProcess2"/>
+    <dgm:cxn modelId="{297D4B6C-2E2E-484F-B30E-56C32FB298EB}" type="presOf" srcId="{05C39CDB-925A-4471-9F15-4B875B08BD08}" destId="{70BFDDE2-E9BE-4400-85DF-5F0B3A6F9B38}" srcOrd="0" destOrd="0" presId="urn:microsoft.com/office/officeart/2005/8/layout/lProcess2"/>
+    <dgm:cxn modelId="{6D6B7B4D-7D11-4D3F-9A41-57A5216EBD3F}" srcId="{46469CEC-CD07-4BF4-8E2D-BF40A8E0E302}" destId="{F4F37017-240F-4506-AA78-FEB796E246A6}" srcOrd="2" destOrd="0" parTransId="{10763682-7D4E-4FEA-AA7C-F1E33EDF536B}" sibTransId="{BBF74C7F-5CE8-42A2-8F1E-F6CAE14D7C5A}"/>
+    <dgm:cxn modelId="{CD188C73-ED6F-487B-896D-C882499EED69}" type="presOf" srcId="{46469CEC-CD07-4BF4-8E2D-BF40A8E0E302}" destId="{2EB024A8-945B-41BB-9D54-996E7307A6F1}" srcOrd="0" destOrd="0" presId="urn:microsoft.com/office/officeart/2005/8/layout/lProcess2"/>
+    <dgm:cxn modelId="{6EFB9073-FAC4-4CD5-A3A5-040234A5ADC9}" srcId="{84B9C4E8-648A-4888-A20D-5B749F585C69}" destId="{FB31080D-97C7-408E-A8B9-CD15C84E049B}" srcOrd="2" destOrd="0" parTransId="{83540F75-5E9B-4C64-85FA-FB7059C83B32}" sibTransId="{DE993050-8EB7-4570-A88A-7F249186C7C3}"/>
+    <dgm:cxn modelId="{3F544575-9EE0-4642-A0FA-F32CC34923E3}" type="presOf" srcId="{FB31080D-97C7-408E-A8B9-CD15C84E049B}" destId="{B56A3856-18D7-4772-8F24-143C228C4318}" srcOrd="1" destOrd="0" presId="urn:microsoft.com/office/officeart/2005/8/layout/lProcess2"/>
+    <dgm:cxn modelId="{1FFD7357-D4A0-4104-AE6E-65C2C8330C8C}" srcId="{A65E4D98-42B5-4FD0-9B82-30FB0C7F36A4}" destId="{21511798-85A8-4850-A1C5-3016D9F0847C}" srcOrd="1" destOrd="0" parTransId="{49D12F66-BB9E-4542-B5D7-1B7ED44E6150}" sibTransId="{0D0E5A85-C5AF-45BE-BE42-D53871475FAF}"/>
+    <dgm:cxn modelId="{10A8D47B-98BD-407C-B24F-F4E4FACC5B7C}" type="presOf" srcId="{D65C2845-8496-4DE6-850E-ECEAC15AAF77}" destId="{5E533CA6-AF2E-42AB-9D67-EFD200DA4EC7}" srcOrd="0" destOrd="0" presId="urn:microsoft.com/office/officeart/2005/8/layout/lProcess2"/>
+    <dgm:cxn modelId="{4A9F0580-3B16-4DF6-B552-C93744352C1D}" type="presOf" srcId="{27CA6EBD-9844-44CA-BA8B-5AF3C956764B}" destId="{12D57310-13DC-44B8-BE34-B0833B14C081}" srcOrd="0" destOrd="0" presId="urn:microsoft.com/office/officeart/2005/8/layout/lProcess2"/>
+    <dgm:cxn modelId="{A801AF84-AD61-4A90-B4DF-B21B703FBE0C}" type="presOf" srcId="{0140805E-F52C-4BC4-9BFF-C5B838155DC1}" destId="{F7B2BEB2-1927-44C7-829F-31F78381ED3F}" srcOrd="1" destOrd="0" presId="urn:microsoft.com/office/officeart/2005/8/layout/lProcess2"/>
+    <dgm:cxn modelId="{83C43987-6D65-4741-8EDB-AD672E4AE3B3}" srcId="{84B9C4E8-648A-4888-A20D-5B749F585C69}" destId="{A65E4D98-42B5-4FD0-9B82-30FB0C7F36A4}" srcOrd="0" destOrd="0" parTransId="{A845DA81-BA93-4DFC-A96A-C45DE010F06B}" sibTransId="{60D8BDDB-7940-4E63-B2A3-47B26317F090}"/>
+    <dgm:cxn modelId="{8B415F8D-DB6E-402D-BB3C-7CE4292D9033}" srcId="{0140805E-F52C-4BC4-9BFF-C5B838155DC1}" destId="{5E71B0E8-7E9C-4C38-A7D8-26978987A81F}" srcOrd="0" destOrd="0" parTransId="{FE44F377-34CD-4CE2-9AAA-ED7810E5770C}" sibTransId="{0E4F7B04-8035-4D03-A335-06B3C9377965}"/>
+    <dgm:cxn modelId="{3A5CD990-DEE3-4DE5-9034-0A0CE036952B}" type="presOf" srcId="{D513D802-04DE-442B-9E38-33BA0BAEB759}" destId="{F369A42B-D21E-40EC-A8FE-C26885465649}" srcOrd="0" destOrd="0" presId="urn:microsoft.com/office/officeart/2005/8/layout/lProcess2"/>
+    <dgm:cxn modelId="{778DB394-7725-46D2-9489-DC27E66C341D}" type="presOf" srcId="{F4F37017-240F-4506-AA78-FEB796E246A6}" destId="{273743E1-518E-49E8-91AE-4A168C508C13}" srcOrd="0" destOrd="0" presId="urn:microsoft.com/office/officeart/2005/8/layout/lProcess2"/>
+    <dgm:cxn modelId="{3F785C9A-428B-4062-88FD-0D163F6608BA}" srcId="{FB31080D-97C7-408E-A8B9-CD15C84E049B}" destId="{66009A50-9DF5-4703-87FD-3F7EDF06FA92}" srcOrd="2" destOrd="0" parTransId="{8157CFA3-0DD6-4599-B749-56A2A26EC17C}" sibTransId="{2F5F550B-3E7F-4324-B33F-A43E88B97D82}"/>
+    <dgm:cxn modelId="{1A34519C-1C89-41EB-B030-6ADD0793E06F}" srcId="{FB31080D-97C7-408E-A8B9-CD15C84E049B}" destId="{D513D802-04DE-442B-9E38-33BA0BAEB759}" srcOrd="0" destOrd="0" parTransId="{E8B152F6-B548-49A6-AFEF-29C41A1DE877}" sibTransId="{8890E2ED-8BC1-40DC-9836-485164229B50}"/>
+    <dgm:cxn modelId="{63F3B5AE-982B-41FE-9013-A0A07BBA1540}" srcId="{A65E4D98-42B5-4FD0-9B82-30FB0C7F36A4}" destId="{27CA6EBD-9844-44CA-BA8B-5AF3C956764B}" srcOrd="2" destOrd="0" parTransId="{AA4D348C-E185-40F2-8B8A-E266AF72E5B9}" sibTransId="{51FC84AC-1BA6-40DF-B3AA-5DEDBD6C56CF}"/>
+    <dgm:cxn modelId="{790E19AF-5FC5-4089-BF4F-220307638C21}" type="presOf" srcId="{5E71B0E8-7E9C-4C38-A7D8-26978987A81F}" destId="{57F33471-CFFC-44B9-93DE-C12939B4E507}" srcOrd="0" destOrd="0" presId="urn:microsoft.com/office/officeart/2005/8/layout/lProcess2"/>
+    <dgm:cxn modelId="{89B7FBBB-076C-448D-8CEB-111D889FA8F8}" srcId="{46469CEC-CD07-4BF4-8E2D-BF40A8E0E302}" destId="{4811143C-B21F-432A-91C7-94249AA22AF1}" srcOrd="1" destOrd="0" parTransId="{DA5519E8-DE07-4AB5-9C00-9956624B7812}" sibTransId="{49B0BD23-4859-4B36-86F2-AA78F333CD08}"/>
+    <dgm:cxn modelId="{2B529FD5-BAA5-4758-A23B-F636F2B445F9}" srcId="{0140805E-F52C-4BC4-9BFF-C5B838155DC1}" destId="{E0F48746-8283-4BA2-9084-E8F597E4D35E}" srcOrd="2" destOrd="0" parTransId="{48A6DE6F-799E-46DE-9C5F-06FE1CFFC059}" sibTransId="{00478234-13D5-4E09-9C48-599CB5FA58DB}"/>
+    <dgm:cxn modelId="{584989D8-9946-4A48-BFC8-A97C2821454D}" srcId="{84B9C4E8-648A-4888-A20D-5B749F585C69}" destId="{46469CEC-CD07-4BF4-8E2D-BF40A8E0E302}" srcOrd="3" destOrd="0" parTransId="{04F84F77-A383-44DF-9B01-AA2D10F1943D}" sibTransId="{97CADCBF-1CCA-4790-A557-40C7DFD85E37}"/>
+    <dgm:cxn modelId="{D9B666DB-5DF8-4463-8F4A-3FA8AED349E2}" type="presOf" srcId="{0140805E-F52C-4BC4-9BFF-C5B838155DC1}" destId="{52F23154-3697-4391-A364-07BCD0CE3EE9}" srcOrd="0" destOrd="0" presId="urn:microsoft.com/office/officeart/2005/8/layout/lProcess2"/>
+    <dgm:cxn modelId="{E0DAE9E3-8990-41DA-A5A9-94E457138323}" srcId="{46469CEC-CD07-4BF4-8E2D-BF40A8E0E302}" destId="{05C39CDB-925A-4471-9F15-4B875B08BD08}" srcOrd="0" destOrd="0" parTransId="{F3C6BC15-30EA-4E04-B738-9498AE9CA338}" sibTransId="{3CF5DF33-25EB-4A72-AC24-B97FE9DFFB58}"/>
+    <dgm:cxn modelId="{ABC7B2F5-9495-493C-B3B1-D4372EDC2F0E}" srcId="{0140805E-F52C-4BC4-9BFF-C5B838155DC1}" destId="{B1668A86-3C4B-493B-A636-BB913CBAEB2D}" srcOrd="1" destOrd="0" parTransId="{B4718CF2-4221-4C98-A10C-0B24447ED80A}" sibTransId="{E2584C7B-00C2-4B60-BCA2-3B0EEBECB7C7}"/>
+    <dgm:cxn modelId="{DA5A84FF-8347-4317-BCFA-7B4A3B414A62}" type="presOf" srcId="{719CB649-C9CF-41C4-A762-648A16F35F31}" destId="{1C3D7EE4-E6F2-4A3E-9F1F-0A814086FC51}" srcOrd="0" destOrd="0" presId="urn:microsoft.com/office/officeart/2005/8/layout/lProcess2"/>
+    <dgm:cxn modelId="{53AA5EE1-94F6-4C49-AFBA-C4C5C9EC5BA4}" type="presParOf" srcId="{FFFC3DC0-68EC-4ACB-BC03-695BF1F217E1}" destId="{4397A9C0-B251-4D85-BF2B-10ABD3AA2802}" srcOrd="0" destOrd="0" presId="urn:microsoft.com/office/officeart/2005/8/layout/lProcess2"/>
+    <dgm:cxn modelId="{38733BDA-C283-47E2-AC6A-860814DFA708}" type="presParOf" srcId="{4397A9C0-B251-4D85-BF2B-10ABD3AA2802}" destId="{73523260-114B-42E5-BD4D-243108EE47C0}" srcOrd="0" destOrd="0" presId="urn:microsoft.com/office/officeart/2005/8/layout/lProcess2"/>
+    <dgm:cxn modelId="{AE0F932C-90AC-42F4-9F04-FD8B5F68E506}" type="presParOf" srcId="{4397A9C0-B251-4D85-BF2B-10ABD3AA2802}" destId="{F59BD54C-87D2-481E-BD52-E6D9A0AFDAD1}" srcOrd="1" destOrd="0" presId="urn:microsoft.com/office/officeart/2005/8/layout/lProcess2"/>
+    <dgm:cxn modelId="{7408246A-D50B-43E8-87B6-B39171E0EB30}" type="presParOf" srcId="{4397A9C0-B251-4D85-BF2B-10ABD3AA2802}" destId="{30B49131-BF26-49D1-B08B-BE7DC274C6C0}" srcOrd="2" destOrd="0" presId="urn:microsoft.com/office/officeart/2005/8/layout/lProcess2"/>
+    <dgm:cxn modelId="{93593C68-68ED-4309-B2F3-5EDF606959D9}" type="presParOf" srcId="{30B49131-BF26-49D1-B08B-BE7DC274C6C0}" destId="{2B410BE5-1FBD-4481-9AD7-E1A1561A58FF}" srcOrd="0" destOrd="0" presId="urn:microsoft.com/office/officeart/2005/8/layout/lProcess2"/>
+    <dgm:cxn modelId="{8ABA2B64-2B63-4D90-A770-F93E87EB19B4}" type="presParOf" srcId="{2B410BE5-1FBD-4481-9AD7-E1A1561A58FF}" destId="{5E533CA6-AF2E-42AB-9D67-EFD200DA4EC7}" srcOrd="0" destOrd="0" presId="urn:microsoft.com/office/officeart/2005/8/layout/lProcess2"/>
+    <dgm:cxn modelId="{323251D8-FE34-427B-8DF5-C3F570E20F2F}" type="presParOf" srcId="{2B410BE5-1FBD-4481-9AD7-E1A1561A58FF}" destId="{BBCDD343-DE6E-4399-A011-80A033787D71}" srcOrd="1" destOrd="0" presId="urn:microsoft.com/office/officeart/2005/8/layout/lProcess2"/>
+    <dgm:cxn modelId="{240CE2DB-7632-4AD6-A11B-40BD7BF3FB12}" type="presParOf" srcId="{2B410BE5-1FBD-4481-9AD7-E1A1561A58FF}" destId="{19E31F85-2DC3-4E20-9FD1-E6B2D7483510}" srcOrd="2" destOrd="0" presId="urn:microsoft.com/office/officeart/2005/8/layout/lProcess2"/>
+    <dgm:cxn modelId="{4A39670B-80B7-4805-8EA4-E4A5DF1C7563}" type="presParOf" srcId="{2B410BE5-1FBD-4481-9AD7-E1A1561A58FF}" destId="{19754018-37A4-4CC3-8D13-1BFE371C122F}" srcOrd="3" destOrd="0" presId="urn:microsoft.com/office/officeart/2005/8/layout/lProcess2"/>
+    <dgm:cxn modelId="{32916C90-5CB5-490D-BE53-7ABE9A1C5332}" type="presParOf" srcId="{2B410BE5-1FBD-4481-9AD7-E1A1561A58FF}" destId="{12D57310-13DC-44B8-BE34-B0833B14C081}" srcOrd="4" destOrd="0" presId="urn:microsoft.com/office/officeart/2005/8/layout/lProcess2"/>
+    <dgm:cxn modelId="{6B3BF075-92D0-4CEC-AA9E-4C22BE058966}" type="presParOf" srcId="{FFFC3DC0-68EC-4ACB-BC03-695BF1F217E1}" destId="{1C3E5E8A-F1A4-405B-BA6B-47B2B888090B}" srcOrd="1" destOrd="0" presId="urn:microsoft.com/office/officeart/2005/8/layout/lProcess2"/>
+    <dgm:cxn modelId="{B3AE838F-59C0-48C8-A041-F4003BDF75EA}" type="presParOf" srcId="{FFFC3DC0-68EC-4ACB-BC03-695BF1F217E1}" destId="{B46476F7-5845-4DFD-ADD1-95CBD733B743}" srcOrd="2" destOrd="0" presId="urn:microsoft.com/office/officeart/2005/8/layout/lProcess2"/>
+    <dgm:cxn modelId="{B59CEDA2-3416-44D1-B8E8-91E820C8C70E}" type="presParOf" srcId="{B46476F7-5845-4DFD-ADD1-95CBD733B743}" destId="{52F23154-3697-4391-A364-07BCD0CE3EE9}" srcOrd="0" destOrd="0" presId="urn:microsoft.com/office/officeart/2005/8/layout/lProcess2"/>
+    <dgm:cxn modelId="{5170DDC8-92B2-466C-8E44-BE9F5D5504A6}" type="presParOf" srcId="{B46476F7-5845-4DFD-ADD1-95CBD733B743}" destId="{F7B2BEB2-1927-44C7-829F-31F78381ED3F}" srcOrd="1" destOrd="0" presId="urn:microsoft.com/office/officeart/2005/8/layout/lProcess2"/>
+    <dgm:cxn modelId="{47C42AC3-1AF9-4755-8756-8DED75873721}" type="presParOf" srcId="{B46476F7-5845-4DFD-ADD1-95CBD733B743}" destId="{29228385-84A4-4649-9922-7FAA390DFD6B}" srcOrd="2" destOrd="0" presId="urn:microsoft.com/office/officeart/2005/8/layout/lProcess2"/>
+    <dgm:cxn modelId="{DDB28B7E-4574-4DFC-8A53-DEAD50E78A2F}" type="presParOf" srcId="{29228385-84A4-4649-9922-7FAA390DFD6B}" destId="{CDE1887F-CD30-462B-80F8-5028C3418FF8}" srcOrd="0" destOrd="0" presId="urn:microsoft.com/office/officeart/2005/8/layout/lProcess2"/>
+    <dgm:cxn modelId="{DA0AAEB2-327B-4984-85CC-4C464F1BB1AD}" type="presParOf" srcId="{CDE1887F-CD30-462B-80F8-5028C3418FF8}" destId="{57F33471-CFFC-44B9-93DE-C12939B4E507}" srcOrd="0" destOrd="0" presId="urn:microsoft.com/office/officeart/2005/8/layout/lProcess2"/>
+    <dgm:cxn modelId="{62E1088A-F96C-4196-88DA-AD6A46E463A3}" type="presParOf" srcId="{CDE1887F-CD30-462B-80F8-5028C3418FF8}" destId="{9B45BD45-4FC9-4246-BB2C-0C278228ADED}" srcOrd="1" destOrd="0" presId="urn:microsoft.com/office/officeart/2005/8/layout/lProcess2"/>
+    <dgm:cxn modelId="{D8CFAFE2-9919-4673-B644-358948A169AB}" type="presParOf" srcId="{CDE1887F-CD30-462B-80F8-5028C3418FF8}" destId="{52FD6CE4-6F48-4388-9DB8-03CEEDC22262}" srcOrd="2" destOrd="0" presId="urn:microsoft.com/office/officeart/2005/8/layout/lProcess2"/>
+    <dgm:cxn modelId="{7DA68686-0433-4722-8175-E0059388A73C}" type="presParOf" srcId="{CDE1887F-CD30-462B-80F8-5028C3418FF8}" destId="{87F42FFF-5D85-4A5A-8488-D0892621D02D}" srcOrd="3" destOrd="0" presId="urn:microsoft.com/office/officeart/2005/8/layout/lProcess2"/>
+    <dgm:cxn modelId="{CADAA315-38B8-4640-B8DD-1CE3F76B8C10}" type="presParOf" srcId="{CDE1887F-CD30-462B-80F8-5028C3418FF8}" destId="{6F8DF17A-9F62-448B-A4F5-6BC0F60955FE}" srcOrd="4" destOrd="0" presId="urn:microsoft.com/office/officeart/2005/8/layout/lProcess2"/>
+    <dgm:cxn modelId="{80C4A3CB-9C7A-4160-AE08-9E428B0644DC}" type="presParOf" srcId="{FFFC3DC0-68EC-4ACB-BC03-695BF1F217E1}" destId="{7A5F1DAE-48E1-4B43-BC40-0E71007A00F0}" srcOrd="3" destOrd="0" presId="urn:microsoft.com/office/officeart/2005/8/layout/lProcess2"/>
+    <dgm:cxn modelId="{3B5AE71B-1340-4D20-8B91-F7DBFDE0CD4D}" type="presParOf" srcId="{FFFC3DC0-68EC-4ACB-BC03-695BF1F217E1}" destId="{9F6C9BC1-27DB-48CA-9FA0-F817C75708FC}" srcOrd="4" destOrd="0" presId="urn:microsoft.com/office/officeart/2005/8/layout/lProcess2"/>
+    <dgm:cxn modelId="{6715CD3E-E7DC-4AAC-829C-2972B8908A79}" type="presParOf" srcId="{9F6C9BC1-27DB-48CA-9FA0-F817C75708FC}" destId="{A5796A7F-DB83-44F8-AAA7-8945FFA93698}" srcOrd="0" destOrd="0" presId="urn:microsoft.com/office/officeart/2005/8/layout/lProcess2"/>
+    <dgm:cxn modelId="{582459EC-4E12-4997-B0C0-2C12BBC6F606}" type="presParOf" srcId="{9F6C9BC1-27DB-48CA-9FA0-F817C75708FC}" destId="{B56A3856-18D7-4772-8F24-143C228C4318}" srcOrd="1" destOrd="0" presId="urn:microsoft.com/office/officeart/2005/8/layout/lProcess2"/>
+    <dgm:cxn modelId="{A12EC89D-B5E6-448B-A585-CF3A797F0914}" type="presParOf" srcId="{9F6C9BC1-27DB-48CA-9FA0-F817C75708FC}" destId="{5A280A97-D114-4F22-A4E4-7132C2DDD856}" srcOrd="2" destOrd="0" presId="urn:microsoft.com/office/officeart/2005/8/layout/lProcess2"/>
+    <dgm:cxn modelId="{E8B932F9-51E9-4EB8-8AA7-32C9F628A8FB}" type="presParOf" srcId="{5A280A97-D114-4F22-A4E4-7132C2DDD856}" destId="{D731F7A7-AAF3-4BAD-B066-E6D27F1D4DF7}" srcOrd="0" destOrd="0" presId="urn:microsoft.com/office/officeart/2005/8/layout/lProcess2"/>
+    <dgm:cxn modelId="{7FD51199-7063-41A3-8551-D6886464784D}" type="presParOf" srcId="{D731F7A7-AAF3-4BAD-B066-E6D27F1D4DF7}" destId="{F369A42B-D21E-40EC-A8FE-C26885465649}" srcOrd="0" destOrd="0" presId="urn:microsoft.com/office/officeart/2005/8/layout/lProcess2"/>
+    <dgm:cxn modelId="{111DEFF1-58E4-4E78-86AE-6ABF9E61EB1D}" type="presParOf" srcId="{D731F7A7-AAF3-4BAD-B066-E6D27F1D4DF7}" destId="{97B27BEF-CF73-44D3-A0AA-5167382A9894}" srcOrd="1" destOrd="0" presId="urn:microsoft.com/office/officeart/2005/8/layout/lProcess2"/>
+    <dgm:cxn modelId="{3A1938F1-AAF4-41C7-B29F-D0A204A8C664}" type="presParOf" srcId="{D731F7A7-AAF3-4BAD-B066-E6D27F1D4DF7}" destId="{1C3D7EE4-E6F2-4A3E-9F1F-0A814086FC51}" srcOrd="2" destOrd="0" presId="urn:microsoft.com/office/officeart/2005/8/layout/lProcess2"/>
+    <dgm:cxn modelId="{50E41DEA-42F6-46CF-8D31-E1F19F149FAB}" type="presParOf" srcId="{D731F7A7-AAF3-4BAD-B066-E6D27F1D4DF7}" destId="{0F4E694C-8E21-4686-BE01-E18C9BE38CAB}" srcOrd="3" destOrd="0" presId="urn:microsoft.com/office/officeart/2005/8/layout/lProcess2"/>
+    <dgm:cxn modelId="{ABF92CA9-6445-4632-B744-1039D453F5ED}" type="presParOf" srcId="{D731F7A7-AAF3-4BAD-B066-E6D27F1D4DF7}" destId="{BAC3E807-8A05-496E-BD46-C39F1042334D}" srcOrd="4" destOrd="0" presId="urn:microsoft.com/office/officeart/2005/8/layout/lProcess2"/>
+    <dgm:cxn modelId="{E428E44D-3D2E-4F77-929E-84F551475C4E}" type="presParOf" srcId="{FFFC3DC0-68EC-4ACB-BC03-695BF1F217E1}" destId="{7DBC2A56-F43E-4661-974E-B06A893EAC3D}" srcOrd="5" destOrd="0" presId="urn:microsoft.com/office/officeart/2005/8/layout/lProcess2"/>
+    <dgm:cxn modelId="{AD91E8DA-2ABF-46A2-A212-A6C0A27822DD}" type="presParOf" srcId="{FFFC3DC0-68EC-4ACB-BC03-695BF1F217E1}" destId="{54E837A4-DE17-4395-A671-1FB12D4F5E5F}" srcOrd="6" destOrd="0" presId="urn:microsoft.com/office/officeart/2005/8/layout/lProcess2"/>
+    <dgm:cxn modelId="{18BCF6D7-6F63-4FD1-AEFF-F93CE03B5D76}" type="presParOf" srcId="{54E837A4-DE17-4395-A671-1FB12D4F5E5F}" destId="{2EB024A8-945B-41BB-9D54-996E7307A6F1}" srcOrd="0" destOrd="0" presId="urn:microsoft.com/office/officeart/2005/8/layout/lProcess2"/>
+    <dgm:cxn modelId="{670519E4-8F8A-4D62-90A4-FA55E6115FC7}" type="presParOf" srcId="{54E837A4-DE17-4395-A671-1FB12D4F5E5F}" destId="{928E6A33-CB30-45E0-9145-34B63B324E29}" srcOrd="1" destOrd="0" presId="urn:microsoft.com/office/officeart/2005/8/layout/lProcess2"/>
+    <dgm:cxn modelId="{BB2950E4-0296-47CC-B8B6-940E00A67E19}" type="presParOf" srcId="{54E837A4-DE17-4395-A671-1FB12D4F5E5F}" destId="{AB8C1C46-AC99-4278-B746-55BE47A48EB2}" srcOrd="2" destOrd="0" presId="urn:microsoft.com/office/officeart/2005/8/layout/lProcess2"/>
+    <dgm:cxn modelId="{C0D7317A-4C4B-4383-A66E-AC4F8F8AAFD7}" type="presParOf" srcId="{AB8C1C46-AC99-4278-B746-55BE47A48EB2}" destId="{70775E33-CAF5-49AC-A4B6-7351AF4CAE3B}" srcOrd="0" destOrd="0" presId="urn:microsoft.com/office/officeart/2005/8/layout/lProcess2"/>
+    <dgm:cxn modelId="{51A4320D-37AD-43C3-8CDF-C8D71F1CA138}" type="presParOf" srcId="{70775E33-CAF5-49AC-A4B6-7351AF4CAE3B}" destId="{70BFDDE2-E9BE-4400-85DF-5F0B3A6F9B38}" srcOrd="0" destOrd="0" presId="urn:microsoft.com/office/officeart/2005/8/layout/lProcess2"/>
+    <dgm:cxn modelId="{9DC8D47C-AE4D-4C67-87F9-056A2C41B949}" type="presParOf" srcId="{70775E33-CAF5-49AC-A4B6-7351AF4CAE3B}" destId="{4368468E-5754-40AD-ACC4-46FD8BA26B1F}" srcOrd="1" destOrd="0" presId="urn:microsoft.com/office/officeart/2005/8/layout/lProcess2"/>
+    <dgm:cxn modelId="{E10EDD89-8C8A-41EE-BC60-321A6452F2F3}" type="presParOf" srcId="{70775E33-CAF5-49AC-A4B6-7351AF4CAE3B}" destId="{6872B8CE-F3A0-437B-A311-F44124D1D31D}" srcOrd="2" destOrd="0" presId="urn:microsoft.com/office/officeart/2005/8/layout/lProcess2"/>
+    <dgm:cxn modelId="{B19D04BD-0546-4FD6-9A8F-DF78D11686B8}" type="presParOf" srcId="{70775E33-CAF5-49AC-A4B6-7351AF4CAE3B}" destId="{B6C2E39C-E819-4F72-8ED2-DCFE0B6AF1E0}" srcOrd="3" destOrd="0" presId="urn:microsoft.com/office/officeart/2005/8/layout/lProcess2"/>
+    <dgm:cxn modelId="{BA8658C3-32B6-48ED-A2BC-91F6892AC458}" type="presParOf" srcId="{70775E33-CAF5-49AC-A4B6-7351AF4CAE3B}" destId="{273743E1-518E-49E8-91AE-4A168C508C13}" srcOrd="4" destOrd="0" presId="urn:microsoft.com/office/officeart/2005/8/layout/lProcess2"/>
   </dgm:cxnLst>
   <dgm:bg/>
   <dgm:whole/>
@@ -1349,6 +2920,1265 @@
       <dsp:txXfrm>
         <a:off x="6770125" y="40940"/>
         <a:ext cx="2795717" cy="1315922"/>
+      </dsp:txXfrm>
+    </dsp:sp>
+  </dsp:spTree>
+</dsp:drawing>
+</file>
+
+<file path=ppt/diagrams/drawing2.xml><?xml version="1.0" encoding="utf-8"?>
+<dsp:drawing xmlns:dgm="http://schemas.openxmlformats.org/drawingml/2006/diagram" xmlns:dsp="http://schemas.microsoft.com/office/drawing/2008/diagram" xmlns:a="http://schemas.openxmlformats.org/drawingml/2006/main">
+  <dsp:spTree>
+    <dsp:nvGrpSpPr>
+      <dsp:cNvPr id="0" name=""/>
+      <dsp:cNvGrpSpPr/>
+    </dsp:nvGrpSpPr>
+    <dsp:grpSpPr/>
+    <dsp:sp modelId="{73523260-114B-42E5-BD4D-243108EE47C0}">
+      <dsp:nvSpPr>
+        <dsp:cNvPr id="0" name=""/>
+        <dsp:cNvSpPr/>
+      </dsp:nvSpPr>
+      <dsp:spPr>
+        <a:xfrm>
+          <a:off x="2317" y="0"/>
+          <a:ext cx="2274382" cy="3598863"/>
+        </a:xfrm>
+        <a:prstGeom prst="roundRect">
+          <a:avLst>
+            <a:gd name="adj" fmla="val 10000"/>
+          </a:avLst>
+        </a:prstGeom>
+        <a:solidFill>
+          <a:schemeClr val="accent1">
+            <a:tint val="40000"/>
+            <a:hueOff val="0"/>
+            <a:satOff val="0"/>
+            <a:lumOff val="0"/>
+            <a:alphaOff val="0"/>
+          </a:schemeClr>
+        </a:solidFill>
+        <a:ln>
+          <a:noFill/>
+        </a:ln>
+        <a:effectLst/>
+      </dsp:spPr>
+      <dsp:style>
+        <a:lnRef idx="0">
+          <a:scrgbClr r="0" g="0" b="0"/>
+        </a:lnRef>
+        <a:fillRef idx="1">
+          <a:scrgbClr r="0" g="0" b="0"/>
+        </a:fillRef>
+        <a:effectRef idx="0">
+          <a:scrgbClr r="0" g="0" b="0"/>
+        </a:effectRef>
+        <a:fontRef idx="minor"/>
+      </dsp:style>
+      <dsp:txBody>
+        <a:bodyPr spcFirstLastPara="0" vert="horz" wrap="square" lIns="118110" tIns="118110" rIns="118110" bIns="118110" numCol="1" spcCol="1270" anchor="ctr" anchorCtr="0">
+          <a:noAutofit/>
+        </a:bodyPr>
+        <a:lstStyle/>
+        <a:p>
+          <a:pPr marL="0" lvl="0" indent="0" algn="ctr" defTabSz="1377950">
+            <a:lnSpc>
+              <a:spcPct val="90000"/>
+            </a:lnSpc>
+            <a:spcBef>
+              <a:spcPct val="0"/>
+            </a:spcBef>
+            <a:spcAft>
+              <a:spcPct val="35000"/>
+            </a:spcAft>
+            <a:buNone/>
+          </a:pPr>
+          <a:r>
+            <a:rPr lang="en-US" sz="3100" kern="1200" dirty="0"/>
+            <a:t>Database</a:t>
+          </a:r>
+        </a:p>
+      </dsp:txBody>
+      <dsp:txXfrm>
+        <a:off x="2317" y="0"/>
+        <a:ext cx="2274382" cy="1079658"/>
+      </dsp:txXfrm>
+    </dsp:sp>
+    <dsp:sp modelId="{5E533CA6-AF2E-42AB-9D67-EFD200DA4EC7}">
+      <dsp:nvSpPr>
+        <dsp:cNvPr id="0" name=""/>
+        <dsp:cNvSpPr/>
+      </dsp:nvSpPr>
+      <dsp:spPr>
+        <a:xfrm>
+          <a:off x="229756" y="1079966"/>
+          <a:ext cx="1819505" cy="707032"/>
+        </a:xfrm>
+        <a:prstGeom prst="roundRect">
+          <a:avLst>
+            <a:gd name="adj" fmla="val 10000"/>
+          </a:avLst>
+        </a:prstGeom>
+        <a:solidFill>
+          <a:schemeClr val="accent1">
+            <a:hueOff val="0"/>
+            <a:satOff val="0"/>
+            <a:lumOff val="0"/>
+            <a:alphaOff val="0"/>
+          </a:schemeClr>
+        </a:solidFill>
+        <a:ln w="12700" cap="flat" cmpd="sng" algn="ctr">
+          <a:solidFill>
+            <a:schemeClr val="lt1">
+              <a:hueOff val="0"/>
+              <a:satOff val="0"/>
+              <a:lumOff val="0"/>
+              <a:alphaOff val="0"/>
+            </a:schemeClr>
+          </a:solidFill>
+          <a:prstDash val="solid"/>
+        </a:ln>
+        <a:effectLst/>
+      </dsp:spPr>
+      <dsp:style>
+        <a:lnRef idx="2">
+          <a:scrgbClr r="0" g="0" b="0"/>
+        </a:lnRef>
+        <a:fillRef idx="1">
+          <a:scrgbClr r="0" g="0" b="0"/>
+        </a:fillRef>
+        <a:effectRef idx="0">
+          <a:scrgbClr r="0" g="0" b="0"/>
+        </a:effectRef>
+        <a:fontRef idx="minor">
+          <a:schemeClr val="lt1"/>
+        </a:fontRef>
+      </dsp:style>
+      <dsp:txBody>
+        <a:bodyPr spcFirstLastPara="0" vert="horz" wrap="square" lIns="43180" tIns="32385" rIns="43180" bIns="32385" numCol="1" spcCol="1270" anchor="ctr" anchorCtr="0">
+          <a:noAutofit/>
+        </a:bodyPr>
+        <a:lstStyle/>
+        <a:p>
+          <a:pPr marL="0" lvl="0" indent="0" algn="ctr" defTabSz="755650">
+            <a:lnSpc>
+              <a:spcPct val="90000"/>
+            </a:lnSpc>
+            <a:spcBef>
+              <a:spcPct val="0"/>
+            </a:spcBef>
+            <a:spcAft>
+              <a:spcPct val="35000"/>
+            </a:spcAft>
+            <a:buNone/>
+          </a:pPr>
+          <a:r>
+            <a:rPr lang="en-US" sz="1700" kern="1200" dirty="0"/>
+            <a:t>EF Core</a:t>
+          </a:r>
+        </a:p>
+      </dsp:txBody>
+      <dsp:txXfrm>
+        <a:off x="250464" y="1100674"/>
+        <a:ext cx="1778089" cy="665616"/>
+      </dsp:txXfrm>
+    </dsp:sp>
+    <dsp:sp modelId="{19E31F85-2DC3-4E20-9FD1-E6B2D7483510}">
+      <dsp:nvSpPr>
+        <dsp:cNvPr id="0" name=""/>
+        <dsp:cNvSpPr/>
+      </dsp:nvSpPr>
+      <dsp:spPr>
+        <a:xfrm>
+          <a:off x="229756" y="1895773"/>
+          <a:ext cx="1819505" cy="707032"/>
+        </a:xfrm>
+        <a:prstGeom prst="roundRect">
+          <a:avLst>
+            <a:gd name="adj" fmla="val 10000"/>
+          </a:avLst>
+        </a:prstGeom>
+        <a:solidFill>
+          <a:schemeClr val="accent1">
+            <a:hueOff val="0"/>
+            <a:satOff val="0"/>
+            <a:lumOff val="0"/>
+            <a:alphaOff val="0"/>
+          </a:schemeClr>
+        </a:solidFill>
+        <a:ln w="12700" cap="flat" cmpd="sng" algn="ctr">
+          <a:solidFill>
+            <a:schemeClr val="lt1">
+              <a:hueOff val="0"/>
+              <a:satOff val="0"/>
+              <a:lumOff val="0"/>
+              <a:alphaOff val="0"/>
+            </a:schemeClr>
+          </a:solidFill>
+          <a:prstDash val="solid"/>
+        </a:ln>
+        <a:effectLst/>
+      </dsp:spPr>
+      <dsp:style>
+        <a:lnRef idx="2">
+          <a:scrgbClr r="0" g="0" b="0"/>
+        </a:lnRef>
+        <a:fillRef idx="1">
+          <a:scrgbClr r="0" g="0" b="0"/>
+        </a:fillRef>
+        <a:effectRef idx="0">
+          <a:scrgbClr r="0" g="0" b="0"/>
+        </a:effectRef>
+        <a:fontRef idx="minor">
+          <a:schemeClr val="lt1"/>
+        </a:fontRef>
+      </dsp:style>
+      <dsp:txBody>
+        <a:bodyPr spcFirstLastPara="0" vert="horz" wrap="square" lIns="43180" tIns="32385" rIns="43180" bIns="32385" numCol="1" spcCol="1270" anchor="ctr" anchorCtr="0">
+          <a:noAutofit/>
+        </a:bodyPr>
+        <a:lstStyle/>
+        <a:p>
+          <a:pPr marL="0" lvl="0" indent="0" algn="ctr" defTabSz="755650">
+            <a:lnSpc>
+              <a:spcPct val="90000"/>
+            </a:lnSpc>
+            <a:spcBef>
+              <a:spcPct val="0"/>
+            </a:spcBef>
+            <a:spcAft>
+              <a:spcPct val="35000"/>
+            </a:spcAft>
+            <a:buNone/>
+          </a:pPr>
+          <a:r>
+            <a:rPr lang="en-US" sz="1700" kern="1200" dirty="0"/>
+            <a:t>Seeding</a:t>
+          </a:r>
+        </a:p>
+      </dsp:txBody>
+      <dsp:txXfrm>
+        <a:off x="250464" y="1916481"/>
+        <a:ext cx="1778089" cy="665616"/>
+      </dsp:txXfrm>
+    </dsp:sp>
+    <dsp:sp modelId="{12D57310-13DC-44B8-BE34-B0833B14C081}">
+      <dsp:nvSpPr>
+        <dsp:cNvPr id="0" name=""/>
+        <dsp:cNvSpPr/>
+      </dsp:nvSpPr>
+      <dsp:spPr>
+        <a:xfrm>
+          <a:off x="229756" y="2711579"/>
+          <a:ext cx="1819505" cy="707032"/>
+        </a:xfrm>
+        <a:prstGeom prst="roundRect">
+          <a:avLst>
+            <a:gd name="adj" fmla="val 10000"/>
+          </a:avLst>
+        </a:prstGeom>
+        <a:solidFill>
+          <a:schemeClr val="accent1">
+            <a:hueOff val="0"/>
+            <a:satOff val="0"/>
+            <a:lumOff val="0"/>
+            <a:alphaOff val="0"/>
+          </a:schemeClr>
+        </a:solidFill>
+        <a:ln w="12700" cap="flat" cmpd="sng" algn="ctr">
+          <a:solidFill>
+            <a:schemeClr val="lt1">
+              <a:hueOff val="0"/>
+              <a:satOff val="0"/>
+              <a:lumOff val="0"/>
+              <a:alphaOff val="0"/>
+            </a:schemeClr>
+          </a:solidFill>
+          <a:prstDash val="solid"/>
+        </a:ln>
+        <a:effectLst/>
+      </dsp:spPr>
+      <dsp:style>
+        <a:lnRef idx="2">
+          <a:scrgbClr r="0" g="0" b="0"/>
+        </a:lnRef>
+        <a:fillRef idx="1">
+          <a:scrgbClr r="0" g="0" b="0"/>
+        </a:fillRef>
+        <a:effectRef idx="0">
+          <a:scrgbClr r="0" g="0" b="0"/>
+        </a:effectRef>
+        <a:fontRef idx="minor">
+          <a:schemeClr val="lt1"/>
+        </a:fontRef>
+      </dsp:style>
+      <dsp:txBody>
+        <a:bodyPr spcFirstLastPara="0" vert="horz" wrap="square" lIns="43180" tIns="32385" rIns="43180" bIns="32385" numCol="1" spcCol="1270" anchor="ctr" anchorCtr="0">
+          <a:noAutofit/>
+        </a:bodyPr>
+        <a:lstStyle/>
+        <a:p>
+          <a:pPr marL="0" lvl="0" indent="0" algn="ctr" defTabSz="755650">
+            <a:lnSpc>
+              <a:spcPct val="90000"/>
+            </a:lnSpc>
+            <a:spcBef>
+              <a:spcPct val="0"/>
+            </a:spcBef>
+            <a:spcAft>
+              <a:spcPct val="35000"/>
+            </a:spcAft>
+            <a:buNone/>
+          </a:pPr>
+          <a:r>
+            <a:rPr lang="en-US" sz="1700" kern="1200" dirty="0" err="1"/>
+            <a:t>Guid</a:t>
+          </a:r>
+          <a:r>
+            <a:rPr lang="en-US" sz="1700" kern="1200" dirty="0"/>
+            <a:t> Identity</a:t>
+          </a:r>
+        </a:p>
+      </dsp:txBody>
+      <dsp:txXfrm>
+        <a:off x="250464" y="2732287"/>
+        <a:ext cx="1778089" cy="665616"/>
+      </dsp:txXfrm>
+    </dsp:sp>
+    <dsp:sp modelId="{52F23154-3697-4391-A364-07BCD0CE3EE9}">
+      <dsp:nvSpPr>
+        <dsp:cNvPr id="0" name=""/>
+        <dsp:cNvSpPr/>
+      </dsp:nvSpPr>
+      <dsp:spPr>
+        <a:xfrm>
+          <a:off x="2447278" y="0"/>
+          <a:ext cx="2274382" cy="3598863"/>
+        </a:xfrm>
+        <a:prstGeom prst="roundRect">
+          <a:avLst>
+            <a:gd name="adj" fmla="val 10000"/>
+          </a:avLst>
+        </a:prstGeom>
+        <a:solidFill>
+          <a:schemeClr val="accent1">
+            <a:tint val="40000"/>
+            <a:hueOff val="0"/>
+            <a:satOff val="0"/>
+            <a:lumOff val="0"/>
+            <a:alphaOff val="0"/>
+          </a:schemeClr>
+        </a:solidFill>
+        <a:ln>
+          <a:noFill/>
+        </a:ln>
+        <a:effectLst/>
+      </dsp:spPr>
+      <dsp:style>
+        <a:lnRef idx="0">
+          <a:scrgbClr r="0" g="0" b="0"/>
+        </a:lnRef>
+        <a:fillRef idx="1">
+          <a:scrgbClr r="0" g="0" b="0"/>
+        </a:fillRef>
+        <a:effectRef idx="0">
+          <a:scrgbClr r="0" g="0" b="0"/>
+        </a:effectRef>
+        <a:fontRef idx="minor"/>
+      </dsp:style>
+      <dsp:txBody>
+        <a:bodyPr spcFirstLastPara="0" vert="horz" wrap="square" lIns="118110" tIns="118110" rIns="118110" bIns="118110" numCol="1" spcCol="1270" anchor="ctr" anchorCtr="0">
+          <a:noAutofit/>
+        </a:bodyPr>
+        <a:lstStyle/>
+        <a:p>
+          <a:pPr marL="0" lvl="0" indent="0" algn="ctr" defTabSz="1377950">
+            <a:lnSpc>
+              <a:spcPct val="90000"/>
+            </a:lnSpc>
+            <a:spcBef>
+              <a:spcPct val="0"/>
+            </a:spcBef>
+            <a:spcAft>
+              <a:spcPct val="35000"/>
+            </a:spcAft>
+            <a:buNone/>
+          </a:pPr>
+          <a:r>
+            <a:rPr lang="en-US" sz="3100" kern="1200" dirty="0"/>
+            <a:t>Security</a:t>
+          </a:r>
+        </a:p>
+      </dsp:txBody>
+      <dsp:txXfrm>
+        <a:off x="2447278" y="0"/>
+        <a:ext cx="2274382" cy="1079658"/>
+      </dsp:txXfrm>
+    </dsp:sp>
+    <dsp:sp modelId="{57F33471-CFFC-44B9-93DE-C12939B4E507}">
+      <dsp:nvSpPr>
+        <dsp:cNvPr id="0" name=""/>
+        <dsp:cNvSpPr/>
+      </dsp:nvSpPr>
+      <dsp:spPr>
+        <a:xfrm>
+          <a:off x="2674716" y="1079966"/>
+          <a:ext cx="1819505" cy="707032"/>
+        </a:xfrm>
+        <a:prstGeom prst="roundRect">
+          <a:avLst>
+            <a:gd name="adj" fmla="val 10000"/>
+          </a:avLst>
+        </a:prstGeom>
+        <a:solidFill>
+          <a:schemeClr val="accent1">
+            <a:hueOff val="0"/>
+            <a:satOff val="0"/>
+            <a:lumOff val="0"/>
+            <a:alphaOff val="0"/>
+          </a:schemeClr>
+        </a:solidFill>
+        <a:ln w="12700" cap="flat" cmpd="sng" algn="ctr">
+          <a:solidFill>
+            <a:schemeClr val="lt1">
+              <a:hueOff val="0"/>
+              <a:satOff val="0"/>
+              <a:lumOff val="0"/>
+              <a:alphaOff val="0"/>
+            </a:schemeClr>
+          </a:solidFill>
+          <a:prstDash val="solid"/>
+        </a:ln>
+        <a:effectLst/>
+      </dsp:spPr>
+      <dsp:style>
+        <a:lnRef idx="2">
+          <a:scrgbClr r="0" g="0" b="0"/>
+        </a:lnRef>
+        <a:fillRef idx="1">
+          <a:scrgbClr r="0" g="0" b="0"/>
+        </a:fillRef>
+        <a:effectRef idx="0">
+          <a:scrgbClr r="0" g="0" b="0"/>
+        </a:effectRef>
+        <a:fontRef idx="minor">
+          <a:schemeClr val="lt1"/>
+        </a:fontRef>
+      </dsp:style>
+      <dsp:txBody>
+        <a:bodyPr spcFirstLastPara="0" vert="horz" wrap="square" lIns="43180" tIns="32385" rIns="43180" bIns="32385" numCol="1" spcCol="1270" anchor="ctr" anchorCtr="0">
+          <a:noAutofit/>
+        </a:bodyPr>
+        <a:lstStyle/>
+        <a:p>
+          <a:pPr marL="0" lvl="0" indent="0" algn="ctr" defTabSz="755650">
+            <a:lnSpc>
+              <a:spcPct val="90000"/>
+            </a:lnSpc>
+            <a:spcBef>
+              <a:spcPct val="0"/>
+            </a:spcBef>
+            <a:spcAft>
+              <a:spcPct val="35000"/>
+            </a:spcAft>
+            <a:buNone/>
+          </a:pPr>
+          <a:r>
+            <a:rPr lang="ru-RU" sz="1700" kern="1200" dirty="0"/>
+            <a:t>Аутентификация</a:t>
+          </a:r>
+          <a:endParaRPr lang="en-US" sz="1700" kern="1200" dirty="0"/>
+        </a:p>
+      </dsp:txBody>
+      <dsp:txXfrm>
+        <a:off x="2695424" y="1100674"/>
+        <a:ext cx="1778089" cy="665616"/>
+      </dsp:txXfrm>
+    </dsp:sp>
+    <dsp:sp modelId="{52FD6CE4-6F48-4388-9DB8-03CEEDC22262}">
+      <dsp:nvSpPr>
+        <dsp:cNvPr id="0" name=""/>
+        <dsp:cNvSpPr/>
+      </dsp:nvSpPr>
+      <dsp:spPr>
+        <a:xfrm>
+          <a:off x="2674716" y="1895773"/>
+          <a:ext cx="1819505" cy="707032"/>
+        </a:xfrm>
+        <a:prstGeom prst="roundRect">
+          <a:avLst>
+            <a:gd name="adj" fmla="val 10000"/>
+          </a:avLst>
+        </a:prstGeom>
+        <a:solidFill>
+          <a:schemeClr val="accent1">
+            <a:hueOff val="0"/>
+            <a:satOff val="0"/>
+            <a:lumOff val="0"/>
+            <a:alphaOff val="0"/>
+          </a:schemeClr>
+        </a:solidFill>
+        <a:ln w="12700" cap="flat" cmpd="sng" algn="ctr">
+          <a:solidFill>
+            <a:schemeClr val="lt1">
+              <a:hueOff val="0"/>
+              <a:satOff val="0"/>
+              <a:lumOff val="0"/>
+              <a:alphaOff val="0"/>
+            </a:schemeClr>
+          </a:solidFill>
+          <a:prstDash val="solid"/>
+        </a:ln>
+        <a:effectLst/>
+      </dsp:spPr>
+      <dsp:style>
+        <a:lnRef idx="2">
+          <a:scrgbClr r="0" g="0" b="0"/>
+        </a:lnRef>
+        <a:fillRef idx="1">
+          <a:scrgbClr r="0" g="0" b="0"/>
+        </a:fillRef>
+        <a:effectRef idx="0">
+          <a:scrgbClr r="0" g="0" b="0"/>
+        </a:effectRef>
+        <a:fontRef idx="minor">
+          <a:schemeClr val="lt1"/>
+        </a:fontRef>
+      </dsp:style>
+      <dsp:txBody>
+        <a:bodyPr spcFirstLastPara="0" vert="horz" wrap="square" lIns="43180" tIns="32385" rIns="43180" bIns="32385" numCol="1" spcCol="1270" anchor="ctr" anchorCtr="0">
+          <a:noAutofit/>
+        </a:bodyPr>
+        <a:lstStyle/>
+        <a:p>
+          <a:pPr marL="0" lvl="0" indent="0" algn="ctr" defTabSz="755650">
+            <a:lnSpc>
+              <a:spcPct val="90000"/>
+            </a:lnSpc>
+            <a:spcBef>
+              <a:spcPct val="0"/>
+            </a:spcBef>
+            <a:spcAft>
+              <a:spcPct val="35000"/>
+            </a:spcAft>
+            <a:buNone/>
+          </a:pPr>
+          <a:r>
+            <a:rPr lang="ru-RU" sz="1700" kern="1200" dirty="0"/>
+            <a:t>Авторизация</a:t>
+          </a:r>
+          <a:endParaRPr lang="en-US" sz="1700" kern="1200" dirty="0"/>
+        </a:p>
+      </dsp:txBody>
+      <dsp:txXfrm>
+        <a:off x="2695424" y="1916481"/>
+        <a:ext cx="1778089" cy="665616"/>
+      </dsp:txXfrm>
+    </dsp:sp>
+    <dsp:sp modelId="{6F8DF17A-9F62-448B-A4F5-6BC0F60955FE}">
+      <dsp:nvSpPr>
+        <dsp:cNvPr id="0" name=""/>
+        <dsp:cNvSpPr/>
+      </dsp:nvSpPr>
+      <dsp:spPr>
+        <a:xfrm>
+          <a:off x="2674716" y="2711579"/>
+          <a:ext cx="1819505" cy="707032"/>
+        </a:xfrm>
+        <a:prstGeom prst="roundRect">
+          <a:avLst>
+            <a:gd name="adj" fmla="val 10000"/>
+          </a:avLst>
+        </a:prstGeom>
+        <a:solidFill>
+          <a:schemeClr val="accent1">
+            <a:hueOff val="0"/>
+            <a:satOff val="0"/>
+            <a:lumOff val="0"/>
+            <a:alphaOff val="0"/>
+          </a:schemeClr>
+        </a:solidFill>
+        <a:ln w="12700" cap="flat" cmpd="sng" algn="ctr">
+          <a:solidFill>
+            <a:schemeClr val="lt1">
+              <a:hueOff val="0"/>
+              <a:satOff val="0"/>
+              <a:lumOff val="0"/>
+              <a:alphaOff val="0"/>
+            </a:schemeClr>
+          </a:solidFill>
+          <a:prstDash val="solid"/>
+        </a:ln>
+        <a:effectLst/>
+      </dsp:spPr>
+      <dsp:style>
+        <a:lnRef idx="2">
+          <a:scrgbClr r="0" g="0" b="0"/>
+        </a:lnRef>
+        <a:fillRef idx="1">
+          <a:scrgbClr r="0" g="0" b="0"/>
+        </a:fillRef>
+        <a:effectRef idx="0">
+          <a:scrgbClr r="0" g="0" b="0"/>
+        </a:effectRef>
+        <a:fontRef idx="minor">
+          <a:schemeClr val="lt1"/>
+        </a:fontRef>
+      </dsp:style>
+      <dsp:txBody>
+        <a:bodyPr spcFirstLastPara="0" vert="horz" wrap="square" lIns="43180" tIns="32385" rIns="43180" bIns="32385" numCol="1" spcCol="1270" anchor="ctr" anchorCtr="0">
+          <a:noAutofit/>
+        </a:bodyPr>
+        <a:lstStyle/>
+        <a:p>
+          <a:pPr marL="0" lvl="0" indent="0" algn="ctr" defTabSz="755650">
+            <a:lnSpc>
+              <a:spcPct val="90000"/>
+            </a:lnSpc>
+            <a:spcBef>
+              <a:spcPct val="0"/>
+            </a:spcBef>
+            <a:spcAft>
+              <a:spcPct val="35000"/>
+            </a:spcAft>
+            <a:buNone/>
+          </a:pPr>
+          <a:r>
+            <a:rPr lang="en-US" sz="1700" kern="1200" dirty="0"/>
+            <a:t>Server standalone</a:t>
+          </a:r>
+        </a:p>
+      </dsp:txBody>
+      <dsp:txXfrm>
+        <a:off x="2695424" y="2732287"/>
+        <a:ext cx="1778089" cy="665616"/>
+      </dsp:txXfrm>
+    </dsp:sp>
+    <dsp:sp modelId="{A5796A7F-DB83-44F8-AAA7-8945FFA93698}">
+      <dsp:nvSpPr>
+        <dsp:cNvPr id="0" name=""/>
+        <dsp:cNvSpPr/>
+      </dsp:nvSpPr>
+      <dsp:spPr>
+        <a:xfrm>
+          <a:off x="4892239" y="0"/>
+          <a:ext cx="2274382" cy="3598863"/>
+        </a:xfrm>
+        <a:prstGeom prst="roundRect">
+          <a:avLst>
+            <a:gd name="adj" fmla="val 10000"/>
+          </a:avLst>
+        </a:prstGeom>
+        <a:solidFill>
+          <a:schemeClr val="accent1">
+            <a:tint val="40000"/>
+            <a:hueOff val="0"/>
+            <a:satOff val="0"/>
+            <a:lumOff val="0"/>
+            <a:alphaOff val="0"/>
+          </a:schemeClr>
+        </a:solidFill>
+        <a:ln>
+          <a:noFill/>
+        </a:ln>
+        <a:effectLst/>
+      </dsp:spPr>
+      <dsp:style>
+        <a:lnRef idx="0">
+          <a:scrgbClr r="0" g="0" b="0"/>
+        </a:lnRef>
+        <a:fillRef idx="1">
+          <a:scrgbClr r="0" g="0" b="0"/>
+        </a:fillRef>
+        <a:effectRef idx="0">
+          <a:scrgbClr r="0" g="0" b="0"/>
+        </a:effectRef>
+        <a:fontRef idx="minor"/>
+      </dsp:style>
+      <dsp:txBody>
+        <a:bodyPr spcFirstLastPara="0" vert="horz" wrap="square" lIns="118110" tIns="118110" rIns="118110" bIns="118110" numCol="1" spcCol="1270" anchor="ctr" anchorCtr="0">
+          <a:noAutofit/>
+        </a:bodyPr>
+        <a:lstStyle/>
+        <a:p>
+          <a:pPr marL="0" lvl="0" indent="0" algn="ctr" defTabSz="1377950">
+            <a:lnSpc>
+              <a:spcPct val="90000"/>
+            </a:lnSpc>
+            <a:spcBef>
+              <a:spcPct val="0"/>
+            </a:spcBef>
+            <a:spcAft>
+              <a:spcPct val="35000"/>
+            </a:spcAft>
+            <a:buNone/>
+          </a:pPr>
+          <a:r>
+            <a:rPr lang="en-US" sz="3100" kern="1200" dirty="0"/>
+            <a:t>Unit of Work</a:t>
+          </a:r>
+        </a:p>
+      </dsp:txBody>
+      <dsp:txXfrm>
+        <a:off x="4892239" y="0"/>
+        <a:ext cx="2274382" cy="1079658"/>
+      </dsp:txXfrm>
+    </dsp:sp>
+    <dsp:sp modelId="{F369A42B-D21E-40EC-A8FE-C26885465649}">
+      <dsp:nvSpPr>
+        <dsp:cNvPr id="0" name=""/>
+        <dsp:cNvSpPr/>
+      </dsp:nvSpPr>
+      <dsp:spPr>
+        <a:xfrm>
+          <a:off x="5119677" y="1079966"/>
+          <a:ext cx="1819505" cy="707032"/>
+        </a:xfrm>
+        <a:prstGeom prst="roundRect">
+          <a:avLst>
+            <a:gd name="adj" fmla="val 10000"/>
+          </a:avLst>
+        </a:prstGeom>
+        <a:solidFill>
+          <a:schemeClr val="accent1">
+            <a:hueOff val="0"/>
+            <a:satOff val="0"/>
+            <a:lumOff val="0"/>
+            <a:alphaOff val="0"/>
+          </a:schemeClr>
+        </a:solidFill>
+        <a:ln w="12700" cap="flat" cmpd="sng" algn="ctr">
+          <a:solidFill>
+            <a:schemeClr val="lt1">
+              <a:hueOff val="0"/>
+              <a:satOff val="0"/>
+              <a:lumOff val="0"/>
+              <a:alphaOff val="0"/>
+            </a:schemeClr>
+          </a:solidFill>
+          <a:prstDash val="solid"/>
+        </a:ln>
+        <a:effectLst/>
+      </dsp:spPr>
+      <dsp:style>
+        <a:lnRef idx="2">
+          <a:scrgbClr r="0" g="0" b="0"/>
+        </a:lnRef>
+        <a:fillRef idx="1">
+          <a:scrgbClr r="0" g="0" b="0"/>
+        </a:fillRef>
+        <a:effectRef idx="0">
+          <a:scrgbClr r="0" g="0" b="0"/>
+        </a:effectRef>
+        <a:fontRef idx="minor">
+          <a:schemeClr val="lt1"/>
+        </a:fontRef>
+      </dsp:style>
+      <dsp:txBody>
+        <a:bodyPr spcFirstLastPara="0" vert="horz" wrap="square" lIns="43180" tIns="32385" rIns="43180" bIns="32385" numCol="1" spcCol="1270" anchor="ctr" anchorCtr="0">
+          <a:noAutofit/>
+        </a:bodyPr>
+        <a:lstStyle/>
+        <a:p>
+          <a:pPr marL="0" lvl="0" indent="0" algn="ctr" defTabSz="755650">
+            <a:lnSpc>
+              <a:spcPct val="90000"/>
+            </a:lnSpc>
+            <a:spcBef>
+              <a:spcPct val="0"/>
+            </a:spcBef>
+            <a:spcAft>
+              <a:spcPct val="35000"/>
+            </a:spcAft>
+            <a:buNone/>
+          </a:pPr>
+          <a:r>
+            <a:rPr lang="en-US" sz="1700" kern="1200" dirty="0"/>
+            <a:t>Repository</a:t>
+          </a:r>
+        </a:p>
+      </dsp:txBody>
+      <dsp:txXfrm>
+        <a:off x="5140385" y="1100674"/>
+        <a:ext cx="1778089" cy="665616"/>
+      </dsp:txXfrm>
+    </dsp:sp>
+    <dsp:sp modelId="{1C3D7EE4-E6F2-4A3E-9F1F-0A814086FC51}">
+      <dsp:nvSpPr>
+        <dsp:cNvPr id="0" name=""/>
+        <dsp:cNvSpPr/>
+      </dsp:nvSpPr>
+      <dsp:spPr>
+        <a:xfrm>
+          <a:off x="5119677" y="1895773"/>
+          <a:ext cx="1819505" cy="707032"/>
+        </a:xfrm>
+        <a:prstGeom prst="roundRect">
+          <a:avLst>
+            <a:gd name="adj" fmla="val 10000"/>
+          </a:avLst>
+        </a:prstGeom>
+        <a:solidFill>
+          <a:schemeClr val="accent1">
+            <a:hueOff val="0"/>
+            <a:satOff val="0"/>
+            <a:lumOff val="0"/>
+            <a:alphaOff val="0"/>
+          </a:schemeClr>
+        </a:solidFill>
+        <a:ln w="12700" cap="flat" cmpd="sng" algn="ctr">
+          <a:solidFill>
+            <a:schemeClr val="lt1">
+              <a:hueOff val="0"/>
+              <a:satOff val="0"/>
+              <a:lumOff val="0"/>
+              <a:alphaOff val="0"/>
+            </a:schemeClr>
+          </a:solidFill>
+          <a:prstDash val="solid"/>
+        </a:ln>
+        <a:effectLst/>
+      </dsp:spPr>
+      <dsp:style>
+        <a:lnRef idx="2">
+          <a:scrgbClr r="0" g="0" b="0"/>
+        </a:lnRef>
+        <a:fillRef idx="1">
+          <a:scrgbClr r="0" g="0" b="0"/>
+        </a:fillRef>
+        <a:effectRef idx="0">
+          <a:scrgbClr r="0" g="0" b="0"/>
+        </a:effectRef>
+        <a:fontRef idx="minor">
+          <a:schemeClr val="lt1"/>
+        </a:fontRef>
+      </dsp:style>
+      <dsp:txBody>
+        <a:bodyPr spcFirstLastPara="0" vert="horz" wrap="square" lIns="43180" tIns="32385" rIns="43180" bIns="32385" numCol="1" spcCol="1270" anchor="ctr" anchorCtr="0">
+          <a:noAutofit/>
+        </a:bodyPr>
+        <a:lstStyle/>
+        <a:p>
+          <a:pPr marL="0" lvl="0" indent="0" algn="ctr" defTabSz="755650">
+            <a:lnSpc>
+              <a:spcPct val="90000"/>
+            </a:lnSpc>
+            <a:spcBef>
+              <a:spcPct val="0"/>
+            </a:spcBef>
+            <a:spcAft>
+              <a:spcPct val="35000"/>
+            </a:spcAft>
+            <a:buNone/>
+          </a:pPr>
+          <a:r>
+            <a:rPr lang="en-US" sz="1700" kern="1200" dirty="0"/>
+            <a:t>Transactions</a:t>
+          </a:r>
+        </a:p>
+      </dsp:txBody>
+      <dsp:txXfrm>
+        <a:off x="5140385" y="1916481"/>
+        <a:ext cx="1778089" cy="665616"/>
+      </dsp:txXfrm>
+    </dsp:sp>
+    <dsp:sp modelId="{BAC3E807-8A05-496E-BD46-C39F1042334D}">
+      <dsp:nvSpPr>
+        <dsp:cNvPr id="0" name=""/>
+        <dsp:cNvSpPr/>
+      </dsp:nvSpPr>
+      <dsp:spPr>
+        <a:xfrm>
+          <a:off x="5119677" y="2711579"/>
+          <a:ext cx="1819505" cy="707032"/>
+        </a:xfrm>
+        <a:prstGeom prst="roundRect">
+          <a:avLst>
+            <a:gd name="adj" fmla="val 10000"/>
+          </a:avLst>
+        </a:prstGeom>
+        <a:solidFill>
+          <a:schemeClr val="accent1">
+            <a:hueOff val="0"/>
+            <a:satOff val="0"/>
+            <a:lumOff val="0"/>
+            <a:alphaOff val="0"/>
+          </a:schemeClr>
+        </a:solidFill>
+        <a:ln w="12700" cap="flat" cmpd="sng" algn="ctr">
+          <a:solidFill>
+            <a:schemeClr val="lt1">
+              <a:hueOff val="0"/>
+              <a:satOff val="0"/>
+              <a:lumOff val="0"/>
+              <a:alphaOff val="0"/>
+            </a:schemeClr>
+          </a:solidFill>
+          <a:prstDash val="solid"/>
+        </a:ln>
+        <a:effectLst/>
+      </dsp:spPr>
+      <dsp:style>
+        <a:lnRef idx="2">
+          <a:scrgbClr r="0" g="0" b="0"/>
+        </a:lnRef>
+        <a:fillRef idx="1">
+          <a:scrgbClr r="0" g="0" b="0"/>
+        </a:fillRef>
+        <a:effectRef idx="0">
+          <a:scrgbClr r="0" g="0" b="0"/>
+        </a:effectRef>
+        <a:fontRef idx="minor">
+          <a:schemeClr val="lt1"/>
+        </a:fontRef>
+      </dsp:style>
+      <dsp:txBody>
+        <a:bodyPr spcFirstLastPara="0" vert="horz" wrap="square" lIns="43180" tIns="32385" rIns="43180" bIns="32385" numCol="1" spcCol="1270" anchor="ctr" anchorCtr="0">
+          <a:noAutofit/>
+        </a:bodyPr>
+        <a:lstStyle/>
+        <a:p>
+          <a:pPr marL="0" lvl="0" indent="0" algn="ctr" defTabSz="755650">
+            <a:lnSpc>
+              <a:spcPct val="90000"/>
+            </a:lnSpc>
+            <a:spcBef>
+              <a:spcPct val="0"/>
+            </a:spcBef>
+            <a:spcAft>
+              <a:spcPct val="35000"/>
+            </a:spcAft>
+            <a:buNone/>
+          </a:pPr>
+          <a:r>
+            <a:rPr lang="en-US" sz="1700" kern="1200" dirty="0"/>
+            <a:t>Last Error Tracking</a:t>
+          </a:r>
+        </a:p>
+      </dsp:txBody>
+      <dsp:txXfrm>
+        <a:off x="5140385" y="2732287"/>
+        <a:ext cx="1778089" cy="665616"/>
+      </dsp:txXfrm>
+    </dsp:sp>
+    <dsp:sp modelId="{2EB024A8-945B-41BB-9D54-996E7307A6F1}">
+      <dsp:nvSpPr>
+        <dsp:cNvPr id="0" name=""/>
+        <dsp:cNvSpPr/>
+      </dsp:nvSpPr>
+      <dsp:spPr>
+        <a:xfrm>
+          <a:off x="7337200" y="0"/>
+          <a:ext cx="2274382" cy="3598863"/>
+        </a:xfrm>
+        <a:prstGeom prst="roundRect">
+          <a:avLst>
+            <a:gd name="adj" fmla="val 10000"/>
+          </a:avLst>
+        </a:prstGeom>
+        <a:solidFill>
+          <a:schemeClr val="accent1">
+            <a:tint val="40000"/>
+            <a:hueOff val="0"/>
+            <a:satOff val="0"/>
+            <a:lumOff val="0"/>
+            <a:alphaOff val="0"/>
+          </a:schemeClr>
+        </a:solidFill>
+        <a:ln>
+          <a:noFill/>
+        </a:ln>
+        <a:effectLst/>
+      </dsp:spPr>
+      <dsp:style>
+        <a:lnRef idx="0">
+          <a:scrgbClr r="0" g="0" b="0"/>
+        </a:lnRef>
+        <a:fillRef idx="1">
+          <a:scrgbClr r="0" g="0" b="0"/>
+        </a:fillRef>
+        <a:effectRef idx="0">
+          <a:scrgbClr r="0" g="0" b="0"/>
+        </a:effectRef>
+        <a:fontRef idx="minor"/>
+      </dsp:style>
+      <dsp:txBody>
+        <a:bodyPr spcFirstLastPara="0" vert="horz" wrap="square" lIns="118110" tIns="118110" rIns="118110" bIns="118110" numCol="1" spcCol="1270" anchor="ctr" anchorCtr="0">
+          <a:noAutofit/>
+        </a:bodyPr>
+        <a:lstStyle/>
+        <a:p>
+          <a:pPr marL="0" lvl="0" indent="0" algn="ctr" defTabSz="1377950">
+            <a:lnSpc>
+              <a:spcPct val="90000"/>
+            </a:lnSpc>
+            <a:spcBef>
+              <a:spcPct val="0"/>
+            </a:spcBef>
+            <a:spcAft>
+              <a:spcPct val="35000"/>
+            </a:spcAft>
+            <a:buNone/>
+          </a:pPr>
+          <a:r>
+            <a:rPr lang="en-US" sz="3100" kern="1200" dirty="0"/>
+            <a:t>Entity Projections</a:t>
+          </a:r>
+        </a:p>
+      </dsp:txBody>
+      <dsp:txXfrm>
+        <a:off x="7337200" y="0"/>
+        <a:ext cx="2274382" cy="1079658"/>
+      </dsp:txXfrm>
+    </dsp:sp>
+    <dsp:sp modelId="{70BFDDE2-E9BE-4400-85DF-5F0B3A6F9B38}">
+      <dsp:nvSpPr>
+        <dsp:cNvPr id="0" name=""/>
+        <dsp:cNvSpPr/>
+      </dsp:nvSpPr>
+      <dsp:spPr>
+        <a:xfrm>
+          <a:off x="7564638" y="1079966"/>
+          <a:ext cx="1819505" cy="707032"/>
+        </a:xfrm>
+        <a:prstGeom prst="roundRect">
+          <a:avLst>
+            <a:gd name="adj" fmla="val 10000"/>
+          </a:avLst>
+        </a:prstGeom>
+        <a:solidFill>
+          <a:schemeClr val="accent1">
+            <a:hueOff val="0"/>
+            <a:satOff val="0"/>
+            <a:lumOff val="0"/>
+            <a:alphaOff val="0"/>
+          </a:schemeClr>
+        </a:solidFill>
+        <a:ln w="12700" cap="flat" cmpd="sng" algn="ctr">
+          <a:solidFill>
+            <a:schemeClr val="lt1">
+              <a:hueOff val="0"/>
+              <a:satOff val="0"/>
+              <a:lumOff val="0"/>
+              <a:alphaOff val="0"/>
+            </a:schemeClr>
+          </a:solidFill>
+          <a:prstDash val="solid"/>
+        </a:ln>
+        <a:effectLst/>
+      </dsp:spPr>
+      <dsp:style>
+        <a:lnRef idx="2">
+          <a:scrgbClr r="0" g="0" b="0"/>
+        </a:lnRef>
+        <a:fillRef idx="1">
+          <a:scrgbClr r="0" g="0" b="0"/>
+        </a:fillRef>
+        <a:effectRef idx="0">
+          <a:scrgbClr r="0" g="0" b="0"/>
+        </a:effectRef>
+        <a:fontRef idx="minor">
+          <a:schemeClr val="lt1"/>
+        </a:fontRef>
+      </dsp:style>
+      <dsp:txBody>
+        <a:bodyPr spcFirstLastPara="0" vert="horz" wrap="square" lIns="43180" tIns="32385" rIns="43180" bIns="32385" numCol="1" spcCol="1270" anchor="ctr" anchorCtr="0">
+          <a:noAutofit/>
+        </a:bodyPr>
+        <a:lstStyle/>
+        <a:p>
+          <a:pPr marL="0" lvl="0" indent="0" algn="ctr" defTabSz="755650">
+            <a:lnSpc>
+              <a:spcPct val="90000"/>
+            </a:lnSpc>
+            <a:spcBef>
+              <a:spcPct val="0"/>
+            </a:spcBef>
+            <a:spcAft>
+              <a:spcPct val="35000"/>
+            </a:spcAft>
+            <a:buNone/>
+          </a:pPr>
+          <a:r>
+            <a:rPr lang="en-US" sz="1700" kern="1200" dirty="0" err="1"/>
+            <a:t>ViewModels</a:t>
+          </a:r>
+          <a:r>
+            <a:rPr lang="en-US" sz="1700" kern="1200" dirty="0"/>
+            <a:t> </a:t>
+          </a:r>
+          <a:r>
+            <a:rPr lang="ru-RU" sz="1700" kern="1200" dirty="0"/>
+            <a:t>маппинг</a:t>
+          </a:r>
+          <a:endParaRPr lang="en-US" sz="1700" kern="1200" dirty="0"/>
+        </a:p>
+      </dsp:txBody>
+      <dsp:txXfrm>
+        <a:off x="7585346" y="1100674"/>
+        <a:ext cx="1778089" cy="665616"/>
+      </dsp:txXfrm>
+    </dsp:sp>
+    <dsp:sp modelId="{6872B8CE-F3A0-437B-A311-F44124D1D31D}">
+      <dsp:nvSpPr>
+        <dsp:cNvPr id="0" name=""/>
+        <dsp:cNvSpPr/>
+      </dsp:nvSpPr>
+      <dsp:spPr>
+        <a:xfrm>
+          <a:off x="7564638" y="1895773"/>
+          <a:ext cx="1819505" cy="707032"/>
+        </a:xfrm>
+        <a:prstGeom prst="roundRect">
+          <a:avLst>
+            <a:gd name="adj" fmla="val 10000"/>
+          </a:avLst>
+        </a:prstGeom>
+        <a:solidFill>
+          <a:schemeClr val="accent1">
+            <a:hueOff val="0"/>
+            <a:satOff val="0"/>
+            <a:lumOff val="0"/>
+            <a:alphaOff val="0"/>
+          </a:schemeClr>
+        </a:solidFill>
+        <a:ln w="12700" cap="flat" cmpd="sng" algn="ctr">
+          <a:solidFill>
+            <a:schemeClr val="lt1">
+              <a:hueOff val="0"/>
+              <a:satOff val="0"/>
+              <a:lumOff val="0"/>
+              <a:alphaOff val="0"/>
+            </a:schemeClr>
+          </a:solidFill>
+          <a:prstDash val="solid"/>
+        </a:ln>
+        <a:effectLst/>
+      </dsp:spPr>
+      <dsp:style>
+        <a:lnRef idx="2">
+          <a:scrgbClr r="0" g="0" b="0"/>
+        </a:lnRef>
+        <a:fillRef idx="1">
+          <a:scrgbClr r="0" g="0" b="0"/>
+        </a:fillRef>
+        <a:effectRef idx="0">
+          <a:scrgbClr r="0" g="0" b="0"/>
+        </a:effectRef>
+        <a:fontRef idx="minor">
+          <a:schemeClr val="lt1"/>
+        </a:fontRef>
+      </dsp:style>
+      <dsp:txBody>
+        <a:bodyPr spcFirstLastPara="0" vert="horz" wrap="square" lIns="43180" tIns="32385" rIns="43180" bIns="32385" numCol="1" spcCol="1270" anchor="ctr" anchorCtr="0">
+          <a:noAutofit/>
+        </a:bodyPr>
+        <a:lstStyle/>
+        <a:p>
+          <a:pPr marL="0" lvl="0" indent="0" algn="ctr" defTabSz="755650">
+            <a:lnSpc>
+              <a:spcPct val="90000"/>
+            </a:lnSpc>
+            <a:spcBef>
+              <a:spcPct val="0"/>
+            </a:spcBef>
+            <a:spcAft>
+              <a:spcPct val="35000"/>
+            </a:spcAft>
+            <a:buNone/>
+          </a:pPr>
+          <a:r>
+            <a:rPr lang="en-US" sz="1700" kern="1200" dirty="0"/>
+            <a:t>Validation</a:t>
+          </a:r>
+        </a:p>
+      </dsp:txBody>
+      <dsp:txXfrm>
+        <a:off x="7585346" y="1916481"/>
+        <a:ext cx="1778089" cy="665616"/>
+      </dsp:txXfrm>
+    </dsp:sp>
+    <dsp:sp modelId="{273743E1-518E-49E8-91AE-4A168C508C13}">
+      <dsp:nvSpPr>
+        <dsp:cNvPr id="0" name=""/>
+        <dsp:cNvSpPr/>
+      </dsp:nvSpPr>
+      <dsp:spPr>
+        <a:xfrm>
+          <a:off x="7564638" y="2711579"/>
+          <a:ext cx="1819505" cy="707032"/>
+        </a:xfrm>
+        <a:prstGeom prst="roundRect">
+          <a:avLst>
+            <a:gd name="adj" fmla="val 10000"/>
+          </a:avLst>
+        </a:prstGeom>
+        <a:solidFill>
+          <a:schemeClr val="accent1">
+            <a:hueOff val="0"/>
+            <a:satOff val="0"/>
+            <a:lumOff val="0"/>
+            <a:alphaOff val="0"/>
+          </a:schemeClr>
+        </a:solidFill>
+        <a:ln w="12700" cap="flat" cmpd="sng" algn="ctr">
+          <a:solidFill>
+            <a:schemeClr val="lt1">
+              <a:hueOff val="0"/>
+              <a:satOff val="0"/>
+              <a:lumOff val="0"/>
+              <a:alphaOff val="0"/>
+            </a:schemeClr>
+          </a:solidFill>
+          <a:prstDash val="solid"/>
+        </a:ln>
+        <a:effectLst/>
+      </dsp:spPr>
+      <dsp:style>
+        <a:lnRef idx="2">
+          <a:scrgbClr r="0" g="0" b="0"/>
+        </a:lnRef>
+        <a:fillRef idx="1">
+          <a:scrgbClr r="0" g="0" b="0"/>
+        </a:fillRef>
+        <a:effectRef idx="0">
+          <a:scrgbClr r="0" g="0" b="0"/>
+        </a:effectRef>
+        <a:fontRef idx="minor">
+          <a:schemeClr val="lt1"/>
+        </a:fontRef>
+      </dsp:style>
+      <dsp:txBody>
+        <a:bodyPr spcFirstLastPara="0" vert="horz" wrap="square" lIns="43180" tIns="32385" rIns="43180" bIns="32385" numCol="1" spcCol="1270" anchor="ctr" anchorCtr="0">
+          <a:noAutofit/>
+        </a:bodyPr>
+        <a:lstStyle/>
+        <a:p>
+          <a:pPr marL="0" lvl="0" indent="0" algn="ctr" defTabSz="755650">
+            <a:lnSpc>
+              <a:spcPct val="90000"/>
+            </a:lnSpc>
+            <a:spcBef>
+              <a:spcPct val="0"/>
+            </a:spcBef>
+            <a:spcAft>
+              <a:spcPct val="35000"/>
+            </a:spcAft>
+            <a:buNone/>
+          </a:pPr>
+          <a:r>
+            <a:rPr lang="en-US" sz="1700" kern="1200" dirty="0" err="1"/>
+            <a:t>ViewModels</a:t>
+          </a:r>
+          <a:r>
+            <a:rPr lang="en-US" sz="1700" kern="1200" dirty="0"/>
+            <a:t> Factory</a:t>
+          </a:r>
+        </a:p>
+      </dsp:txBody>
+      <dsp:txXfrm>
+        <a:off x="7585346" y="2732287"/>
+        <a:ext cx="1778089" cy="665616"/>
       </dsp:txXfrm>
     </dsp:sp>
   </dsp:spTree>
@@ -1877,7 +4707,1268 @@
 </dgm:layoutDef>
 </file>
 
+<file path=ppt/diagrams/layout2.xml><?xml version="1.0" encoding="utf-8"?>
+<dgm:layoutDef xmlns:dgm="http://schemas.openxmlformats.org/drawingml/2006/diagram" xmlns:a="http://schemas.openxmlformats.org/drawingml/2006/main" uniqueId="urn:microsoft.com/office/officeart/2005/8/layout/lProcess2">
+  <dgm:title val=""/>
+  <dgm:desc val=""/>
+  <dgm:catLst>
+    <dgm:cat type="list" pri="10000"/>
+    <dgm:cat type="relationship" pri="13000"/>
+  </dgm:catLst>
+  <dgm:sampData>
+    <dgm:dataModel>
+      <dgm:ptLst>
+        <dgm:pt modelId="0" type="doc"/>
+        <dgm:pt modelId="1">
+          <dgm:prSet phldr="1"/>
+        </dgm:pt>
+        <dgm:pt modelId="11">
+          <dgm:prSet phldr="1"/>
+        </dgm:pt>
+        <dgm:pt modelId="12">
+          <dgm:prSet phldr="1"/>
+        </dgm:pt>
+        <dgm:pt modelId="2">
+          <dgm:prSet phldr="1"/>
+        </dgm:pt>
+        <dgm:pt modelId="21">
+          <dgm:prSet phldr="1"/>
+        </dgm:pt>
+        <dgm:pt modelId="22">
+          <dgm:prSet phldr="1"/>
+        </dgm:pt>
+        <dgm:pt modelId="3">
+          <dgm:prSet phldr="1"/>
+        </dgm:pt>
+        <dgm:pt modelId="31">
+          <dgm:prSet phldr="1"/>
+        </dgm:pt>
+        <dgm:pt modelId="32">
+          <dgm:prSet phldr="1"/>
+        </dgm:pt>
+      </dgm:ptLst>
+      <dgm:cxnLst>
+        <dgm:cxn modelId="4" srcId="0" destId="1" srcOrd="0" destOrd="0"/>
+        <dgm:cxn modelId="5" srcId="0" destId="2" srcOrd="1" destOrd="0"/>
+        <dgm:cxn modelId="13" srcId="1" destId="11" srcOrd="0" destOrd="0"/>
+        <dgm:cxn modelId="14" srcId="1" destId="12" srcOrd="0" destOrd="0"/>
+        <dgm:cxn modelId="23" srcId="2" destId="21" srcOrd="0" destOrd="0"/>
+        <dgm:cxn modelId="24" srcId="2" destId="22" srcOrd="0" destOrd="0"/>
+        <dgm:cxn modelId="33" srcId="3" destId="31" srcOrd="0" destOrd="0"/>
+        <dgm:cxn modelId="34" srcId="3" destId="32" srcOrd="0" destOrd="0"/>
+      </dgm:cxnLst>
+      <dgm:bg/>
+      <dgm:whole/>
+    </dgm:dataModel>
+  </dgm:sampData>
+  <dgm:styleData useDef="1">
+    <dgm:dataModel>
+      <dgm:ptLst/>
+      <dgm:bg/>
+      <dgm:whole/>
+    </dgm:dataModel>
+  </dgm:styleData>
+  <dgm:clrData useDef="1">
+    <dgm:dataModel>
+      <dgm:ptLst/>
+      <dgm:bg/>
+      <dgm:whole/>
+    </dgm:dataModel>
+  </dgm:clrData>
+  <dgm:layoutNode name="theList">
+    <dgm:varLst>
+      <dgm:dir/>
+      <dgm:animLvl val="lvl"/>
+      <dgm:resizeHandles val="exact"/>
+    </dgm:varLst>
+    <dgm:choose name="Name0">
+      <dgm:if name="Name1" func="var" arg="dir" op="equ" val="norm">
+        <dgm:alg type="lin"/>
+      </dgm:if>
+      <dgm:else name="Name2">
+        <dgm:alg type="lin">
+          <dgm:param type="linDir" val="fromR"/>
+        </dgm:alg>
+      </dgm:else>
+    </dgm:choose>
+    <dgm:shape xmlns:r="http://schemas.openxmlformats.org/officeDocument/2006/relationships" r:blip="">
+      <dgm:adjLst/>
+    </dgm:shape>
+    <dgm:presOf/>
+    <dgm:constrLst>
+      <dgm:constr type="w" for="ch" forName="compNode" refType="w"/>
+      <dgm:constr type="h" for="ch" forName="compNode" refType="h"/>
+      <dgm:constr type="w" for="ch" forName="aSpace" refType="w" fact="0.075"/>
+      <dgm:constr type="h" for="des" forName="aSpace2" refType="h" fact="0.1"/>
+      <dgm:constr type="primFontSz" for="des" forName="textNode" op="equ"/>
+      <dgm:constr type="primFontSz" for="des" forName="childNode" op="equ"/>
+    </dgm:constrLst>
+    <dgm:ruleLst/>
+    <dgm:forEach name="aNodeForEach" axis="ch" ptType="node">
+      <dgm:layoutNode name="compNode">
+        <dgm:alg type="composite"/>
+        <dgm:shape xmlns:r="http://schemas.openxmlformats.org/officeDocument/2006/relationships" r:blip="">
+          <dgm:adjLst/>
+        </dgm:shape>
+        <dgm:presOf/>
+        <dgm:constrLst>
+          <dgm:constr type="w" for="ch" forName="aNode" refType="w"/>
+          <dgm:constr type="h" for="ch" forName="aNode" refType="h"/>
+          <dgm:constr type="w" for="ch" forName="textNode" refType="w"/>
+          <dgm:constr type="h" for="ch" forName="textNode" refType="h" fact="0.3"/>
+          <dgm:constr type="ctrX" for="ch" forName="textNode" refType="w" fact="0.5"/>
+          <dgm:constr type="w" for="ch" forName="compChildNode" refType="w" fact="0.8"/>
+          <dgm:constr type="h" for="ch" forName="compChildNode" refType="h" fact="0.65"/>
+          <dgm:constr type="t" for="ch" forName="compChildNode" refType="h" fact="0.3"/>
+          <dgm:constr type="ctrX" for="ch" forName="compChildNode" refType="w" fact="0.5"/>
+        </dgm:constrLst>
+        <dgm:ruleLst/>
+        <dgm:layoutNode name="aNode" styleLbl="bgShp">
+          <dgm:alg type="sp"/>
+          <dgm:shape xmlns:r="http://schemas.openxmlformats.org/officeDocument/2006/relationships" type="roundRect" r:blip="">
+            <dgm:adjLst>
+              <dgm:adj idx="1" val="0.1"/>
+            </dgm:adjLst>
+          </dgm:shape>
+          <dgm:presOf axis="self"/>
+          <dgm:constrLst/>
+          <dgm:ruleLst/>
+        </dgm:layoutNode>
+        <dgm:layoutNode name="textNode" styleLbl="bgShp">
+          <dgm:alg type="tx"/>
+          <dgm:shape xmlns:r="http://schemas.openxmlformats.org/officeDocument/2006/relationships" type="rect" r:blip="" hideGeom="1">
+            <dgm:adjLst>
+              <dgm:adj idx="1" val="0.1"/>
+            </dgm:adjLst>
+          </dgm:shape>
+          <dgm:presOf axis="self"/>
+          <dgm:constrLst>
+            <dgm:constr type="primFontSz" val="65"/>
+            <dgm:constr type="lMarg" refType="primFontSz" fact="0.3"/>
+            <dgm:constr type="rMarg" refType="primFontSz" fact="0.3"/>
+            <dgm:constr type="tMarg" refType="primFontSz" fact="0.3"/>
+            <dgm:constr type="bMarg" refType="primFontSz" fact="0.3"/>
+          </dgm:constrLst>
+          <dgm:ruleLst>
+            <dgm:rule type="primFontSz" val="5" fact="NaN" max="NaN"/>
+          </dgm:ruleLst>
+        </dgm:layoutNode>
+        <dgm:layoutNode name="compChildNode">
+          <dgm:alg type="composite"/>
+          <dgm:shape xmlns:r="http://schemas.openxmlformats.org/officeDocument/2006/relationships" r:blip="">
+            <dgm:adjLst/>
+          </dgm:shape>
+          <dgm:presOf/>
+          <dgm:constrLst>
+            <dgm:constr type="w" for="des" forName="childNode" refType="w"/>
+            <dgm:constr type="h" for="des" forName="childNode" refType="h"/>
+          </dgm:constrLst>
+          <dgm:ruleLst/>
+          <dgm:layoutNode name="theInnerList">
+            <dgm:alg type="lin">
+              <dgm:param type="linDir" val="fromT"/>
+            </dgm:alg>
+            <dgm:shape xmlns:r="http://schemas.openxmlformats.org/officeDocument/2006/relationships" r:blip="">
+              <dgm:adjLst/>
+            </dgm:shape>
+            <dgm:presOf/>
+            <dgm:constrLst/>
+            <dgm:ruleLst/>
+            <dgm:forEach name="childNodeForEach" axis="ch" ptType="node">
+              <dgm:layoutNode name="childNode" styleLbl="node1">
+                <dgm:varLst>
+                  <dgm:bulletEnabled val="1"/>
+                </dgm:varLst>
+                <dgm:alg type="tx"/>
+                <dgm:shape xmlns:r="http://schemas.openxmlformats.org/officeDocument/2006/relationships" type="roundRect" r:blip="">
+                  <dgm:adjLst>
+                    <dgm:adj idx="1" val="0.1"/>
+                  </dgm:adjLst>
+                </dgm:shape>
+                <dgm:presOf axis="desOrSelf" ptType="node"/>
+                <dgm:constrLst>
+                  <dgm:constr type="primFontSz" val="65"/>
+                  <dgm:constr type="tMarg" refType="primFontSz" fact="0.15"/>
+                  <dgm:constr type="bMarg" refType="primFontSz" fact="0.15"/>
+                  <dgm:constr type="lMarg" refType="primFontSz" fact="0.2"/>
+                  <dgm:constr type="rMarg" refType="primFontSz" fact="0.2"/>
+                </dgm:constrLst>
+                <dgm:ruleLst>
+                  <dgm:rule type="primFontSz" val="5" fact="NaN" max="NaN"/>
+                </dgm:ruleLst>
+              </dgm:layoutNode>
+              <dgm:choose name="Name3">
+                <dgm:if name="Name4" axis="self" ptType="node" func="revPos" op="equ" val="1"/>
+                <dgm:else name="Name5">
+                  <dgm:layoutNode name="aSpace2">
+                    <dgm:alg type="sp"/>
+                    <dgm:shape xmlns:r="http://schemas.openxmlformats.org/officeDocument/2006/relationships" r:blip="">
+                      <dgm:adjLst/>
+                    </dgm:shape>
+                    <dgm:presOf/>
+                    <dgm:constrLst/>
+                    <dgm:ruleLst/>
+                  </dgm:layoutNode>
+                </dgm:else>
+              </dgm:choose>
+            </dgm:forEach>
+          </dgm:layoutNode>
+        </dgm:layoutNode>
+      </dgm:layoutNode>
+      <dgm:choose name="Name6">
+        <dgm:if name="Name7" axis="self" ptType="node" func="revPos" op="equ" val="1"/>
+        <dgm:else name="Name8">
+          <dgm:layoutNode name="aSpace">
+            <dgm:alg type="sp"/>
+            <dgm:shape xmlns:r="http://schemas.openxmlformats.org/officeDocument/2006/relationships" r:blip="">
+              <dgm:adjLst/>
+            </dgm:shape>
+            <dgm:presOf/>
+            <dgm:constrLst/>
+            <dgm:ruleLst/>
+          </dgm:layoutNode>
+        </dgm:else>
+      </dgm:choose>
+    </dgm:forEach>
+  </dgm:layoutNode>
+</dgm:layoutDef>
+</file>
+
 <file path=ppt/diagrams/quickStyle1.xml><?xml version="1.0" encoding="utf-8"?>
+<dgm:styleDef xmlns:dgm="http://schemas.openxmlformats.org/drawingml/2006/diagram" xmlns:a="http://schemas.openxmlformats.org/drawingml/2006/main" uniqueId="urn:microsoft.com/office/officeart/2005/8/quickstyle/simple1">
+  <dgm:title val=""/>
+  <dgm:desc val=""/>
+  <dgm:catLst>
+    <dgm:cat type="simple" pri="10100"/>
+  </dgm:catLst>
+  <dgm:scene3d>
+    <a:camera prst="orthographicFront"/>
+    <a:lightRig rig="threePt" dir="t"/>
+  </dgm:scene3d>
+  <dgm:styleLbl name="node0">
+    <dgm:scene3d>
+      <a:camera prst="orthographicFront"/>
+      <a:lightRig rig="threePt" dir="t"/>
+    </dgm:scene3d>
+    <dgm:sp3d/>
+    <dgm:txPr/>
+    <dgm:style>
+      <a:lnRef idx="2">
+        <a:scrgbClr r="0" g="0" b="0"/>
+      </a:lnRef>
+      <a:fillRef idx="1">
+        <a:scrgbClr r="0" g="0" b="0"/>
+      </a:fillRef>
+      <a:effectRef idx="0">
+        <a:scrgbClr r="0" g="0" b="0"/>
+      </a:effectRef>
+      <a:fontRef idx="minor">
+        <a:schemeClr val="lt1"/>
+      </a:fontRef>
+    </dgm:style>
+  </dgm:styleLbl>
+  <dgm:styleLbl name="lnNode1">
+    <dgm:scene3d>
+      <a:camera prst="orthographicFront"/>
+      <a:lightRig rig="threePt" dir="t"/>
+    </dgm:scene3d>
+    <dgm:sp3d/>
+    <dgm:txPr/>
+    <dgm:style>
+      <a:lnRef idx="2">
+        <a:scrgbClr r="0" g="0" b="0"/>
+      </a:lnRef>
+      <a:fillRef idx="1">
+        <a:scrgbClr r="0" g="0" b="0"/>
+      </a:fillRef>
+      <a:effectRef idx="0">
+        <a:scrgbClr r="0" g="0" b="0"/>
+      </a:effectRef>
+      <a:fontRef idx="minor">
+        <a:schemeClr val="lt1"/>
+      </a:fontRef>
+    </dgm:style>
+  </dgm:styleLbl>
+  <dgm:styleLbl name="vennNode1">
+    <dgm:scene3d>
+      <a:camera prst="orthographicFront"/>
+      <a:lightRig rig="threePt" dir="t"/>
+    </dgm:scene3d>
+    <dgm:sp3d/>
+    <dgm:txPr/>
+    <dgm:style>
+      <a:lnRef idx="2">
+        <a:scrgbClr r="0" g="0" b="0"/>
+      </a:lnRef>
+      <a:fillRef idx="1">
+        <a:scrgbClr r="0" g="0" b="0"/>
+      </a:fillRef>
+      <a:effectRef idx="0">
+        <a:scrgbClr r="0" g="0" b="0"/>
+      </a:effectRef>
+      <a:fontRef idx="minor">
+        <a:schemeClr val="tx1"/>
+      </a:fontRef>
+    </dgm:style>
+  </dgm:styleLbl>
+  <dgm:styleLbl name="alignNode1">
+    <dgm:scene3d>
+      <a:camera prst="orthographicFront"/>
+      <a:lightRig rig="threePt" dir="t"/>
+    </dgm:scene3d>
+    <dgm:sp3d/>
+    <dgm:txPr/>
+    <dgm:style>
+      <a:lnRef idx="2">
+        <a:scrgbClr r="0" g="0" b="0"/>
+      </a:lnRef>
+      <a:fillRef idx="1">
+        <a:scrgbClr r="0" g="0" b="0"/>
+      </a:fillRef>
+      <a:effectRef idx="0">
+        <a:scrgbClr r="0" g="0" b="0"/>
+      </a:effectRef>
+      <a:fontRef idx="minor">
+        <a:schemeClr val="lt1"/>
+      </a:fontRef>
+    </dgm:style>
+  </dgm:styleLbl>
+  <dgm:styleLbl name="node1">
+    <dgm:scene3d>
+      <a:camera prst="orthographicFront"/>
+      <a:lightRig rig="threePt" dir="t"/>
+    </dgm:scene3d>
+    <dgm:sp3d/>
+    <dgm:txPr/>
+    <dgm:style>
+      <a:lnRef idx="2">
+        <a:scrgbClr r="0" g="0" b="0"/>
+      </a:lnRef>
+      <a:fillRef idx="1">
+        <a:scrgbClr r="0" g="0" b="0"/>
+      </a:fillRef>
+      <a:effectRef idx="0">
+        <a:scrgbClr r="0" g="0" b="0"/>
+      </a:effectRef>
+      <a:fontRef idx="minor">
+        <a:schemeClr val="lt1"/>
+      </a:fontRef>
+    </dgm:style>
+  </dgm:styleLbl>
+  <dgm:styleLbl name="node2">
+    <dgm:scene3d>
+      <a:camera prst="orthographicFront"/>
+      <a:lightRig rig="threePt" dir="t"/>
+    </dgm:scene3d>
+    <dgm:sp3d/>
+    <dgm:txPr/>
+    <dgm:style>
+      <a:lnRef idx="2">
+        <a:scrgbClr r="0" g="0" b="0"/>
+      </a:lnRef>
+      <a:fillRef idx="1">
+        <a:scrgbClr r="0" g="0" b="0"/>
+      </a:fillRef>
+      <a:effectRef idx="0">
+        <a:scrgbClr r="0" g="0" b="0"/>
+      </a:effectRef>
+      <a:fontRef idx="minor">
+        <a:schemeClr val="lt1"/>
+      </a:fontRef>
+    </dgm:style>
+  </dgm:styleLbl>
+  <dgm:styleLbl name="node3">
+    <dgm:scene3d>
+      <a:camera prst="orthographicFront"/>
+      <a:lightRig rig="threePt" dir="t"/>
+    </dgm:scene3d>
+    <dgm:sp3d/>
+    <dgm:txPr/>
+    <dgm:style>
+      <a:lnRef idx="2">
+        <a:scrgbClr r="0" g="0" b="0"/>
+      </a:lnRef>
+      <a:fillRef idx="1">
+        <a:scrgbClr r="0" g="0" b="0"/>
+      </a:fillRef>
+      <a:effectRef idx="0">
+        <a:scrgbClr r="0" g="0" b="0"/>
+      </a:effectRef>
+      <a:fontRef idx="minor">
+        <a:schemeClr val="lt1"/>
+      </a:fontRef>
+    </dgm:style>
+  </dgm:styleLbl>
+  <dgm:styleLbl name="node4">
+    <dgm:scene3d>
+      <a:camera prst="orthographicFront"/>
+      <a:lightRig rig="threePt" dir="t"/>
+    </dgm:scene3d>
+    <dgm:sp3d/>
+    <dgm:txPr/>
+    <dgm:style>
+      <a:lnRef idx="2">
+        <a:scrgbClr r="0" g="0" b="0"/>
+      </a:lnRef>
+      <a:fillRef idx="1">
+        <a:scrgbClr r="0" g="0" b="0"/>
+      </a:fillRef>
+      <a:effectRef idx="0">
+        <a:scrgbClr r="0" g="0" b="0"/>
+      </a:effectRef>
+      <a:fontRef idx="minor">
+        <a:schemeClr val="lt1"/>
+      </a:fontRef>
+    </dgm:style>
+  </dgm:styleLbl>
+  <dgm:styleLbl name="fgImgPlace1">
+    <dgm:scene3d>
+      <a:camera prst="orthographicFront"/>
+      <a:lightRig rig="threePt" dir="t"/>
+    </dgm:scene3d>
+    <dgm:sp3d/>
+    <dgm:txPr/>
+    <dgm:style>
+      <a:lnRef idx="2">
+        <a:scrgbClr r="0" g="0" b="0"/>
+      </a:lnRef>
+      <a:fillRef idx="1">
+        <a:scrgbClr r="0" g="0" b="0"/>
+      </a:fillRef>
+      <a:effectRef idx="0">
+        <a:scrgbClr r="0" g="0" b="0"/>
+      </a:effectRef>
+      <a:fontRef idx="minor"/>
+    </dgm:style>
+  </dgm:styleLbl>
+  <dgm:styleLbl name="alignImgPlace1">
+    <dgm:scene3d>
+      <a:camera prst="orthographicFront"/>
+      <a:lightRig rig="threePt" dir="t"/>
+    </dgm:scene3d>
+    <dgm:sp3d/>
+    <dgm:txPr/>
+    <dgm:style>
+      <a:lnRef idx="2">
+        <a:scrgbClr r="0" g="0" b="0"/>
+      </a:lnRef>
+      <a:fillRef idx="1">
+        <a:scrgbClr r="0" g="0" b="0"/>
+      </a:fillRef>
+      <a:effectRef idx="0">
+        <a:scrgbClr r="0" g="0" b="0"/>
+      </a:effectRef>
+      <a:fontRef idx="minor"/>
+    </dgm:style>
+  </dgm:styleLbl>
+  <dgm:styleLbl name="bgImgPlace1">
+    <dgm:scene3d>
+      <a:camera prst="orthographicFront"/>
+      <a:lightRig rig="threePt" dir="t"/>
+    </dgm:scene3d>
+    <dgm:sp3d/>
+    <dgm:txPr/>
+    <dgm:style>
+      <a:lnRef idx="2">
+        <a:scrgbClr r="0" g="0" b="0"/>
+      </a:lnRef>
+      <a:fillRef idx="1">
+        <a:scrgbClr r="0" g="0" b="0"/>
+      </a:fillRef>
+      <a:effectRef idx="0">
+        <a:scrgbClr r="0" g="0" b="0"/>
+      </a:effectRef>
+      <a:fontRef idx="minor"/>
+    </dgm:style>
+  </dgm:styleLbl>
+  <dgm:styleLbl name="sibTrans2D1">
+    <dgm:scene3d>
+      <a:camera prst="orthographicFront"/>
+      <a:lightRig rig="threePt" dir="t"/>
+    </dgm:scene3d>
+    <dgm:sp3d/>
+    <dgm:txPr/>
+    <dgm:style>
+      <a:lnRef idx="0">
+        <a:scrgbClr r="0" g="0" b="0"/>
+      </a:lnRef>
+      <a:fillRef idx="1">
+        <a:scrgbClr r="0" g="0" b="0"/>
+      </a:fillRef>
+      <a:effectRef idx="0">
+        <a:scrgbClr r="0" g="0" b="0"/>
+      </a:effectRef>
+      <a:fontRef idx="minor">
+        <a:schemeClr val="lt1"/>
+      </a:fontRef>
+    </dgm:style>
+  </dgm:styleLbl>
+  <dgm:styleLbl name="fgSibTrans2D1">
+    <dgm:scene3d>
+      <a:camera prst="orthographicFront"/>
+      <a:lightRig rig="threePt" dir="t"/>
+    </dgm:scene3d>
+    <dgm:sp3d/>
+    <dgm:txPr/>
+    <dgm:style>
+      <a:lnRef idx="0">
+        <a:scrgbClr r="0" g="0" b="0"/>
+      </a:lnRef>
+      <a:fillRef idx="1">
+        <a:scrgbClr r="0" g="0" b="0"/>
+      </a:fillRef>
+      <a:effectRef idx="0">
+        <a:scrgbClr r="0" g="0" b="0"/>
+      </a:effectRef>
+      <a:fontRef idx="minor">
+        <a:schemeClr val="lt1"/>
+      </a:fontRef>
+    </dgm:style>
+  </dgm:styleLbl>
+  <dgm:styleLbl name="bgSibTrans2D1">
+    <dgm:scene3d>
+      <a:camera prst="orthographicFront"/>
+      <a:lightRig rig="threePt" dir="t"/>
+    </dgm:scene3d>
+    <dgm:sp3d/>
+    <dgm:txPr/>
+    <dgm:style>
+      <a:lnRef idx="0">
+        <a:scrgbClr r="0" g="0" b="0"/>
+      </a:lnRef>
+      <a:fillRef idx="1">
+        <a:scrgbClr r="0" g="0" b="0"/>
+      </a:fillRef>
+      <a:effectRef idx="0">
+        <a:scrgbClr r="0" g="0" b="0"/>
+      </a:effectRef>
+      <a:fontRef idx="minor">
+        <a:schemeClr val="lt1"/>
+      </a:fontRef>
+    </dgm:style>
+  </dgm:styleLbl>
+  <dgm:styleLbl name="sibTrans1D1">
+    <dgm:scene3d>
+      <a:camera prst="orthographicFront"/>
+      <a:lightRig rig="threePt" dir="t"/>
+    </dgm:scene3d>
+    <dgm:sp3d/>
+    <dgm:txPr/>
+    <dgm:style>
+      <a:lnRef idx="1">
+        <a:scrgbClr r="0" g="0" b="0"/>
+      </a:lnRef>
+      <a:fillRef idx="0">
+        <a:scrgbClr r="0" g="0" b="0"/>
+      </a:fillRef>
+      <a:effectRef idx="0">
+        <a:scrgbClr r="0" g="0" b="0"/>
+      </a:effectRef>
+      <a:fontRef idx="minor"/>
+    </dgm:style>
+  </dgm:styleLbl>
+  <dgm:styleLbl name="callout">
+    <dgm:scene3d>
+      <a:camera prst="orthographicFront"/>
+      <a:lightRig rig="threePt" dir="t"/>
+    </dgm:scene3d>
+    <dgm:sp3d/>
+    <dgm:txPr/>
+    <dgm:style>
+      <a:lnRef idx="2">
+        <a:scrgbClr r="0" g="0" b="0"/>
+      </a:lnRef>
+      <a:fillRef idx="1">
+        <a:scrgbClr r="0" g="0" b="0"/>
+      </a:fillRef>
+      <a:effectRef idx="0">
+        <a:scrgbClr r="0" g="0" b="0"/>
+      </a:effectRef>
+      <a:fontRef idx="minor"/>
+    </dgm:style>
+  </dgm:styleLbl>
+  <dgm:styleLbl name="asst0">
+    <dgm:scene3d>
+      <a:camera prst="orthographicFront"/>
+      <a:lightRig rig="threePt" dir="t"/>
+    </dgm:scene3d>
+    <dgm:sp3d/>
+    <dgm:txPr/>
+    <dgm:style>
+      <a:lnRef idx="2">
+        <a:scrgbClr r="0" g="0" b="0"/>
+      </a:lnRef>
+      <a:fillRef idx="1">
+        <a:scrgbClr r="0" g="0" b="0"/>
+      </a:fillRef>
+      <a:effectRef idx="0">
+        <a:scrgbClr r="0" g="0" b="0"/>
+      </a:effectRef>
+      <a:fontRef idx="minor">
+        <a:schemeClr val="lt1"/>
+      </a:fontRef>
+    </dgm:style>
+  </dgm:styleLbl>
+  <dgm:styleLbl name="asst1">
+    <dgm:scene3d>
+      <a:camera prst="orthographicFront"/>
+      <a:lightRig rig="threePt" dir="t"/>
+    </dgm:scene3d>
+    <dgm:sp3d/>
+    <dgm:txPr/>
+    <dgm:style>
+      <a:lnRef idx="2">
+        <a:scrgbClr r="0" g="0" b="0"/>
+      </a:lnRef>
+      <a:fillRef idx="1">
+        <a:scrgbClr r="0" g="0" b="0"/>
+      </a:fillRef>
+      <a:effectRef idx="0">
+        <a:scrgbClr r="0" g="0" b="0"/>
+      </a:effectRef>
+      <a:fontRef idx="minor">
+        <a:schemeClr val="lt1"/>
+      </a:fontRef>
+    </dgm:style>
+  </dgm:styleLbl>
+  <dgm:styleLbl name="asst2">
+    <dgm:scene3d>
+      <a:camera prst="orthographicFront"/>
+      <a:lightRig rig="threePt" dir="t"/>
+    </dgm:scene3d>
+    <dgm:sp3d/>
+    <dgm:txPr/>
+    <dgm:style>
+      <a:lnRef idx="2">
+        <a:scrgbClr r="0" g="0" b="0"/>
+      </a:lnRef>
+      <a:fillRef idx="1">
+        <a:scrgbClr r="0" g="0" b="0"/>
+      </a:fillRef>
+      <a:effectRef idx="0">
+        <a:scrgbClr r="0" g="0" b="0"/>
+      </a:effectRef>
+      <a:fontRef idx="minor">
+        <a:schemeClr val="lt1"/>
+      </a:fontRef>
+    </dgm:style>
+  </dgm:styleLbl>
+  <dgm:styleLbl name="asst3">
+    <dgm:scene3d>
+      <a:camera prst="orthographicFront"/>
+      <a:lightRig rig="threePt" dir="t"/>
+    </dgm:scene3d>
+    <dgm:sp3d/>
+    <dgm:txPr/>
+    <dgm:style>
+      <a:lnRef idx="2">
+        <a:scrgbClr r="0" g="0" b="0"/>
+      </a:lnRef>
+      <a:fillRef idx="1">
+        <a:scrgbClr r="0" g="0" b="0"/>
+      </a:fillRef>
+      <a:effectRef idx="0">
+        <a:scrgbClr r="0" g="0" b="0"/>
+      </a:effectRef>
+      <a:fontRef idx="minor">
+        <a:schemeClr val="lt1"/>
+      </a:fontRef>
+    </dgm:style>
+  </dgm:styleLbl>
+  <dgm:styleLbl name="asst4">
+    <dgm:scene3d>
+      <a:camera prst="orthographicFront"/>
+      <a:lightRig rig="threePt" dir="t"/>
+    </dgm:scene3d>
+    <dgm:sp3d/>
+    <dgm:txPr/>
+    <dgm:style>
+      <a:lnRef idx="2">
+        <a:scrgbClr r="0" g="0" b="0"/>
+      </a:lnRef>
+      <a:fillRef idx="1">
+        <a:scrgbClr r="0" g="0" b="0"/>
+      </a:fillRef>
+      <a:effectRef idx="0">
+        <a:scrgbClr r="0" g="0" b="0"/>
+      </a:effectRef>
+      <a:fontRef idx="minor">
+        <a:schemeClr val="lt1"/>
+      </a:fontRef>
+    </dgm:style>
+  </dgm:styleLbl>
+  <dgm:styleLbl name="parChTrans2D1">
+    <dgm:scene3d>
+      <a:camera prst="orthographicFront"/>
+      <a:lightRig rig="threePt" dir="t"/>
+    </dgm:scene3d>
+    <dgm:sp3d/>
+    <dgm:txPr/>
+    <dgm:style>
+      <a:lnRef idx="2">
+        <a:scrgbClr r="0" g="0" b="0"/>
+      </a:lnRef>
+      <a:fillRef idx="1">
+        <a:scrgbClr r="0" g="0" b="0"/>
+      </a:fillRef>
+      <a:effectRef idx="0">
+        <a:scrgbClr r="0" g="0" b="0"/>
+      </a:effectRef>
+      <a:fontRef idx="minor">
+        <a:schemeClr val="lt1"/>
+      </a:fontRef>
+    </dgm:style>
+  </dgm:styleLbl>
+  <dgm:styleLbl name="parChTrans2D2">
+    <dgm:scene3d>
+      <a:camera prst="orthographicFront"/>
+      <a:lightRig rig="threePt" dir="t"/>
+    </dgm:scene3d>
+    <dgm:sp3d/>
+    <dgm:txPr/>
+    <dgm:style>
+      <a:lnRef idx="2">
+        <a:scrgbClr r="0" g="0" b="0"/>
+      </a:lnRef>
+      <a:fillRef idx="1">
+        <a:scrgbClr r="0" g="0" b="0"/>
+      </a:fillRef>
+      <a:effectRef idx="0">
+        <a:scrgbClr r="0" g="0" b="0"/>
+      </a:effectRef>
+      <a:fontRef idx="minor">
+        <a:schemeClr val="lt1"/>
+      </a:fontRef>
+    </dgm:style>
+  </dgm:styleLbl>
+  <dgm:styleLbl name="parChTrans2D3">
+    <dgm:scene3d>
+      <a:camera prst="orthographicFront"/>
+      <a:lightRig rig="threePt" dir="t"/>
+    </dgm:scene3d>
+    <dgm:sp3d/>
+    <dgm:txPr/>
+    <dgm:style>
+      <a:lnRef idx="2">
+        <a:scrgbClr r="0" g="0" b="0"/>
+      </a:lnRef>
+      <a:fillRef idx="1">
+        <a:scrgbClr r="0" g="0" b="0"/>
+      </a:fillRef>
+      <a:effectRef idx="0">
+        <a:scrgbClr r="0" g="0" b="0"/>
+      </a:effectRef>
+      <a:fontRef idx="minor">
+        <a:schemeClr val="lt1"/>
+      </a:fontRef>
+    </dgm:style>
+  </dgm:styleLbl>
+  <dgm:styleLbl name="parChTrans2D4">
+    <dgm:scene3d>
+      <a:camera prst="orthographicFront"/>
+      <a:lightRig rig="threePt" dir="t"/>
+    </dgm:scene3d>
+    <dgm:sp3d/>
+    <dgm:txPr/>
+    <dgm:style>
+      <a:lnRef idx="2">
+        <a:scrgbClr r="0" g="0" b="0"/>
+      </a:lnRef>
+      <a:fillRef idx="1">
+        <a:scrgbClr r="0" g="0" b="0"/>
+      </a:fillRef>
+      <a:effectRef idx="0">
+        <a:scrgbClr r="0" g="0" b="0"/>
+      </a:effectRef>
+      <a:fontRef idx="minor">
+        <a:schemeClr val="lt1"/>
+      </a:fontRef>
+    </dgm:style>
+  </dgm:styleLbl>
+  <dgm:styleLbl name="parChTrans1D1">
+    <dgm:scene3d>
+      <a:camera prst="orthographicFront"/>
+      <a:lightRig rig="threePt" dir="t"/>
+    </dgm:scene3d>
+    <dgm:sp3d/>
+    <dgm:txPr/>
+    <dgm:style>
+      <a:lnRef idx="2">
+        <a:scrgbClr r="0" g="0" b="0"/>
+      </a:lnRef>
+      <a:fillRef idx="0">
+        <a:scrgbClr r="0" g="0" b="0"/>
+      </a:fillRef>
+      <a:effectRef idx="0">
+        <a:scrgbClr r="0" g="0" b="0"/>
+      </a:effectRef>
+      <a:fontRef idx="minor"/>
+    </dgm:style>
+  </dgm:styleLbl>
+  <dgm:styleLbl name="parChTrans1D2">
+    <dgm:scene3d>
+      <a:camera prst="orthographicFront"/>
+      <a:lightRig rig="threePt" dir="t"/>
+    </dgm:scene3d>
+    <dgm:sp3d/>
+    <dgm:txPr/>
+    <dgm:style>
+      <a:lnRef idx="2">
+        <a:scrgbClr r="0" g="0" b="0"/>
+      </a:lnRef>
+      <a:fillRef idx="0">
+        <a:scrgbClr r="0" g="0" b="0"/>
+      </a:fillRef>
+      <a:effectRef idx="0">
+        <a:scrgbClr r="0" g="0" b="0"/>
+      </a:effectRef>
+      <a:fontRef idx="minor"/>
+    </dgm:style>
+  </dgm:styleLbl>
+  <dgm:styleLbl name="parChTrans1D3">
+    <dgm:scene3d>
+      <a:camera prst="orthographicFront"/>
+      <a:lightRig rig="threePt" dir="t"/>
+    </dgm:scene3d>
+    <dgm:sp3d/>
+    <dgm:txPr/>
+    <dgm:style>
+      <a:lnRef idx="2">
+        <a:scrgbClr r="0" g="0" b="0"/>
+      </a:lnRef>
+      <a:fillRef idx="0">
+        <a:scrgbClr r="0" g="0" b="0"/>
+      </a:fillRef>
+      <a:effectRef idx="0">
+        <a:scrgbClr r="0" g="0" b="0"/>
+      </a:effectRef>
+      <a:fontRef idx="minor"/>
+    </dgm:style>
+  </dgm:styleLbl>
+  <dgm:styleLbl name="parChTrans1D4">
+    <dgm:scene3d>
+      <a:camera prst="orthographicFront"/>
+      <a:lightRig rig="threePt" dir="t"/>
+    </dgm:scene3d>
+    <dgm:sp3d/>
+    <dgm:txPr/>
+    <dgm:style>
+      <a:lnRef idx="2">
+        <a:scrgbClr r="0" g="0" b="0"/>
+      </a:lnRef>
+      <a:fillRef idx="0">
+        <a:scrgbClr r="0" g="0" b="0"/>
+      </a:fillRef>
+      <a:effectRef idx="0">
+        <a:scrgbClr r="0" g="0" b="0"/>
+      </a:effectRef>
+      <a:fontRef idx="minor"/>
+    </dgm:style>
+  </dgm:styleLbl>
+  <dgm:styleLbl name="fgAcc1">
+    <dgm:scene3d>
+      <a:camera prst="orthographicFront"/>
+      <a:lightRig rig="threePt" dir="t"/>
+    </dgm:scene3d>
+    <dgm:sp3d/>
+    <dgm:txPr/>
+    <dgm:style>
+      <a:lnRef idx="2">
+        <a:scrgbClr r="0" g="0" b="0"/>
+      </a:lnRef>
+      <a:fillRef idx="1">
+        <a:scrgbClr r="0" g="0" b="0"/>
+      </a:fillRef>
+      <a:effectRef idx="0">
+        <a:scrgbClr r="0" g="0" b="0"/>
+      </a:effectRef>
+      <a:fontRef idx="minor"/>
+    </dgm:style>
+  </dgm:styleLbl>
+  <dgm:styleLbl name="conFgAcc1">
+    <dgm:scene3d>
+      <a:camera prst="orthographicFront"/>
+      <a:lightRig rig="threePt" dir="t"/>
+    </dgm:scene3d>
+    <dgm:sp3d/>
+    <dgm:txPr/>
+    <dgm:style>
+      <a:lnRef idx="2">
+        <a:scrgbClr r="0" g="0" b="0"/>
+      </a:lnRef>
+      <a:fillRef idx="1">
+        <a:scrgbClr r="0" g="0" b="0"/>
+      </a:fillRef>
+      <a:effectRef idx="0">
+        <a:scrgbClr r="0" g="0" b="0"/>
+      </a:effectRef>
+      <a:fontRef idx="minor"/>
+    </dgm:style>
+  </dgm:styleLbl>
+  <dgm:styleLbl name="alignAcc1">
+    <dgm:scene3d>
+      <a:camera prst="orthographicFront"/>
+      <a:lightRig rig="threePt" dir="t"/>
+    </dgm:scene3d>
+    <dgm:sp3d/>
+    <dgm:txPr/>
+    <dgm:style>
+      <a:lnRef idx="2">
+        <a:scrgbClr r="0" g="0" b="0"/>
+      </a:lnRef>
+      <a:fillRef idx="1">
+        <a:scrgbClr r="0" g="0" b="0"/>
+      </a:fillRef>
+      <a:effectRef idx="0">
+        <a:scrgbClr r="0" g="0" b="0"/>
+      </a:effectRef>
+      <a:fontRef idx="minor"/>
+    </dgm:style>
+  </dgm:styleLbl>
+  <dgm:styleLbl name="trAlignAcc1">
+    <dgm:scene3d>
+      <a:camera prst="orthographicFront"/>
+      <a:lightRig rig="threePt" dir="t"/>
+    </dgm:scene3d>
+    <dgm:sp3d/>
+    <dgm:txPr/>
+    <dgm:style>
+      <a:lnRef idx="1">
+        <a:scrgbClr r="0" g="0" b="0"/>
+      </a:lnRef>
+      <a:fillRef idx="1">
+        <a:scrgbClr r="0" g="0" b="0"/>
+      </a:fillRef>
+      <a:effectRef idx="0">
+        <a:scrgbClr r="0" g="0" b="0"/>
+      </a:effectRef>
+      <a:fontRef idx="minor"/>
+    </dgm:style>
+  </dgm:styleLbl>
+  <dgm:styleLbl name="bgAcc1">
+    <dgm:scene3d>
+      <a:camera prst="orthographicFront"/>
+      <a:lightRig rig="threePt" dir="t"/>
+    </dgm:scene3d>
+    <dgm:sp3d/>
+    <dgm:txPr/>
+    <dgm:style>
+      <a:lnRef idx="2">
+        <a:scrgbClr r="0" g="0" b="0"/>
+      </a:lnRef>
+      <a:fillRef idx="1">
+        <a:scrgbClr r="0" g="0" b="0"/>
+      </a:fillRef>
+      <a:effectRef idx="0">
+        <a:scrgbClr r="0" g="0" b="0"/>
+      </a:effectRef>
+      <a:fontRef idx="minor"/>
+    </dgm:style>
+  </dgm:styleLbl>
+  <dgm:styleLbl name="solidFgAcc1">
+    <dgm:scene3d>
+      <a:camera prst="orthographicFront"/>
+      <a:lightRig rig="threePt" dir="t"/>
+    </dgm:scene3d>
+    <dgm:sp3d/>
+    <dgm:txPr/>
+    <dgm:style>
+      <a:lnRef idx="2">
+        <a:scrgbClr r="0" g="0" b="0"/>
+      </a:lnRef>
+      <a:fillRef idx="1">
+        <a:scrgbClr r="0" g="0" b="0"/>
+      </a:fillRef>
+      <a:effectRef idx="0">
+        <a:scrgbClr r="0" g="0" b="0"/>
+      </a:effectRef>
+      <a:fontRef idx="minor"/>
+    </dgm:style>
+  </dgm:styleLbl>
+  <dgm:styleLbl name="solidAlignAcc1">
+    <dgm:scene3d>
+      <a:camera prst="orthographicFront"/>
+      <a:lightRig rig="threePt" dir="t"/>
+    </dgm:scene3d>
+    <dgm:sp3d/>
+    <dgm:txPr/>
+    <dgm:style>
+      <a:lnRef idx="2">
+        <a:scrgbClr r="0" g="0" b="0"/>
+      </a:lnRef>
+      <a:fillRef idx="1">
+        <a:scrgbClr r="0" g="0" b="0"/>
+      </a:fillRef>
+      <a:effectRef idx="0">
+        <a:scrgbClr r="0" g="0" b="0"/>
+      </a:effectRef>
+      <a:fontRef idx="minor"/>
+    </dgm:style>
+  </dgm:styleLbl>
+  <dgm:styleLbl name="solidBgAcc1">
+    <dgm:scene3d>
+      <a:camera prst="orthographicFront"/>
+      <a:lightRig rig="threePt" dir="t"/>
+    </dgm:scene3d>
+    <dgm:sp3d/>
+    <dgm:txPr/>
+    <dgm:style>
+      <a:lnRef idx="2">
+        <a:scrgbClr r="0" g="0" b="0"/>
+      </a:lnRef>
+      <a:fillRef idx="1">
+        <a:scrgbClr r="0" g="0" b="0"/>
+      </a:fillRef>
+      <a:effectRef idx="0">
+        <a:scrgbClr r="0" g="0" b="0"/>
+      </a:effectRef>
+      <a:fontRef idx="minor"/>
+    </dgm:style>
+  </dgm:styleLbl>
+  <dgm:styleLbl name="fgAccFollowNode1">
+    <dgm:scene3d>
+      <a:camera prst="orthographicFront"/>
+      <a:lightRig rig="threePt" dir="t"/>
+    </dgm:scene3d>
+    <dgm:sp3d/>
+    <dgm:txPr/>
+    <dgm:style>
+      <a:lnRef idx="2">
+        <a:scrgbClr r="0" g="0" b="0"/>
+      </a:lnRef>
+      <a:fillRef idx="1">
+        <a:scrgbClr r="0" g="0" b="0"/>
+      </a:fillRef>
+      <a:effectRef idx="0">
+        <a:scrgbClr r="0" g="0" b="0"/>
+      </a:effectRef>
+      <a:fontRef idx="minor"/>
+    </dgm:style>
+  </dgm:styleLbl>
+  <dgm:styleLbl name="alignAccFollowNode1">
+    <dgm:scene3d>
+      <a:camera prst="orthographicFront"/>
+      <a:lightRig rig="threePt" dir="t"/>
+    </dgm:scene3d>
+    <dgm:sp3d/>
+    <dgm:txPr/>
+    <dgm:style>
+      <a:lnRef idx="2">
+        <a:scrgbClr r="0" g="0" b="0"/>
+      </a:lnRef>
+      <a:fillRef idx="1">
+        <a:scrgbClr r="0" g="0" b="0"/>
+      </a:fillRef>
+      <a:effectRef idx="0">
+        <a:scrgbClr r="0" g="0" b="0"/>
+      </a:effectRef>
+      <a:fontRef idx="minor"/>
+    </dgm:style>
+  </dgm:styleLbl>
+  <dgm:styleLbl name="bgAccFollowNode1">
+    <dgm:scene3d>
+      <a:camera prst="orthographicFront"/>
+      <a:lightRig rig="threePt" dir="t"/>
+    </dgm:scene3d>
+    <dgm:sp3d/>
+    <dgm:txPr/>
+    <dgm:style>
+      <a:lnRef idx="2">
+        <a:scrgbClr r="0" g="0" b="0"/>
+      </a:lnRef>
+      <a:fillRef idx="1">
+        <a:scrgbClr r="0" g="0" b="0"/>
+      </a:fillRef>
+      <a:effectRef idx="0">
+        <a:scrgbClr r="0" g="0" b="0"/>
+      </a:effectRef>
+      <a:fontRef idx="minor"/>
+    </dgm:style>
+  </dgm:styleLbl>
+  <dgm:styleLbl name="fgAcc0">
+    <dgm:scene3d>
+      <a:camera prst="orthographicFront"/>
+      <a:lightRig rig="threePt" dir="t"/>
+    </dgm:scene3d>
+    <dgm:sp3d/>
+    <dgm:txPr/>
+    <dgm:style>
+      <a:lnRef idx="2">
+        <a:scrgbClr r="0" g="0" b="0"/>
+      </a:lnRef>
+      <a:fillRef idx="1">
+        <a:scrgbClr r="0" g="0" b="0"/>
+      </a:fillRef>
+      <a:effectRef idx="0">
+        <a:scrgbClr r="0" g="0" b="0"/>
+      </a:effectRef>
+      <a:fontRef idx="minor"/>
+    </dgm:style>
+  </dgm:styleLbl>
+  <dgm:styleLbl name="fgAcc2">
+    <dgm:scene3d>
+      <a:camera prst="orthographicFront"/>
+      <a:lightRig rig="threePt" dir="t"/>
+    </dgm:scene3d>
+    <dgm:sp3d/>
+    <dgm:txPr/>
+    <dgm:style>
+      <a:lnRef idx="2">
+        <a:scrgbClr r="0" g="0" b="0"/>
+      </a:lnRef>
+      <a:fillRef idx="1">
+        <a:scrgbClr r="0" g="0" b="0"/>
+      </a:fillRef>
+      <a:effectRef idx="0">
+        <a:scrgbClr r="0" g="0" b="0"/>
+      </a:effectRef>
+      <a:fontRef idx="minor"/>
+    </dgm:style>
+  </dgm:styleLbl>
+  <dgm:styleLbl name="fgAcc3">
+    <dgm:scene3d>
+      <a:camera prst="orthographicFront"/>
+      <a:lightRig rig="threePt" dir="t"/>
+    </dgm:scene3d>
+    <dgm:sp3d/>
+    <dgm:txPr/>
+    <dgm:style>
+      <a:lnRef idx="2">
+        <a:scrgbClr r="0" g="0" b="0"/>
+      </a:lnRef>
+      <a:fillRef idx="1">
+        <a:scrgbClr r="0" g="0" b="0"/>
+      </a:fillRef>
+      <a:effectRef idx="0">
+        <a:scrgbClr r="0" g="0" b="0"/>
+      </a:effectRef>
+      <a:fontRef idx="minor"/>
+    </dgm:style>
+  </dgm:styleLbl>
+  <dgm:styleLbl name="fgAcc4">
+    <dgm:scene3d>
+      <a:camera prst="orthographicFront"/>
+      <a:lightRig rig="threePt" dir="t"/>
+    </dgm:scene3d>
+    <dgm:sp3d/>
+    <dgm:txPr/>
+    <dgm:style>
+      <a:lnRef idx="2">
+        <a:scrgbClr r="0" g="0" b="0"/>
+      </a:lnRef>
+      <a:fillRef idx="1">
+        <a:scrgbClr r="0" g="0" b="0"/>
+      </a:fillRef>
+      <a:effectRef idx="0">
+        <a:scrgbClr r="0" g="0" b="0"/>
+      </a:effectRef>
+      <a:fontRef idx="minor"/>
+    </dgm:style>
+  </dgm:styleLbl>
+  <dgm:styleLbl name="bgShp">
+    <dgm:scene3d>
+      <a:camera prst="orthographicFront"/>
+      <a:lightRig rig="threePt" dir="t"/>
+    </dgm:scene3d>
+    <dgm:sp3d/>
+    <dgm:txPr/>
+    <dgm:style>
+      <a:lnRef idx="0">
+        <a:scrgbClr r="0" g="0" b="0"/>
+      </a:lnRef>
+      <a:fillRef idx="1">
+        <a:scrgbClr r="0" g="0" b="0"/>
+      </a:fillRef>
+      <a:effectRef idx="0">
+        <a:scrgbClr r="0" g="0" b="0"/>
+      </a:effectRef>
+      <a:fontRef idx="minor"/>
+    </dgm:style>
+  </dgm:styleLbl>
+  <dgm:styleLbl name="dkBgShp">
+    <dgm:scene3d>
+      <a:camera prst="orthographicFront"/>
+      <a:lightRig rig="threePt" dir="t"/>
+    </dgm:scene3d>
+    <dgm:sp3d/>
+    <dgm:txPr/>
+    <dgm:style>
+      <a:lnRef idx="0">
+        <a:scrgbClr r="0" g="0" b="0"/>
+      </a:lnRef>
+      <a:fillRef idx="1">
+        <a:scrgbClr r="0" g="0" b="0"/>
+      </a:fillRef>
+      <a:effectRef idx="0">
+        <a:scrgbClr r="0" g="0" b="0"/>
+      </a:effectRef>
+      <a:fontRef idx="minor"/>
+    </dgm:style>
+  </dgm:styleLbl>
+  <dgm:styleLbl name="trBgShp">
+    <dgm:scene3d>
+      <a:camera prst="orthographicFront"/>
+      <a:lightRig rig="threePt" dir="t"/>
+    </dgm:scene3d>
+    <dgm:sp3d/>
+    <dgm:txPr/>
+    <dgm:style>
+      <a:lnRef idx="0">
+        <a:scrgbClr r="0" g="0" b="0"/>
+      </a:lnRef>
+      <a:fillRef idx="1">
+        <a:scrgbClr r="0" g="0" b="0"/>
+      </a:fillRef>
+      <a:effectRef idx="0">
+        <a:scrgbClr r="0" g="0" b="0"/>
+      </a:effectRef>
+      <a:fontRef idx="minor"/>
+    </dgm:style>
+  </dgm:styleLbl>
+  <dgm:styleLbl name="fgShp">
+    <dgm:scene3d>
+      <a:camera prst="orthographicFront"/>
+      <a:lightRig rig="threePt" dir="t"/>
+    </dgm:scene3d>
+    <dgm:sp3d/>
+    <dgm:txPr/>
+    <dgm:style>
+      <a:lnRef idx="2">
+        <a:scrgbClr r="0" g="0" b="0"/>
+      </a:lnRef>
+      <a:fillRef idx="1">
+        <a:scrgbClr r="0" g="0" b="0"/>
+      </a:fillRef>
+      <a:effectRef idx="0">
+        <a:scrgbClr r="0" g="0" b="0"/>
+      </a:effectRef>
+      <a:fontRef idx="minor"/>
+    </dgm:style>
+  </dgm:styleLbl>
+  <dgm:styleLbl name="revTx">
+    <dgm:scene3d>
+      <a:camera prst="orthographicFront"/>
+      <a:lightRig rig="threePt" dir="t"/>
+    </dgm:scene3d>
+    <dgm:sp3d/>
+    <dgm:txPr/>
+    <dgm:style>
+      <a:lnRef idx="0">
+        <a:scrgbClr r="0" g="0" b="0"/>
+      </a:lnRef>
+      <a:fillRef idx="0">
+        <a:scrgbClr r="0" g="0" b="0"/>
+      </a:fillRef>
+      <a:effectRef idx="0">
+        <a:scrgbClr r="0" g="0" b="0"/>
+      </a:effectRef>
+      <a:fontRef idx="minor"/>
+    </dgm:style>
+  </dgm:styleLbl>
+</dgm:styleDef>
+</file>
+
+<file path=ppt/diagrams/quickStyle2.xml><?xml version="1.0" encoding="utf-8"?>
 <dgm:styleDef xmlns:dgm="http://schemas.openxmlformats.org/drawingml/2006/diagram" xmlns:a="http://schemas.openxmlformats.org/drawingml/2006/main" uniqueId="urn:microsoft.com/office/officeart/2005/8/quickstyle/simple1">
   <dgm:title val=""/>
   <dgm:desc val=""/>
@@ -2993,7 +7084,7 @@
           <a:p>
             <a:fld id="{CDDF240B-3CA8-4045-B7C9-8B67F6FA2B5E}" type="datetimeFigureOut">
               <a:rPr lang="en-US" smtClean="0"/>
-              <a:t>2019-04-13</a:t>
+              <a:t>2019-04-14</a:t>
             </a:fld>
             <a:endParaRPr lang="en-US"/>
           </a:p>
@@ -3158,7 +7249,7 @@
           <a:p>
             <a:fld id="{06EDAF69-7046-4476-96BB-1FD28CD0E6CB}" type="datetimeFigureOut">
               <a:rPr lang="en-US" smtClean="0"/>
-              <a:t>2019-04-13</a:t>
+              <a:t>2019-04-14</a:t>
             </a:fld>
             <a:endParaRPr lang="en-US"/>
           </a:p>
@@ -3707,7 +7798,7 @@
           <a:p>
             <a:fld id="{E966FD14-566E-42DE-909E-454DEC22792F}" type="datetime1">
               <a:rPr lang="ru-RU" smtClean="0"/>
-              <a:t>13.04.2019</a:t>
+              <a:t>14.04.2019</a:t>
             </a:fld>
             <a:endParaRPr lang="en-US"/>
           </a:p>
@@ -4033,7 +8124,7 @@
           <a:p>
             <a:fld id="{F217C255-2559-42F5-A68F-FDE5913F8F36}" type="datetime1">
               <a:rPr lang="ru-RU" smtClean="0"/>
-              <a:t>13.04.2019</a:t>
+              <a:t>14.04.2019</a:t>
             </a:fld>
             <a:endParaRPr lang="en-US"/>
           </a:p>
@@ -4433,7 +8524,7 @@
           <a:p>
             <a:fld id="{C3EC8C04-7B78-4E72-AA34-33C569C1CF85}" type="datetime1">
               <a:rPr lang="ru-RU" smtClean="0"/>
-              <a:t>13.04.2019</a:t>
+              <a:t>14.04.2019</a:t>
             </a:fld>
             <a:endParaRPr lang="en-US"/>
           </a:p>
@@ -4808,7 +8899,7 @@
           <a:p>
             <a:fld id="{7D0848E8-502B-4121-8F3B-0F73E06B5846}" type="datetime1">
               <a:rPr lang="ru-RU" smtClean="0"/>
-              <a:t>13.04.2019</a:t>
+              <a:t>14.04.2019</a:t>
             </a:fld>
             <a:endParaRPr lang="en-US"/>
           </a:p>
@@ -5313,7 +9404,7 @@
           <a:p>
             <a:fld id="{DB4DF118-40C2-40E6-B05D-28E1827AB60E}" type="datetime1">
               <a:rPr lang="ru-RU" smtClean="0"/>
-              <a:t>13.04.2019</a:t>
+              <a:t>14.04.2019</a:t>
             </a:fld>
             <a:endParaRPr lang="en-US"/>
           </a:p>
@@ -5569,7 +9660,7 @@
           <a:p>
             <a:fld id="{4114A0E6-1E91-410A-9238-54C1677C65F4}" type="datetime1">
               <a:rPr lang="ru-RU" smtClean="0"/>
-              <a:t>13.04.2019</a:t>
+              <a:t>14.04.2019</a:t>
             </a:fld>
             <a:endParaRPr lang="en-US"/>
           </a:p>
@@ -5734,7 +9825,7 @@
           <a:p>
             <a:fld id="{3FF1A32F-1E86-4AB6-B429-826A979C8225}" type="datetime1">
               <a:rPr lang="ru-RU" smtClean="0"/>
-              <a:t>13.04.2019</a:t>
+              <a:t>14.04.2019</a:t>
             </a:fld>
             <a:endParaRPr lang="en-US"/>
           </a:p>
@@ -6123,7 +10214,7 @@
           <a:p>
             <a:fld id="{4C654F67-3202-40EA-85EC-D4BDAAC36735}" type="datetime1">
               <a:rPr lang="ru-RU" smtClean="0"/>
-              <a:t>13.04.2019</a:t>
+              <a:t>14.04.2019</a:t>
             </a:fld>
             <a:endParaRPr lang="en-US"/>
           </a:p>
@@ -6531,7 +10622,7 @@
           <a:p>
             <a:fld id="{E134780A-8894-4ADD-AB0B-7A58ED773226}" type="datetime1">
               <a:rPr lang="ru-RU" smtClean="0"/>
-              <a:t>13.04.2019</a:t>
+              <a:t>14.04.2019</a:t>
             </a:fld>
             <a:endParaRPr lang="en-US"/>
           </a:p>
@@ -6744,7 +10835,7 @@
           <a:p>
             <a:fld id="{D95FE033-25AB-43F9-AFC9-37435FCA6759}" type="datetime1">
               <a:rPr lang="ru-RU" smtClean="0"/>
-              <a:t>13.04.2019</a:t>
+              <a:t>14.04.2019</a:t>
             </a:fld>
             <a:endParaRPr lang="en-US"/>
           </a:p>
@@ -8137,6 +12228,614 @@
     <p:extLst>
       <p:ext uri="{BB962C8B-B14F-4D97-AF65-F5344CB8AC3E}">
         <p14:creationId xmlns:p14="http://schemas.microsoft.com/office/powerpoint/2010/main" val="4023635236"/>
+      </p:ext>
+    </p:extLst>
+  </p:cSld>
+  <p:clrMapOvr>
+    <a:masterClrMapping/>
+  </p:clrMapOvr>
+  <p:transition spd="slow">
+    <p:cover/>
+  </p:transition>
+</p:sld>
+</file>
+
+<file path=ppt/slides/slide13.xml><?xml version="1.0" encoding="utf-8"?>
+<p:sld xmlns:a="http://schemas.openxmlformats.org/drawingml/2006/main" xmlns:r="http://schemas.openxmlformats.org/officeDocument/2006/relationships" xmlns:p="http://schemas.openxmlformats.org/presentationml/2006/main">
+  <p:cSld>
+    <p:spTree>
+      <p:nvGrpSpPr>
+        <p:cNvPr id="1" name=""/>
+        <p:cNvGrpSpPr/>
+        <p:nvPr/>
+      </p:nvGrpSpPr>
+      <p:grpSpPr>
+        <a:xfrm>
+          <a:off x="0" y="0"/>
+          <a:ext cx="0" cy="0"/>
+          <a:chOff x="0" y="0"/>
+          <a:chExt cx="0" cy="0"/>
+        </a:xfrm>
+      </p:grpSpPr>
+      <p:sp>
+        <p:nvSpPr>
+          <p:cNvPr id="2" name="Заголовок 1"/>
+          <p:cNvSpPr>
+            <a:spLocks noGrp="1"/>
+          </p:cNvSpPr>
+          <p:nvPr>
+            <p:ph type="title"/>
+          </p:nvPr>
+        </p:nvSpPr>
+        <p:spPr/>
+        <p:txBody>
+          <a:bodyPr/>
+          <a:lstStyle/>
+          <a:p>
+            <a:r>
+              <a:rPr lang="ru-RU" dirty="0"/>
+              <a:t>Шаблон решения для </a:t>
+            </a:r>
+            <a:r>
+              <a:rPr lang="ru-RU" dirty="0" err="1"/>
+              <a:t>микросервиса</a:t>
+            </a:r>
+            <a:endParaRPr lang="en-US" dirty="0"/>
+          </a:p>
+        </p:txBody>
+      </p:sp>
+      <p:sp>
+        <p:nvSpPr>
+          <p:cNvPr id="3" name="Объект 2"/>
+          <p:cNvSpPr>
+            <a:spLocks noGrp="1"/>
+          </p:cNvSpPr>
+          <p:nvPr>
+            <p:ph idx="1"/>
+          </p:nvPr>
+        </p:nvSpPr>
+        <p:spPr>
+          <a:xfrm>
+            <a:off x="680321" y="3429001"/>
+            <a:ext cx="9613861" cy="2507188"/>
+          </a:xfrm>
+          <a:noFill/>
+        </p:spPr>
+        <p:txBody>
+          <a:bodyPr>
+            <a:normAutofit/>
+          </a:bodyPr>
+          <a:lstStyle/>
+          <a:p>
+            <a:pPr marL="0" indent="0" algn="ctr">
+              <a:buNone/>
+            </a:pPr>
+            <a:r>
+              <a:rPr lang="ru-RU" sz="4800" dirty="0"/>
+              <a:t>Демонстрация</a:t>
+            </a:r>
+            <a:endParaRPr lang="en-US" sz="4800" dirty="0"/>
+          </a:p>
+        </p:txBody>
+      </p:sp>
+      <p:sp>
+        <p:nvSpPr>
+          <p:cNvPr id="5" name="Номер слайда 4">
+            <a:extLst>
+              <a:ext uri="{FF2B5EF4-FFF2-40B4-BE49-F238E27FC236}">
+                <a16:creationId xmlns:a16="http://schemas.microsoft.com/office/drawing/2014/main" id="{A7F9CA83-090A-458E-8646-772D01BCC54F}"/>
+              </a:ext>
+            </a:extLst>
+          </p:cNvPr>
+          <p:cNvSpPr>
+            <a:spLocks noGrp="1"/>
+          </p:cNvSpPr>
+          <p:nvPr>
+            <p:ph type="sldNum" sz="quarter" idx="12"/>
+          </p:nvPr>
+        </p:nvSpPr>
+        <p:spPr>
+          <a:xfrm>
+            <a:off x="10729455" y="753227"/>
+            <a:ext cx="1154151" cy="1090789"/>
+          </a:xfrm>
+        </p:spPr>
+        <p:txBody>
+          <a:bodyPr/>
+          <a:lstStyle/>
+          <a:p>
+            <a:fld id="{356453D0-7C6D-4FAD-A87B-D4E72CD04107}" type="slidenum">
+              <a:rPr lang="en-US" smtClean="0"/>
+              <a:t>13</a:t>
+            </a:fld>
+            <a:endParaRPr lang="en-US" dirty="0"/>
+          </a:p>
+        </p:txBody>
+      </p:sp>
+    </p:spTree>
+    <p:extLst>
+      <p:ext uri="{BB962C8B-B14F-4D97-AF65-F5344CB8AC3E}">
+        <p14:creationId xmlns:p14="http://schemas.microsoft.com/office/powerpoint/2010/main" val="4060687153"/>
+      </p:ext>
+    </p:extLst>
+  </p:cSld>
+  <p:clrMapOvr>
+    <a:masterClrMapping/>
+  </p:clrMapOvr>
+  <p:transition spd="slow">
+    <p:cover/>
+  </p:transition>
+</p:sld>
+</file>
+
+<file path=ppt/slides/slide14.xml><?xml version="1.0" encoding="utf-8"?>
+<p:sld xmlns:a="http://schemas.openxmlformats.org/drawingml/2006/main" xmlns:r="http://schemas.openxmlformats.org/officeDocument/2006/relationships" xmlns:p="http://schemas.openxmlformats.org/presentationml/2006/main">
+  <p:cSld>
+    <p:spTree>
+      <p:nvGrpSpPr>
+        <p:cNvPr id="1" name=""/>
+        <p:cNvGrpSpPr/>
+        <p:nvPr/>
+      </p:nvGrpSpPr>
+      <p:grpSpPr>
+        <a:xfrm>
+          <a:off x="0" y="0"/>
+          <a:ext cx="0" cy="0"/>
+          <a:chOff x="0" y="0"/>
+          <a:chExt cx="0" cy="0"/>
+        </a:xfrm>
+      </p:grpSpPr>
+      <p:sp>
+        <p:nvSpPr>
+          <p:cNvPr id="2" name="Заголовок 1"/>
+          <p:cNvSpPr>
+            <a:spLocks noGrp="1"/>
+          </p:cNvSpPr>
+          <p:nvPr>
+            <p:ph type="title"/>
+          </p:nvPr>
+        </p:nvSpPr>
+        <p:spPr/>
+        <p:txBody>
+          <a:bodyPr/>
+          <a:lstStyle/>
+          <a:p>
+            <a:r>
+              <a:rPr lang="ru-RU" dirty="0"/>
+              <a:t>Что в шаблоне</a:t>
+            </a:r>
+            <a:r>
+              <a:rPr lang="en-US" dirty="0"/>
+              <a:t>: </a:t>
+            </a:r>
+            <a:r>
+              <a:rPr lang="en-US" dirty="0" err="1"/>
+              <a:t>nuget</a:t>
+            </a:r>
+            <a:r>
+              <a:rPr lang="en-US" dirty="0"/>
+              <a:t>-</a:t>
+            </a:r>
+            <a:r>
+              <a:rPr lang="ru-RU" dirty="0"/>
+              <a:t>пакеты</a:t>
+            </a:r>
+            <a:endParaRPr lang="en-US" dirty="0"/>
+          </a:p>
+        </p:txBody>
+      </p:sp>
+      <p:sp>
+        <p:nvSpPr>
+          <p:cNvPr id="3" name="Объект 2"/>
+          <p:cNvSpPr>
+            <a:spLocks noGrp="1"/>
+          </p:cNvSpPr>
+          <p:nvPr>
+            <p:ph idx="1"/>
+          </p:nvPr>
+        </p:nvSpPr>
+        <p:spPr>
+          <a:xfrm>
+            <a:off x="680322" y="2336873"/>
+            <a:ext cx="4186366" cy="3599316"/>
+          </a:xfrm>
+          <a:noFill/>
+        </p:spPr>
+        <p:txBody>
+          <a:bodyPr>
+            <a:normAutofit fontScale="92500" lnSpcReduction="20000"/>
+          </a:bodyPr>
+          <a:lstStyle/>
+          <a:p>
+            <a:r>
+              <a:rPr lang="en-US" dirty="0" err="1"/>
+              <a:t>EntityFrameworkCore</a:t>
+            </a:r>
+            <a:endParaRPr lang="en-US" dirty="0"/>
+          </a:p>
+          <a:p>
+            <a:r>
+              <a:rPr lang="en-US" dirty="0" err="1"/>
+              <a:t>UnitOfWork</a:t>
+            </a:r>
+            <a:endParaRPr lang="ru-RU" dirty="0"/>
+          </a:p>
+          <a:p>
+            <a:r>
+              <a:rPr lang="en-US" dirty="0" err="1"/>
+              <a:t>JwtBearer</a:t>
+            </a:r>
+            <a:endParaRPr lang="ru-RU" dirty="0"/>
+          </a:p>
+          <a:p>
+            <a:r>
+              <a:rPr lang="en-US" dirty="0" err="1"/>
+              <a:t>Swashbuckle.AspNetCore</a:t>
+            </a:r>
+            <a:endParaRPr lang="en-US" dirty="0"/>
+          </a:p>
+          <a:p>
+            <a:r>
+              <a:rPr lang="en-US" dirty="0"/>
+              <a:t>IdentityServer4</a:t>
+            </a:r>
+          </a:p>
+          <a:p>
+            <a:r>
+              <a:rPr lang="en-US" dirty="0"/>
+              <a:t>AutoMapper</a:t>
+            </a:r>
+          </a:p>
+          <a:p>
+            <a:r>
+              <a:rPr lang="en-US" dirty="0" err="1"/>
+              <a:t>MailKit</a:t>
+            </a:r>
+            <a:endParaRPr lang="ru-RU" dirty="0"/>
+          </a:p>
+          <a:p>
+            <a:r>
+              <a:rPr lang="en-US" dirty="0"/>
+              <a:t>Newtonsoft.Json</a:t>
+            </a:r>
+          </a:p>
+          <a:p>
+            <a:r>
+              <a:rPr lang="en-US" dirty="0" err="1"/>
+              <a:t>OperationResultCore</a:t>
+            </a:r>
+            <a:endParaRPr lang="en-US" dirty="0"/>
+          </a:p>
+          <a:p>
+            <a:r>
+              <a:rPr lang="en-US" dirty="0" err="1"/>
+              <a:t>PagedListLiteCore</a:t>
+            </a:r>
+            <a:endParaRPr lang="en-US" dirty="0"/>
+          </a:p>
+        </p:txBody>
+      </p:sp>
+      <p:sp>
+        <p:nvSpPr>
+          <p:cNvPr id="5" name="Номер слайда 4">
+            <a:extLst>
+              <a:ext uri="{FF2B5EF4-FFF2-40B4-BE49-F238E27FC236}">
+                <a16:creationId xmlns:a16="http://schemas.microsoft.com/office/drawing/2014/main" id="{A7F9CA83-090A-458E-8646-772D01BCC54F}"/>
+              </a:ext>
+            </a:extLst>
+          </p:cNvPr>
+          <p:cNvSpPr>
+            <a:spLocks noGrp="1"/>
+          </p:cNvSpPr>
+          <p:nvPr>
+            <p:ph type="sldNum" sz="quarter" idx="12"/>
+          </p:nvPr>
+        </p:nvSpPr>
+        <p:spPr>
+          <a:xfrm>
+            <a:off x="10729455" y="753227"/>
+            <a:ext cx="1154151" cy="1090789"/>
+          </a:xfrm>
+        </p:spPr>
+        <p:txBody>
+          <a:bodyPr/>
+          <a:lstStyle/>
+          <a:p>
+            <a:fld id="{356453D0-7C6D-4FAD-A87B-D4E72CD04107}" type="slidenum">
+              <a:rPr lang="en-US" smtClean="0"/>
+              <a:t>14</a:t>
+            </a:fld>
+            <a:endParaRPr lang="en-US" dirty="0"/>
+          </a:p>
+        </p:txBody>
+      </p:sp>
+      <p:pic>
+        <p:nvPicPr>
+          <p:cNvPr id="6" name="Рисунок 5">
+            <a:extLst>
+              <a:ext uri="{FF2B5EF4-FFF2-40B4-BE49-F238E27FC236}">
+                <a16:creationId xmlns:a16="http://schemas.microsoft.com/office/drawing/2014/main" id="{588CE10A-7E0A-46E0-8C9E-00AB46FFE592}"/>
+              </a:ext>
+            </a:extLst>
+          </p:cNvPr>
+          <p:cNvPicPr>
+            <a:picLocks noChangeAspect="1"/>
+          </p:cNvPicPr>
+          <p:nvPr/>
+        </p:nvPicPr>
+        <p:blipFill>
+          <a:blip r:embed="rId2"/>
+          <a:stretch>
+            <a:fillRect/>
+          </a:stretch>
+        </p:blipFill>
+        <p:spPr>
+          <a:xfrm>
+            <a:off x="5001030" y="2336873"/>
+            <a:ext cx="5387808" cy="3714855"/>
+          </a:xfrm>
+          <a:prstGeom prst="rect">
+            <a:avLst/>
+          </a:prstGeom>
+        </p:spPr>
+      </p:pic>
+    </p:spTree>
+    <p:extLst>
+      <p:ext uri="{BB962C8B-B14F-4D97-AF65-F5344CB8AC3E}">
+        <p14:creationId xmlns:p14="http://schemas.microsoft.com/office/powerpoint/2010/main" val="3667596908"/>
+      </p:ext>
+    </p:extLst>
+  </p:cSld>
+  <p:clrMapOvr>
+    <a:masterClrMapping/>
+  </p:clrMapOvr>
+  <p:transition spd="slow">
+    <p:cover/>
+  </p:transition>
+</p:sld>
+</file>
+
+<file path=ppt/slides/slide15.xml><?xml version="1.0" encoding="utf-8"?>
+<p:sld xmlns:a="http://schemas.openxmlformats.org/drawingml/2006/main" xmlns:r="http://schemas.openxmlformats.org/officeDocument/2006/relationships" xmlns:p="http://schemas.openxmlformats.org/presentationml/2006/main">
+  <p:cSld>
+    <p:spTree>
+      <p:nvGrpSpPr>
+        <p:cNvPr id="1" name=""/>
+        <p:cNvGrpSpPr/>
+        <p:nvPr/>
+      </p:nvGrpSpPr>
+      <p:grpSpPr>
+        <a:xfrm>
+          <a:off x="0" y="0"/>
+          <a:ext cx="0" cy="0"/>
+          <a:chOff x="0" y="0"/>
+          <a:chExt cx="0" cy="0"/>
+        </a:xfrm>
+      </p:grpSpPr>
+      <p:sp>
+        <p:nvSpPr>
+          <p:cNvPr id="2" name="Заголовок 1"/>
+          <p:cNvSpPr>
+            <a:spLocks noGrp="1"/>
+          </p:cNvSpPr>
+          <p:nvPr>
+            <p:ph type="title"/>
+          </p:nvPr>
+        </p:nvSpPr>
+        <p:spPr/>
+        <p:txBody>
+          <a:bodyPr/>
+          <a:lstStyle/>
+          <a:p>
+            <a:r>
+              <a:rPr lang="ru-RU" dirty="0"/>
+              <a:t>Что в шаблоне: функциональность</a:t>
+            </a:r>
+            <a:endParaRPr lang="en-US" dirty="0"/>
+          </a:p>
+        </p:txBody>
+      </p:sp>
+      <p:graphicFrame>
+        <p:nvGraphicFramePr>
+          <p:cNvPr id="4" name="Объект 3">
+            <a:extLst>
+              <a:ext uri="{FF2B5EF4-FFF2-40B4-BE49-F238E27FC236}">
+                <a16:creationId xmlns:a16="http://schemas.microsoft.com/office/drawing/2014/main" id="{BF0D35AC-3070-462B-BDC7-56B7D0D8CE22}"/>
+              </a:ext>
+            </a:extLst>
+          </p:cNvPr>
+          <p:cNvGraphicFramePr>
+            <a:graphicFrameLocks noGrp="1"/>
+          </p:cNvGraphicFramePr>
+          <p:nvPr>
+            <p:ph idx="1"/>
+            <p:extLst>
+              <p:ext uri="{D42A27DB-BD31-4B8C-83A1-F6EECF244321}">
+                <p14:modId xmlns:p14="http://schemas.microsoft.com/office/powerpoint/2010/main" val="800907760"/>
+              </p:ext>
+            </p:extLst>
+          </p:nvPr>
+        </p:nvGraphicFramePr>
+        <p:xfrm>
+          <a:off x="681038" y="2336800"/>
+          <a:ext cx="9613900" cy="3598863"/>
+        </p:xfrm>
+        <a:graphic>
+          <a:graphicData uri="http://schemas.openxmlformats.org/drawingml/2006/diagram">
+            <dgm:relIds xmlns:dgm="http://schemas.openxmlformats.org/drawingml/2006/diagram" xmlns:r="http://schemas.openxmlformats.org/officeDocument/2006/relationships" r:dm="rId2" r:lo="rId3" r:qs="rId4" r:cs="rId5"/>
+          </a:graphicData>
+        </a:graphic>
+      </p:graphicFrame>
+      <p:sp>
+        <p:nvSpPr>
+          <p:cNvPr id="5" name="Номер слайда 4">
+            <a:extLst>
+              <a:ext uri="{FF2B5EF4-FFF2-40B4-BE49-F238E27FC236}">
+                <a16:creationId xmlns:a16="http://schemas.microsoft.com/office/drawing/2014/main" id="{A7F9CA83-090A-458E-8646-772D01BCC54F}"/>
+              </a:ext>
+            </a:extLst>
+          </p:cNvPr>
+          <p:cNvSpPr>
+            <a:spLocks noGrp="1"/>
+          </p:cNvSpPr>
+          <p:nvPr>
+            <p:ph type="sldNum" sz="quarter" idx="12"/>
+          </p:nvPr>
+        </p:nvSpPr>
+        <p:spPr>
+          <a:xfrm>
+            <a:off x="10729455" y="753227"/>
+            <a:ext cx="1154151" cy="1090789"/>
+          </a:xfrm>
+        </p:spPr>
+        <p:txBody>
+          <a:bodyPr/>
+          <a:lstStyle/>
+          <a:p>
+            <a:fld id="{356453D0-7C6D-4FAD-A87B-D4E72CD04107}" type="slidenum">
+              <a:rPr lang="en-US" smtClean="0"/>
+              <a:t>15</a:t>
+            </a:fld>
+            <a:endParaRPr lang="en-US" dirty="0"/>
+          </a:p>
+        </p:txBody>
+      </p:sp>
+    </p:spTree>
+    <p:extLst>
+      <p:ext uri="{BB962C8B-B14F-4D97-AF65-F5344CB8AC3E}">
+        <p14:creationId xmlns:p14="http://schemas.microsoft.com/office/powerpoint/2010/main" val="528215608"/>
+      </p:ext>
+    </p:extLst>
+  </p:cSld>
+  <p:clrMapOvr>
+    <a:masterClrMapping/>
+  </p:clrMapOvr>
+  <p:transition spd="slow">
+    <p:cover/>
+  </p:transition>
+</p:sld>
+</file>
+
+<file path=ppt/slides/slide16.xml><?xml version="1.0" encoding="utf-8"?>
+<p:sld xmlns:a="http://schemas.openxmlformats.org/drawingml/2006/main" xmlns:r="http://schemas.openxmlformats.org/officeDocument/2006/relationships" xmlns:p="http://schemas.openxmlformats.org/presentationml/2006/main">
+  <p:cSld>
+    <p:spTree>
+      <p:nvGrpSpPr>
+        <p:cNvPr id="1" name=""/>
+        <p:cNvGrpSpPr/>
+        <p:nvPr/>
+      </p:nvGrpSpPr>
+      <p:grpSpPr>
+        <a:xfrm>
+          <a:off x="0" y="0"/>
+          <a:ext cx="0" cy="0"/>
+          <a:chOff x="0" y="0"/>
+          <a:chExt cx="0" cy="0"/>
+        </a:xfrm>
+      </p:grpSpPr>
+      <p:sp>
+        <p:nvSpPr>
+          <p:cNvPr id="2" name="Заголовок 1"/>
+          <p:cNvSpPr>
+            <a:spLocks noGrp="1"/>
+          </p:cNvSpPr>
+          <p:nvPr>
+            <p:ph type="title"/>
+          </p:nvPr>
+        </p:nvSpPr>
+        <p:spPr/>
+        <p:txBody>
+          <a:bodyPr/>
+          <a:lstStyle/>
+          <a:p>
+            <a:r>
+              <a:rPr lang="ru-RU" dirty="0"/>
+              <a:t>Мартин </a:t>
+            </a:r>
+            <a:r>
+              <a:rPr lang="ru-RU" dirty="0" err="1"/>
+              <a:t>Фоулер</a:t>
+            </a:r>
+            <a:endParaRPr lang="en-US" dirty="0"/>
+          </a:p>
+        </p:txBody>
+      </p:sp>
+      <p:sp>
+        <p:nvSpPr>
+          <p:cNvPr id="3" name="Объект 2"/>
+          <p:cNvSpPr>
+            <a:spLocks noGrp="1"/>
+          </p:cNvSpPr>
+          <p:nvPr>
+            <p:ph idx="1"/>
+          </p:nvPr>
+        </p:nvSpPr>
+        <p:spPr>
+          <a:noFill/>
+        </p:spPr>
+        <p:txBody>
+          <a:bodyPr>
+            <a:normAutofit/>
+          </a:bodyPr>
+          <a:lstStyle/>
+          <a:p>
+            <a:pPr marL="0" indent="0">
+              <a:buNone/>
+            </a:pPr>
+            <a:r>
+              <a:rPr lang="ru-RU" dirty="0"/>
+              <a:t>Термин «</a:t>
+            </a:r>
+            <a:r>
+              <a:rPr lang="ru-RU" dirty="0" err="1"/>
+              <a:t>микросервисная</a:t>
+            </a:r>
+            <a:r>
+              <a:rPr lang="ru-RU" dirty="0"/>
+              <a:t> архитектура» возник в последние несколько лет, чтобы описать конкретный способ проектирования программных приложений как наборов независимо развертываемых служб. Несмотря на то, что нет точного определения этого архитектурного стиля, существуют определенные общие характеристики организации, связанные с возможностями бизнеса, автоматизированным развертыванием, интеллектом в конечных точках и децентрализованным управлением языками и данными.</a:t>
+            </a:r>
+            <a:endParaRPr lang="en-US" dirty="0"/>
+          </a:p>
+        </p:txBody>
+      </p:sp>
+      <p:sp>
+        <p:nvSpPr>
+          <p:cNvPr id="5" name="Номер слайда 4">
+            <a:extLst>
+              <a:ext uri="{FF2B5EF4-FFF2-40B4-BE49-F238E27FC236}">
+                <a16:creationId xmlns:a16="http://schemas.microsoft.com/office/drawing/2014/main" id="{A7F9CA83-090A-458E-8646-772D01BCC54F}"/>
+              </a:ext>
+            </a:extLst>
+          </p:cNvPr>
+          <p:cNvSpPr>
+            <a:spLocks noGrp="1"/>
+          </p:cNvSpPr>
+          <p:nvPr>
+            <p:ph type="sldNum" sz="quarter" idx="12"/>
+          </p:nvPr>
+        </p:nvSpPr>
+        <p:spPr>
+          <a:xfrm>
+            <a:off x="10729455" y="753227"/>
+            <a:ext cx="1154151" cy="1090789"/>
+          </a:xfrm>
+        </p:spPr>
+        <p:txBody>
+          <a:bodyPr/>
+          <a:lstStyle/>
+          <a:p>
+            <a:fld id="{356453D0-7C6D-4FAD-A87B-D4E72CD04107}" type="slidenum">
+              <a:rPr lang="en-US" smtClean="0"/>
+              <a:t>16</a:t>
+            </a:fld>
+            <a:endParaRPr lang="en-US" dirty="0"/>
+          </a:p>
+        </p:txBody>
+      </p:sp>
+    </p:spTree>
+    <p:extLst>
+      <p:ext uri="{BB962C8B-B14F-4D97-AF65-F5344CB8AC3E}">
+        <p14:creationId xmlns:p14="http://schemas.microsoft.com/office/powerpoint/2010/main" val="1603134002"/>
       </p:ext>
     </p:extLst>
   </p:cSld>

</xml_diff>